<commit_message>
odevzdáno a posláno na tisk
</commit_message>
<xml_diff>
--- a/presentation/Zakopal-prezentace.pptx
+++ b/presentation/Zakopal-prezentace.pptx
@@ -13,14 +13,14 @@
     <p:sldId id="373" r:id="rId4"/>
     <p:sldId id="374" r:id="rId5"/>
     <p:sldId id="378" r:id="rId6"/>
-    <p:sldId id="328" r:id="rId7"/>
-    <p:sldId id="377" r:id="rId8"/>
-    <p:sldId id="334" r:id="rId9"/>
-    <p:sldId id="382" r:id="rId10"/>
-    <p:sldId id="381" r:id="rId11"/>
-    <p:sldId id="380" r:id="rId12"/>
-    <p:sldId id="375" r:id="rId13"/>
-    <p:sldId id="376" r:id="rId14"/>
+    <p:sldId id="376" r:id="rId7"/>
+    <p:sldId id="328" r:id="rId8"/>
+    <p:sldId id="377" r:id="rId9"/>
+    <p:sldId id="334" r:id="rId10"/>
+    <p:sldId id="382" r:id="rId11"/>
+    <p:sldId id="381" r:id="rId12"/>
+    <p:sldId id="380" r:id="rId13"/>
+    <p:sldId id="375" r:id="rId14"/>
     <p:sldId id="379" r:id="rId15"/>
   </p:sldIdLst>
   <p:sldSz cx="10080625" cy="7559675"/>
@@ -1279,7 +1279,7 @@
               <a:pPr>
                 <a:defRPr/>
               </a:pPr>
-              <a:t>13</a:t>
+              <a:t>6</a:t>
             </a:fld>
             <a:endParaRPr lang="cs-CZ" altLang="cs-CZ" dirty="0"/>
           </a:p>
@@ -3064,11 +3064,19 @@
           <a:p>
             <a:r>
               <a:rPr lang="cs-CZ" dirty="0"/>
-              <a:t>Oponuji Všem</a:t>
+              <a:t>Ing. </a:t>
+            </a:r>
+            <a:r>
+              <a:rPr lang="cs-CZ"/>
+              <a:t>Tomáš Musil</a:t>
+            </a:r>
+            <a:r>
+              <a:rPr lang="cs-CZ" noProof="0"/>
+              <a:t>, </a:t>
             </a:r>
             <a:r>
               <a:rPr lang="cs-CZ" noProof="0" dirty="0"/>
-              <a:t>, Ph.D.</a:t>
+              <a:t>Ph.D.</a:t>
             </a:r>
             <a:endParaRPr lang="en-US" noProof="0" dirty="0"/>
           </a:p>
@@ -3796,6 +3804,112 @@
 </file>
 
 <file path=ppt/slides/slide10.xml><?xml version="1.0" encoding="utf-8"?>
+<p:sld xmlns:a="http://schemas.openxmlformats.org/drawingml/2006/main" xmlns:r="http://schemas.openxmlformats.org/officeDocument/2006/relationships" xmlns:p="http://schemas.openxmlformats.org/presentationml/2006/main">
+  <p:cSld>
+    <p:spTree>
+      <p:nvGrpSpPr>
+        <p:cNvPr id="1" name=""/>
+        <p:cNvGrpSpPr/>
+        <p:nvPr/>
+      </p:nvGrpSpPr>
+      <p:grpSpPr>
+        <a:xfrm>
+          <a:off x="0" y="0"/>
+          <a:ext cx="0" cy="0"/>
+          <a:chOff x="0" y="0"/>
+          <a:chExt cx="0" cy="0"/>
+        </a:xfrm>
+      </p:grpSpPr>
+      <p:sp>
+        <p:nvSpPr>
+          <p:cNvPr id="4" name="Rectangle 3">
+            <a:extLst>
+              <a:ext uri="{FF2B5EF4-FFF2-40B4-BE49-F238E27FC236}">
+                <a16:creationId xmlns:a16="http://schemas.microsoft.com/office/drawing/2014/main" id="{CBC4BD6D-D679-68FE-29B9-86A257FF02AF}"/>
+              </a:ext>
+            </a:extLst>
+          </p:cNvPr>
+          <p:cNvSpPr/>
+          <p:nvPr/>
+        </p:nvSpPr>
+        <p:spPr bwMode="auto">
+          <a:xfrm>
+            <a:off x="0" y="0"/>
+            <a:ext cx="10080625" cy="7559675"/>
+          </a:xfrm>
+          <a:prstGeom prst="rect">
+            <a:avLst/>
+          </a:prstGeom>
+          <a:solidFill>
+            <a:schemeClr val="tx1"/>
+          </a:solidFill>
+          <a:ln w="9525" cap="flat" cmpd="sng" algn="ctr">
+            <a:solidFill>
+              <a:schemeClr val="tx1"/>
+            </a:solidFill>
+            <a:prstDash val="solid"/>
+            <a:round/>
+            <a:headEnd type="none" w="med" len="med"/>
+            <a:tailEnd type="none" w="med" len="med"/>
+          </a:ln>
+          <a:effectLst/>
+        </p:spPr>
+        <p:txBody>
+          <a:bodyPr vert="horz" wrap="square" lIns="91440" tIns="45720" rIns="91440" bIns="45720" numCol="1" rtlCol="0" anchor="t" anchorCtr="0" compatLnSpc="1">
+            <a:prstTxWarp prst="textNoShape">
+              <a:avLst/>
+            </a:prstTxWarp>
+          </a:bodyPr>
+          <a:lstStyle/>
+          <a:p>
+            <a:pPr marL="0" marR="0" indent="0" algn="l" defTabSz="449263" rtl="0" eaLnBrk="1" fontAlgn="base" latinLnBrk="0" hangingPunct="0">
+              <a:lnSpc>
+                <a:spcPct val="93000"/>
+              </a:lnSpc>
+              <a:spcBef>
+                <a:spcPct val="0"/>
+              </a:spcBef>
+              <a:spcAft>
+                <a:spcPct val="0"/>
+              </a:spcAft>
+              <a:buClr>
+                <a:srgbClr val="000000"/>
+              </a:buClr>
+              <a:buSzPct val="100000"/>
+              <a:buFont typeface="Times New Roman" panose="02020603050405020304" pitchFamily="18" charset="0"/>
+              <a:buNone/>
+              <a:tabLst/>
+            </a:pPr>
+            <a:endParaRPr kumimoji="0" lang="en-CZ" sz="1800" b="0" i="0" u="none" strike="noStrike" cap="none" normalizeH="0" baseline="0" dirty="0">
+              <a:ln>
+                <a:solidFill>
+                  <a:sysClr val="windowText" lastClr="000000"/>
+                </a:solidFill>
+              </a:ln>
+              <a:solidFill>
+                <a:srgbClr val="E05206"/>
+              </a:solidFill>
+              <a:effectLst/>
+              <a:latin typeface="Arial" panose="020B0604020202020204" pitchFamily="34" charset="0"/>
+              <a:cs typeface="WenQuanYi Zen Hei" charset="0"/>
+            </a:endParaRPr>
+          </a:p>
+        </p:txBody>
+      </p:sp>
+    </p:spTree>
+    <p:extLst>
+      <p:ext uri="{BB962C8B-B14F-4D97-AF65-F5344CB8AC3E}">
+        <p14:creationId xmlns:p14="http://schemas.microsoft.com/office/powerpoint/2010/main" val="2061360001"/>
+      </p:ext>
+    </p:extLst>
+  </p:cSld>
+  <p:clrMapOvr>
+    <a:masterClrMapping/>
+  </p:clrMapOvr>
+</p:sld>
+</file>
+
+<file path=ppt/slides/slide11.xml><?xml version="1.0" encoding="utf-8"?>
 <p:sld xmlns:a="http://schemas.openxmlformats.org/drawingml/2006/main" xmlns:r="http://schemas.openxmlformats.org/officeDocument/2006/relationships" xmlns:p="http://schemas.openxmlformats.org/presentationml/2006/main">
   <p:cSld>
     <p:spTree>
@@ -3899,7 +4013,7 @@
 </p:sld>
 </file>
 
-<file path=ppt/slides/slide11.xml><?xml version="1.0" encoding="utf-8"?>
+<file path=ppt/slides/slide12.xml><?xml version="1.0" encoding="utf-8"?>
 <p:sld xmlns:a="http://schemas.openxmlformats.org/drawingml/2006/main" xmlns:r="http://schemas.openxmlformats.org/officeDocument/2006/relationships" xmlns:p="http://schemas.openxmlformats.org/presentationml/2006/main">
   <p:cSld>
     <p:spTree>
@@ -3998,7 +4112,7 @@
 </p:sld>
 </file>
 
-<file path=ppt/slides/slide12.xml><?xml version="1.0" encoding="utf-8"?>
+<file path=ppt/slides/slide13.xml><?xml version="1.0" encoding="utf-8"?>
 <p:sld xmlns:a="http://schemas.openxmlformats.org/drawingml/2006/main" xmlns:r="http://schemas.openxmlformats.org/officeDocument/2006/relationships" xmlns:p="http://schemas.openxmlformats.org/presentationml/2006/main">
   <p:cSld>
     <p:spTree>
@@ -4088,382 +4202,6 @@
     <p:extLst>
       <p:ext uri="{BB962C8B-B14F-4D97-AF65-F5344CB8AC3E}">
         <p14:creationId xmlns:p14="http://schemas.microsoft.com/office/powerpoint/2010/main" val="2508119481"/>
-      </p:ext>
-    </p:extLst>
-  </p:cSld>
-  <p:clrMapOvr>
-    <a:masterClrMapping/>
-  </p:clrMapOvr>
-</p:sld>
-</file>
-
-<file path=ppt/slides/slide13.xml><?xml version="1.0" encoding="utf-8"?>
-<p:sld xmlns:a="http://schemas.openxmlformats.org/drawingml/2006/main" xmlns:r="http://schemas.openxmlformats.org/officeDocument/2006/relationships" xmlns:p="http://schemas.openxmlformats.org/presentationml/2006/main">
-  <p:cSld>
-    <p:spTree>
-      <p:nvGrpSpPr>
-        <p:cNvPr id="1" name=""/>
-        <p:cNvGrpSpPr/>
-        <p:nvPr/>
-      </p:nvGrpSpPr>
-      <p:grpSpPr>
-        <a:xfrm>
-          <a:off x="0" y="0"/>
-          <a:ext cx="0" cy="0"/>
-          <a:chOff x="0" y="0"/>
-          <a:chExt cx="0" cy="0"/>
-        </a:xfrm>
-      </p:grpSpPr>
-      <p:sp>
-        <p:nvSpPr>
-          <p:cNvPr id="2" name="Title 1">
-            <a:extLst>
-              <a:ext uri="{FF2B5EF4-FFF2-40B4-BE49-F238E27FC236}">
-                <a16:creationId xmlns:a16="http://schemas.microsoft.com/office/drawing/2014/main" id="{A45BF3FC-B5FE-3BED-EB28-4FC2D7EDCAA2}"/>
-              </a:ext>
-            </a:extLst>
-          </p:cNvPr>
-          <p:cNvSpPr>
-            <a:spLocks noGrp="1"/>
-          </p:cNvSpPr>
-          <p:nvPr>
-            <p:ph type="title"/>
-          </p:nvPr>
-        </p:nvSpPr>
-        <p:spPr>
-          <a:xfrm>
-            <a:off x="1" y="307777"/>
-            <a:ext cx="10080624" cy="1095796"/>
-          </a:xfrm>
-        </p:spPr>
-        <p:txBody>
-          <a:bodyPr/>
-          <a:lstStyle/>
-          <a:p>
-            <a:r>
-              <a:rPr lang="en-CZ" dirty="0"/>
-              <a:t>Analýza běhu aplikace</a:t>
-            </a:r>
-          </a:p>
-        </p:txBody>
-      </p:sp>
-      <p:pic>
-        <p:nvPicPr>
-          <p:cNvPr id="4" name="Picture 3" descr="A picture containing chart&#10;&#10;Description automatically generated">
-            <a:extLst>
-              <a:ext uri="{FF2B5EF4-FFF2-40B4-BE49-F238E27FC236}">
-                <a16:creationId xmlns:a16="http://schemas.microsoft.com/office/drawing/2014/main" id="{AEEA3901-28F7-D559-4629-AF3EB3399A20}"/>
-              </a:ext>
-            </a:extLst>
-          </p:cNvPr>
-          <p:cNvPicPr>
-            <a:picLocks noChangeAspect="1"/>
-          </p:cNvPicPr>
-          <p:nvPr/>
-        </p:nvPicPr>
-        <p:blipFill>
-          <a:blip r:embed="rId3">
-            <a:extLst>
-              <a:ext uri="{28A0092B-C50C-407E-A947-70E740481C1C}">
-                <a14:useLocalDpi xmlns:a14="http://schemas.microsoft.com/office/drawing/2010/main" val="0"/>
-              </a:ext>
-            </a:extLst>
-          </a:blip>
-          <a:stretch>
-            <a:fillRect/>
-          </a:stretch>
-        </p:blipFill>
-        <p:spPr>
-          <a:xfrm>
-            <a:off x="19368" y="1643714"/>
-            <a:ext cx="9845479" cy="5608184"/>
-          </a:xfrm>
-          <a:prstGeom prst="rect">
-            <a:avLst/>
-          </a:prstGeom>
-        </p:spPr>
-      </p:pic>
-      <p:sp>
-        <p:nvSpPr>
-          <p:cNvPr id="5" name="Nadpis 1">
-            <a:extLst>
-              <a:ext uri="{FF2B5EF4-FFF2-40B4-BE49-F238E27FC236}">
-                <a16:creationId xmlns:a16="http://schemas.microsoft.com/office/drawing/2014/main" id="{8E674679-081B-AA64-ACFD-A9A29B3FF42A}"/>
-              </a:ext>
-            </a:extLst>
-          </p:cNvPr>
-          <p:cNvSpPr txBox="1">
-            <a:spLocks/>
-          </p:cNvSpPr>
-          <p:nvPr/>
-        </p:nvSpPr>
-        <p:spPr bwMode="auto">
-          <a:xfrm>
-            <a:off x="143768" y="1187549"/>
-            <a:ext cx="9793087" cy="432048"/>
-          </a:xfrm>
-          <a:prstGeom prst="rect">
-            <a:avLst/>
-          </a:prstGeom>
-          <a:noFill/>
-          <a:ln w="9525">
-            <a:noFill/>
-            <a:round/>
-            <a:headEnd/>
-            <a:tailEnd/>
-          </a:ln>
-          <a:effectLst/>
-          <a:extLst>
-            <a:ext uri="{909E8E84-426E-40DD-AFC4-6F175D3DCCD1}">
-              <a14:hiddenFill xmlns:a14="http://schemas.microsoft.com/office/drawing/2010/main">
-                <a:solidFill>
-                  <a:srgbClr val="FFFFFF"/>
-                </a:solidFill>
-              </a14:hiddenFill>
-            </a:ext>
-            <a:ext uri="{AF507438-7753-43E0-B8FC-AC1667EBCBE1}">
-              <a14:hiddenEffects xmlns:a14="http://schemas.microsoft.com/office/drawing/2010/main">
-                <a:effectLst>
-                  <a:outerShdw dist="35921" dir="2700000" algn="ctr" rotWithShape="0">
-                    <a:schemeClr val="bg2"/>
-                  </a:outerShdw>
-                </a:effectLst>
-              </a14:hiddenEffects>
-            </a:ext>
-          </a:extLst>
-        </p:spPr>
-        <p:txBody>
-          <a:bodyPr vert="horz" wrap="square" lIns="0" tIns="0" rIns="0" bIns="0" numCol="1" anchor="ctr" anchorCtr="0" compatLnSpc="1">
-            <a:prstTxWarp prst="textNoShape">
-              <a:avLst/>
-            </a:prstTxWarp>
-          </a:bodyPr>
-          <a:lstStyle>
-            <a:lvl1pPr algn="ctr" defTabSz="449263" rtl="0" eaLnBrk="0" fontAlgn="base" hangingPunct="0">
-              <a:lnSpc>
-                <a:spcPct val="93000"/>
-              </a:lnSpc>
-              <a:spcBef>
-                <a:spcPct val="0"/>
-              </a:spcBef>
-              <a:spcAft>
-                <a:spcPct val="0"/>
-              </a:spcAft>
-              <a:buClr>
-                <a:srgbClr val="000000"/>
-              </a:buClr>
-              <a:buSzPct val="100000"/>
-              <a:buFont typeface="Times New Roman" panose="02020603050405020304" pitchFamily="18" charset="0"/>
-              <a:defRPr sz="4000" kern="1200" cap="all" baseline="0">
-                <a:solidFill>
-                  <a:srgbClr val="005EB8"/>
-                </a:solidFill>
-                <a:latin typeface="Technika" panose="00000500000000000000" pitchFamily="2" charset="-18"/>
-                <a:ea typeface="Technika" panose="00000500000000000000" pitchFamily="2" charset="-18"/>
-                <a:cs typeface="Technika" panose="00000500000000000000" pitchFamily="2" charset="-18"/>
-              </a:defRPr>
-            </a:lvl1pPr>
-            <a:lvl2pPr algn="ctr" defTabSz="449263" rtl="0" eaLnBrk="0" fontAlgn="base" hangingPunct="0">
-              <a:lnSpc>
-                <a:spcPct val="93000"/>
-              </a:lnSpc>
-              <a:spcBef>
-                <a:spcPct val="0"/>
-              </a:spcBef>
-              <a:spcAft>
-                <a:spcPct val="0"/>
-              </a:spcAft>
-              <a:buClr>
-                <a:srgbClr val="000000"/>
-              </a:buClr>
-              <a:buSzPct val="100000"/>
-              <a:buFont typeface="Times New Roman" panose="02020603050405020304" pitchFamily="18" charset="0"/>
-              <a:defRPr sz="4400">
-                <a:solidFill>
-                  <a:srgbClr val="000000"/>
-                </a:solidFill>
-                <a:latin typeface="Liberation Sans" panose="020B0604020202020204" pitchFamily="34" charset="0"/>
-                <a:cs typeface="Liberation Sans" panose="020B0604020202020204" pitchFamily="34" charset="0"/>
-              </a:defRPr>
-            </a:lvl2pPr>
-            <a:lvl3pPr algn="ctr" defTabSz="449263" rtl="0" eaLnBrk="0" fontAlgn="base" hangingPunct="0">
-              <a:lnSpc>
-                <a:spcPct val="93000"/>
-              </a:lnSpc>
-              <a:spcBef>
-                <a:spcPct val="0"/>
-              </a:spcBef>
-              <a:spcAft>
-                <a:spcPct val="0"/>
-              </a:spcAft>
-              <a:buClr>
-                <a:srgbClr val="000000"/>
-              </a:buClr>
-              <a:buSzPct val="100000"/>
-              <a:buFont typeface="Times New Roman" panose="02020603050405020304" pitchFamily="18" charset="0"/>
-              <a:defRPr sz="4400">
-                <a:solidFill>
-                  <a:srgbClr val="000000"/>
-                </a:solidFill>
-                <a:latin typeface="Liberation Sans" panose="020B0604020202020204" pitchFamily="34" charset="0"/>
-                <a:cs typeface="Liberation Sans" panose="020B0604020202020204" pitchFamily="34" charset="0"/>
-              </a:defRPr>
-            </a:lvl3pPr>
-            <a:lvl4pPr algn="ctr" defTabSz="449263" rtl="0" eaLnBrk="0" fontAlgn="base" hangingPunct="0">
-              <a:lnSpc>
-                <a:spcPct val="93000"/>
-              </a:lnSpc>
-              <a:spcBef>
-                <a:spcPct val="0"/>
-              </a:spcBef>
-              <a:spcAft>
-                <a:spcPct val="0"/>
-              </a:spcAft>
-              <a:buClr>
-                <a:srgbClr val="000000"/>
-              </a:buClr>
-              <a:buSzPct val="100000"/>
-              <a:buFont typeface="Times New Roman" panose="02020603050405020304" pitchFamily="18" charset="0"/>
-              <a:defRPr sz="4400">
-                <a:solidFill>
-                  <a:srgbClr val="000000"/>
-                </a:solidFill>
-                <a:latin typeface="Liberation Sans" panose="020B0604020202020204" pitchFamily="34" charset="0"/>
-                <a:cs typeface="Liberation Sans" panose="020B0604020202020204" pitchFamily="34" charset="0"/>
-              </a:defRPr>
-            </a:lvl4pPr>
-            <a:lvl5pPr algn="ctr" defTabSz="449263" rtl="0" eaLnBrk="0" fontAlgn="base" hangingPunct="0">
-              <a:lnSpc>
-                <a:spcPct val="93000"/>
-              </a:lnSpc>
-              <a:spcBef>
-                <a:spcPct val="0"/>
-              </a:spcBef>
-              <a:spcAft>
-                <a:spcPct val="0"/>
-              </a:spcAft>
-              <a:buClr>
-                <a:srgbClr val="000000"/>
-              </a:buClr>
-              <a:buSzPct val="100000"/>
-              <a:buFont typeface="Times New Roman" panose="02020603050405020304" pitchFamily="18" charset="0"/>
-              <a:defRPr sz="4400">
-                <a:solidFill>
-                  <a:srgbClr val="000000"/>
-                </a:solidFill>
-                <a:latin typeface="Liberation Sans" panose="020B0604020202020204" pitchFamily="34" charset="0"/>
-                <a:cs typeface="Liberation Sans" panose="020B0604020202020204" pitchFamily="34" charset="0"/>
-              </a:defRPr>
-            </a:lvl5pPr>
-            <a:lvl6pPr marL="2514600" indent="-228600" algn="ctr" defTabSz="449263" rtl="0" fontAlgn="base" hangingPunct="0">
-              <a:lnSpc>
-                <a:spcPct val="93000"/>
-              </a:lnSpc>
-              <a:spcBef>
-                <a:spcPct val="0"/>
-              </a:spcBef>
-              <a:spcAft>
-                <a:spcPct val="0"/>
-              </a:spcAft>
-              <a:buClr>
-                <a:srgbClr val="000000"/>
-              </a:buClr>
-              <a:buSzPct val="100000"/>
-              <a:buFont typeface="Times New Roman" panose="02020603050405020304" pitchFamily="18" charset="0"/>
-              <a:defRPr sz="4400">
-                <a:solidFill>
-                  <a:srgbClr val="000000"/>
-                </a:solidFill>
-                <a:latin typeface="Arial" panose="020B0604020202020204" pitchFamily="34" charset="0"/>
-                <a:cs typeface="WenQuanYi Zen Hei" charset="0"/>
-              </a:defRPr>
-            </a:lvl6pPr>
-            <a:lvl7pPr marL="2971800" indent="-228600" algn="ctr" defTabSz="449263" rtl="0" fontAlgn="base" hangingPunct="0">
-              <a:lnSpc>
-                <a:spcPct val="93000"/>
-              </a:lnSpc>
-              <a:spcBef>
-                <a:spcPct val="0"/>
-              </a:spcBef>
-              <a:spcAft>
-                <a:spcPct val="0"/>
-              </a:spcAft>
-              <a:buClr>
-                <a:srgbClr val="000000"/>
-              </a:buClr>
-              <a:buSzPct val="100000"/>
-              <a:buFont typeface="Times New Roman" panose="02020603050405020304" pitchFamily="18" charset="0"/>
-              <a:defRPr sz="4400">
-                <a:solidFill>
-                  <a:srgbClr val="000000"/>
-                </a:solidFill>
-                <a:latin typeface="Arial" panose="020B0604020202020204" pitchFamily="34" charset="0"/>
-                <a:cs typeface="WenQuanYi Zen Hei" charset="0"/>
-              </a:defRPr>
-            </a:lvl7pPr>
-            <a:lvl8pPr marL="3429000" indent="-228600" algn="ctr" defTabSz="449263" rtl="0" fontAlgn="base" hangingPunct="0">
-              <a:lnSpc>
-                <a:spcPct val="93000"/>
-              </a:lnSpc>
-              <a:spcBef>
-                <a:spcPct val="0"/>
-              </a:spcBef>
-              <a:spcAft>
-                <a:spcPct val="0"/>
-              </a:spcAft>
-              <a:buClr>
-                <a:srgbClr val="000000"/>
-              </a:buClr>
-              <a:buSzPct val="100000"/>
-              <a:buFont typeface="Times New Roman" panose="02020603050405020304" pitchFamily="18" charset="0"/>
-              <a:defRPr sz="4400">
-                <a:solidFill>
-                  <a:srgbClr val="000000"/>
-                </a:solidFill>
-                <a:latin typeface="Arial" panose="020B0604020202020204" pitchFamily="34" charset="0"/>
-                <a:cs typeface="WenQuanYi Zen Hei" charset="0"/>
-              </a:defRPr>
-            </a:lvl8pPr>
-            <a:lvl9pPr marL="3886200" indent="-228600" algn="ctr" defTabSz="449263" rtl="0" fontAlgn="base" hangingPunct="0">
-              <a:lnSpc>
-                <a:spcPct val="93000"/>
-              </a:lnSpc>
-              <a:spcBef>
-                <a:spcPct val="0"/>
-              </a:spcBef>
-              <a:spcAft>
-                <a:spcPct val="0"/>
-              </a:spcAft>
-              <a:buClr>
-                <a:srgbClr val="000000"/>
-              </a:buClr>
-              <a:buSzPct val="100000"/>
-              <a:buFont typeface="Times New Roman" panose="02020603050405020304" pitchFamily="18" charset="0"/>
-              <a:defRPr sz="4400">
-                <a:solidFill>
-                  <a:srgbClr val="000000"/>
-                </a:solidFill>
-                <a:latin typeface="Arial" panose="020B0604020202020204" pitchFamily="34" charset="0"/>
-                <a:cs typeface="WenQuanYi Zen Hei" charset="0"/>
-              </a:defRPr>
-            </a:lvl9pPr>
-          </a:lstStyle>
-          <a:p>
-            <a:r>
-              <a:rPr lang="cs-CZ" sz="2000" b="1" i="1" dirty="0">
-                <a:solidFill>
-                  <a:srgbClr val="E05206"/>
-                </a:solidFill>
-              </a:rPr>
-              <a:t>CPU/FPGA Model</a:t>
-            </a:r>
-          </a:p>
-        </p:txBody>
-      </p:sp>
-    </p:spTree>
-    <p:extLst>
-      <p:ext uri="{BB962C8B-B14F-4D97-AF65-F5344CB8AC3E}">
-        <p14:creationId xmlns:p14="http://schemas.microsoft.com/office/powerpoint/2010/main" val="1991186185"/>
       </p:ext>
     </p:extLst>
   </p:cSld>
@@ -5599,6 +5337,382 @@
       </p:grpSpPr>
       <p:sp>
         <p:nvSpPr>
+          <p:cNvPr id="2" name="Title 1">
+            <a:extLst>
+              <a:ext uri="{FF2B5EF4-FFF2-40B4-BE49-F238E27FC236}">
+                <a16:creationId xmlns:a16="http://schemas.microsoft.com/office/drawing/2014/main" id="{A45BF3FC-B5FE-3BED-EB28-4FC2D7EDCAA2}"/>
+              </a:ext>
+            </a:extLst>
+          </p:cNvPr>
+          <p:cNvSpPr>
+            <a:spLocks noGrp="1"/>
+          </p:cNvSpPr>
+          <p:nvPr>
+            <p:ph type="title"/>
+          </p:nvPr>
+        </p:nvSpPr>
+        <p:spPr>
+          <a:xfrm>
+            <a:off x="1" y="307777"/>
+            <a:ext cx="10080624" cy="1095796"/>
+          </a:xfrm>
+        </p:spPr>
+        <p:txBody>
+          <a:bodyPr/>
+          <a:lstStyle/>
+          <a:p>
+            <a:r>
+              <a:rPr lang="en-CZ" dirty="0"/>
+              <a:t>Analýza běhu aplikace</a:t>
+            </a:r>
+          </a:p>
+        </p:txBody>
+      </p:sp>
+      <p:pic>
+        <p:nvPicPr>
+          <p:cNvPr id="4" name="Picture 3" descr="A picture containing chart&#10;&#10;Description automatically generated">
+            <a:extLst>
+              <a:ext uri="{FF2B5EF4-FFF2-40B4-BE49-F238E27FC236}">
+                <a16:creationId xmlns:a16="http://schemas.microsoft.com/office/drawing/2014/main" id="{AEEA3901-28F7-D559-4629-AF3EB3399A20}"/>
+              </a:ext>
+            </a:extLst>
+          </p:cNvPr>
+          <p:cNvPicPr>
+            <a:picLocks noChangeAspect="1"/>
+          </p:cNvPicPr>
+          <p:nvPr/>
+        </p:nvPicPr>
+        <p:blipFill>
+          <a:blip r:embed="rId3">
+            <a:extLst>
+              <a:ext uri="{28A0092B-C50C-407E-A947-70E740481C1C}">
+                <a14:useLocalDpi xmlns:a14="http://schemas.microsoft.com/office/drawing/2010/main" val="0"/>
+              </a:ext>
+            </a:extLst>
+          </a:blip>
+          <a:stretch>
+            <a:fillRect/>
+          </a:stretch>
+        </p:blipFill>
+        <p:spPr>
+          <a:xfrm>
+            <a:off x="19368" y="1643714"/>
+            <a:ext cx="9845479" cy="5608184"/>
+          </a:xfrm>
+          <a:prstGeom prst="rect">
+            <a:avLst/>
+          </a:prstGeom>
+        </p:spPr>
+      </p:pic>
+      <p:sp>
+        <p:nvSpPr>
+          <p:cNvPr id="5" name="Nadpis 1">
+            <a:extLst>
+              <a:ext uri="{FF2B5EF4-FFF2-40B4-BE49-F238E27FC236}">
+                <a16:creationId xmlns:a16="http://schemas.microsoft.com/office/drawing/2014/main" id="{8E674679-081B-AA64-ACFD-A9A29B3FF42A}"/>
+              </a:ext>
+            </a:extLst>
+          </p:cNvPr>
+          <p:cNvSpPr txBox="1">
+            <a:spLocks/>
+          </p:cNvSpPr>
+          <p:nvPr/>
+        </p:nvSpPr>
+        <p:spPr bwMode="auto">
+          <a:xfrm>
+            <a:off x="143768" y="1187549"/>
+            <a:ext cx="9793087" cy="432048"/>
+          </a:xfrm>
+          <a:prstGeom prst="rect">
+            <a:avLst/>
+          </a:prstGeom>
+          <a:noFill/>
+          <a:ln w="9525">
+            <a:noFill/>
+            <a:round/>
+            <a:headEnd/>
+            <a:tailEnd/>
+          </a:ln>
+          <a:effectLst/>
+          <a:extLst>
+            <a:ext uri="{909E8E84-426E-40DD-AFC4-6F175D3DCCD1}">
+              <a14:hiddenFill xmlns:a14="http://schemas.microsoft.com/office/drawing/2010/main">
+                <a:solidFill>
+                  <a:srgbClr val="FFFFFF"/>
+                </a:solidFill>
+              </a14:hiddenFill>
+            </a:ext>
+            <a:ext uri="{AF507438-7753-43E0-B8FC-AC1667EBCBE1}">
+              <a14:hiddenEffects xmlns:a14="http://schemas.microsoft.com/office/drawing/2010/main">
+                <a:effectLst>
+                  <a:outerShdw dist="35921" dir="2700000" algn="ctr" rotWithShape="0">
+                    <a:schemeClr val="bg2"/>
+                  </a:outerShdw>
+                </a:effectLst>
+              </a14:hiddenEffects>
+            </a:ext>
+          </a:extLst>
+        </p:spPr>
+        <p:txBody>
+          <a:bodyPr vert="horz" wrap="square" lIns="0" tIns="0" rIns="0" bIns="0" numCol="1" anchor="ctr" anchorCtr="0" compatLnSpc="1">
+            <a:prstTxWarp prst="textNoShape">
+              <a:avLst/>
+            </a:prstTxWarp>
+          </a:bodyPr>
+          <a:lstStyle>
+            <a:lvl1pPr algn="ctr" defTabSz="449263" rtl="0" eaLnBrk="0" fontAlgn="base" hangingPunct="0">
+              <a:lnSpc>
+                <a:spcPct val="93000"/>
+              </a:lnSpc>
+              <a:spcBef>
+                <a:spcPct val="0"/>
+              </a:spcBef>
+              <a:spcAft>
+                <a:spcPct val="0"/>
+              </a:spcAft>
+              <a:buClr>
+                <a:srgbClr val="000000"/>
+              </a:buClr>
+              <a:buSzPct val="100000"/>
+              <a:buFont typeface="Times New Roman" panose="02020603050405020304" pitchFamily="18" charset="0"/>
+              <a:defRPr sz="4000" kern="1200" cap="all" baseline="0">
+                <a:solidFill>
+                  <a:srgbClr val="005EB8"/>
+                </a:solidFill>
+                <a:latin typeface="Technika" panose="00000500000000000000" pitchFamily="2" charset="-18"/>
+                <a:ea typeface="Technika" panose="00000500000000000000" pitchFamily="2" charset="-18"/>
+                <a:cs typeface="Technika" panose="00000500000000000000" pitchFamily="2" charset="-18"/>
+              </a:defRPr>
+            </a:lvl1pPr>
+            <a:lvl2pPr algn="ctr" defTabSz="449263" rtl="0" eaLnBrk="0" fontAlgn="base" hangingPunct="0">
+              <a:lnSpc>
+                <a:spcPct val="93000"/>
+              </a:lnSpc>
+              <a:spcBef>
+                <a:spcPct val="0"/>
+              </a:spcBef>
+              <a:spcAft>
+                <a:spcPct val="0"/>
+              </a:spcAft>
+              <a:buClr>
+                <a:srgbClr val="000000"/>
+              </a:buClr>
+              <a:buSzPct val="100000"/>
+              <a:buFont typeface="Times New Roman" panose="02020603050405020304" pitchFamily="18" charset="0"/>
+              <a:defRPr sz="4400">
+                <a:solidFill>
+                  <a:srgbClr val="000000"/>
+                </a:solidFill>
+                <a:latin typeface="Liberation Sans" panose="020B0604020202020204" pitchFamily="34" charset="0"/>
+                <a:cs typeface="Liberation Sans" panose="020B0604020202020204" pitchFamily="34" charset="0"/>
+              </a:defRPr>
+            </a:lvl2pPr>
+            <a:lvl3pPr algn="ctr" defTabSz="449263" rtl="0" eaLnBrk="0" fontAlgn="base" hangingPunct="0">
+              <a:lnSpc>
+                <a:spcPct val="93000"/>
+              </a:lnSpc>
+              <a:spcBef>
+                <a:spcPct val="0"/>
+              </a:spcBef>
+              <a:spcAft>
+                <a:spcPct val="0"/>
+              </a:spcAft>
+              <a:buClr>
+                <a:srgbClr val="000000"/>
+              </a:buClr>
+              <a:buSzPct val="100000"/>
+              <a:buFont typeface="Times New Roman" panose="02020603050405020304" pitchFamily="18" charset="0"/>
+              <a:defRPr sz="4400">
+                <a:solidFill>
+                  <a:srgbClr val="000000"/>
+                </a:solidFill>
+                <a:latin typeface="Liberation Sans" panose="020B0604020202020204" pitchFamily="34" charset="0"/>
+                <a:cs typeface="Liberation Sans" panose="020B0604020202020204" pitchFamily="34" charset="0"/>
+              </a:defRPr>
+            </a:lvl3pPr>
+            <a:lvl4pPr algn="ctr" defTabSz="449263" rtl="0" eaLnBrk="0" fontAlgn="base" hangingPunct="0">
+              <a:lnSpc>
+                <a:spcPct val="93000"/>
+              </a:lnSpc>
+              <a:spcBef>
+                <a:spcPct val="0"/>
+              </a:spcBef>
+              <a:spcAft>
+                <a:spcPct val="0"/>
+              </a:spcAft>
+              <a:buClr>
+                <a:srgbClr val="000000"/>
+              </a:buClr>
+              <a:buSzPct val="100000"/>
+              <a:buFont typeface="Times New Roman" panose="02020603050405020304" pitchFamily="18" charset="0"/>
+              <a:defRPr sz="4400">
+                <a:solidFill>
+                  <a:srgbClr val="000000"/>
+                </a:solidFill>
+                <a:latin typeface="Liberation Sans" panose="020B0604020202020204" pitchFamily="34" charset="0"/>
+                <a:cs typeface="Liberation Sans" panose="020B0604020202020204" pitchFamily="34" charset="0"/>
+              </a:defRPr>
+            </a:lvl4pPr>
+            <a:lvl5pPr algn="ctr" defTabSz="449263" rtl="0" eaLnBrk="0" fontAlgn="base" hangingPunct="0">
+              <a:lnSpc>
+                <a:spcPct val="93000"/>
+              </a:lnSpc>
+              <a:spcBef>
+                <a:spcPct val="0"/>
+              </a:spcBef>
+              <a:spcAft>
+                <a:spcPct val="0"/>
+              </a:spcAft>
+              <a:buClr>
+                <a:srgbClr val="000000"/>
+              </a:buClr>
+              <a:buSzPct val="100000"/>
+              <a:buFont typeface="Times New Roman" panose="02020603050405020304" pitchFamily="18" charset="0"/>
+              <a:defRPr sz="4400">
+                <a:solidFill>
+                  <a:srgbClr val="000000"/>
+                </a:solidFill>
+                <a:latin typeface="Liberation Sans" panose="020B0604020202020204" pitchFamily="34" charset="0"/>
+                <a:cs typeface="Liberation Sans" panose="020B0604020202020204" pitchFamily="34" charset="0"/>
+              </a:defRPr>
+            </a:lvl5pPr>
+            <a:lvl6pPr marL="2514600" indent="-228600" algn="ctr" defTabSz="449263" rtl="0" fontAlgn="base" hangingPunct="0">
+              <a:lnSpc>
+                <a:spcPct val="93000"/>
+              </a:lnSpc>
+              <a:spcBef>
+                <a:spcPct val="0"/>
+              </a:spcBef>
+              <a:spcAft>
+                <a:spcPct val="0"/>
+              </a:spcAft>
+              <a:buClr>
+                <a:srgbClr val="000000"/>
+              </a:buClr>
+              <a:buSzPct val="100000"/>
+              <a:buFont typeface="Times New Roman" panose="02020603050405020304" pitchFamily="18" charset="0"/>
+              <a:defRPr sz="4400">
+                <a:solidFill>
+                  <a:srgbClr val="000000"/>
+                </a:solidFill>
+                <a:latin typeface="Arial" panose="020B0604020202020204" pitchFamily="34" charset="0"/>
+                <a:cs typeface="WenQuanYi Zen Hei" charset="0"/>
+              </a:defRPr>
+            </a:lvl6pPr>
+            <a:lvl7pPr marL="2971800" indent="-228600" algn="ctr" defTabSz="449263" rtl="0" fontAlgn="base" hangingPunct="0">
+              <a:lnSpc>
+                <a:spcPct val="93000"/>
+              </a:lnSpc>
+              <a:spcBef>
+                <a:spcPct val="0"/>
+              </a:spcBef>
+              <a:spcAft>
+                <a:spcPct val="0"/>
+              </a:spcAft>
+              <a:buClr>
+                <a:srgbClr val="000000"/>
+              </a:buClr>
+              <a:buSzPct val="100000"/>
+              <a:buFont typeface="Times New Roman" panose="02020603050405020304" pitchFamily="18" charset="0"/>
+              <a:defRPr sz="4400">
+                <a:solidFill>
+                  <a:srgbClr val="000000"/>
+                </a:solidFill>
+                <a:latin typeface="Arial" panose="020B0604020202020204" pitchFamily="34" charset="0"/>
+                <a:cs typeface="WenQuanYi Zen Hei" charset="0"/>
+              </a:defRPr>
+            </a:lvl7pPr>
+            <a:lvl8pPr marL="3429000" indent="-228600" algn="ctr" defTabSz="449263" rtl="0" fontAlgn="base" hangingPunct="0">
+              <a:lnSpc>
+                <a:spcPct val="93000"/>
+              </a:lnSpc>
+              <a:spcBef>
+                <a:spcPct val="0"/>
+              </a:spcBef>
+              <a:spcAft>
+                <a:spcPct val="0"/>
+              </a:spcAft>
+              <a:buClr>
+                <a:srgbClr val="000000"/>
+              </a:buClr>
+              <a:buSzPct val="100000"/>
+              <a:buFont typeface="Times New Roman" panose="02020603050405020304" pitchFamily="18" charset="0"/>
+              <a:defRPr sz="4400">
+                <a:solidFill>
+                  <a:srgbClr val="000000"/>
+                </a:solidFill>
+                <a:latin typeface="Arial" panose="020B0604020202020204" pitchFamily="34" charset="0"/>
+                <a:cs typeface="WenQuanYi Zen Hei" charset="0"/>
+              </a:defRPr>
+            </a:lvl8pPr>
+            <a:lvl9pPr marL="3886200" indent="-228600" algn="ctr" defTabSz="449263" rtl="0" fontAlgn="base" hangingPunct="0">
+              <a:lnSpc>
+                <a:spcPct val="93000"/>
+              </a:lnSpc>
+              <a:spcBef>
+                <a:spcPct val="0"/>
+              </a:spcBef>
+              <a:spcAft>
+                <a:spcPct val="0"/>
+              </a:spcAft>
+              <a:buClr>
+                <a:srgbClr val="000000"/>
+              </a:buClr>
+              <a:buSzPct val="100000"/>
+              <a:buFont typeface="Times New Roman" panose="02020603050405020304" pitchFamily="18" charset="0"/>
+              <a:defRPr sz="4400">
+                <a:solidFill>
+                  <a:srgbClr val="000000"/>
+                </a:solidFill>
+                <a:latin typeface="Arial" panose="020B0604020202020204" pitchFamily="34" charset="0"/>
+                <a:cs typeface="WenQuanYi Zen Hei" charset="0"/>
+              </a:defRPr>
+            </a:lvl9pPr>
+          </a:lstStyle>
+          <a:p>
+            <a:r>
+              <a:rPr lang="cs-CZ" sz="2000" b="1" i="1" dirty="0">
+                <a:solidFill>
+                  <a:srgbClr val="E05206"/>
+                </a:solidFill>
+              </a:rPr>
+              <a:t>CPU/FPGA Model</a:t>
+            </a:r>
+          </a:p>
+        </p:txBody>
+      </p:sp>
+    </p:spTree>
+    <p:extLst>
+      <p:ext uri="{BB962C8B-B14F-4D97-AF65-F5344CB8AC3E}">
+        <p14:creationId xmlns:p14="http://schemas.microsoft.com/office/powerpoint/2010/main" val="1991186185"/>
+      </p:ext>
+    </p:extLst>
+  </p:cSld>
+  <p:clrMapOvr>
+    <a:masterClrMapping/>
+  </p:clrMapOvr>
+</p:sld>
+</file>
+
+<file path=ppt/slides/slide7.xml><?xml version="1.0" encoding="utf-8"?>
+<p:sld xmlns:a="http://schemas.openxmlformats.org/drawingml/2006/main" xmlns:r="http://schemas.openxmlformats.org/officeDocument/2006/relationships" xmlns:p="http://schemas.openxmlformats.org/presentationml/2006/main">
+  <p:cSld>
+    <p:spTree>
+      <p:nvGrpSpPr>
+        <p:cNvPr id="1" name=""/>
+        <p:cNvGrpSpPr/>
+        <p:nvPr/>
+      </p:nvGrpSpPr>
+      <p:grpSpPr>
+        <a:xfrm>
+          <a:off x="0" y="0"/>
+          <a:ext cx="0" cy="0"/>
+          <a:chOff x="0" y="0"/>
+          <a:chExt cx="0" cy="0"/>
+        </a:xfrm>
+      </p:grpSpPr>
+      <p:sp>
+        <p:nvSpPr>
           <p:cNvPr id="3" name="Zástupný obsah 2">
             <a:extLst>
               <a:ext uri="{FF2B5EF4-FFF2-40B4-BE49-F238E27FC236}">
@@ -5666,7 +5780,7 @@
 </p:sld>
 </file>
 
-<file path=ppt/slides/slide7.xml><?xml version="1.0" encoding="utf-8"?>
+<file path=ppt/slides/slide8.xml><?xml version="1.0" encoding="utf-8"?>
 <p:sld xmlns:a="http://schemas.openxmlformats.org/drawingml/2006/main" xmlns:r="http://schemas.openxmlformats.org/officeDocument/2006/relationships" xmlns:p="http://schemas.openxmlformats.org/presentationml/2006/main">
   <p:cSld>
     <p:spTree>
@@ -5772,7 +5886,7 @@
 </p:sld>
 </file>
 
-<file path=ppt/slides/slide8.xml><?xml version="1.0" encoding="utf-8"?>
+<file path=ppt/slides/slide9.xml><?xml version="1.0" encoding="utf-8"?>
 <p:sld xmlns:a="http://schemas.openxmlformats.org/drawingml/2006/main" xmlns:r="http://schemas.openxmlformats.org/officeDocument/2006/relationships" xmlns:p="http://schemas.openxmlformats.org/presentationml/2006/main">
   <p:cSld>
     <p:spTree>
@@ -5886,112 +6000,6 @@
     <p:extLst>
       <p:ext uri="{BB962C8B-B14F-4D97-AF65-F5344CB8AC3E}">
         <p14:creationId xmlns:p14="http://schemas.microsoft.com/office/powerpoint/2010/main" val="1952982223"/>
-      </p:ext>
-    </p:extLst>
-  </p:cSld>
-  <p:clrMapOvr>
-    <a:masterClrMapping/>
-  </p:clrMapOvr>
-</p:sld>
-</file>
-
-<file path=ppt/slides/slide9.xml><?xml version="1.0" encoding="utf-8"?>
-<p:sld xmlns:a="http://schemas.openxmlformats.org/drawingml/2006/main" xmlns:r="http://schemas.openxmlformats.org/officeDocument/2006/relationships" xmlns:p="http://schemas.openxmlformats.org/presentationml/2006/main">
-  <p:cSld>
-    <p:spTree>
-      <p:nvGrpSpPr>
-        <p:cNvPr id="1" name=""/>
-        <p:cNvGrpSpPr/>
-        <p:nvPr/>
-      </p:nvGrpSpPr>
-      <p:grpSpPr>
-        <a:xfrm>
-          <a:off x="0" y="0"/>
-          <a:ext cx="0" cy="0"/>
-          <a:chOff x="0" y="0"/>
-          <a:chExt cx="0" cy="0"/>
-        </a:xfrm>
-      </p:grpSpPr>
-      <p:sp>
-        <p:nvSpPr>
-          <p:cNvPr id="4" name="Rectangle 3">
-            <a:extLst>
-              <a:ext uri="{FF2B5EF4-FFF2-40B4-BE49-F238E27FC236}">
-                <a16:creationId xmlns:a16="http://schemas.microsoft.com/office/drawing/2014/main" id="{CBC4BD6D-D679-68FE-29B9-86A257FF02AF}"/>
-              </a:ext>
-            </a:extLst>
-          </p:cNvPr>
-          <p:cNvSpPr/>
-          <p:nvPr/>
-        </p:nvSpPr>
-        <p:spPr bwMode="auto">
-          <a:xfrm>
-            <a:off x="0" y="0"/>
-            <a:ext cx="10080625" cy="7559675"/>
-          </a:xfrm>
-          <a:prstGeom prst="rect">
-            <a:avLst/>
-          </a:prstGeom>
-          <a:solidFill>
-            <a:schemeClr val="tx1"/>
-          </a:solidFill>
-          <a:ln w="9525" cap="flat" cmpd="sng" algn="ctr">
-            <a:solidFill>
-              <a:schemeClr val="tx1"/>
-            </a:solidFill>
-            <a:prstDash val="solid"/>
-            <a:round/>
-            <a:headEnd type="none" w="med" len="med"/>
-            <a:tailEnd type="none" w="med" len="med"/>
-          </a:ln>
-          <a:effectLst/>
-        </p:spPr>
-        <p:txBody>
-          <a:bodyPr vert="horz" wrap="square" lIns="91440" tIns="45720" rIns="91440" bIns="45720" numCol="1" rtlCol="0" anchor="t" anchorCtr="0" compatLnSpc="1">
-            <a:prstTxWarp prst="textNoShape">
-              <a:avLst/>
-            </a:prstTxWarp>
-          </a:bodyPr>
-          <a:lstStyle/>
-          <a:p>
-            <a:pPr marL="0" marR="0" indent="0" algn="l" defTabSz="449263" rtl="0" eaLnBrk="1" fontAlgn="base" latinLnBrk="0" hangingPunct="0">
-              <a:lnSpc>
-                <a:spcPct val="93000"/>
-              </a:lnSpc>
-              <a:spcBef>
-                <a:spcPct val="0"/>
-              </a:spcBef>
-              <a:spcAft>
-                <a:spcPct val="0"/>
-              </a:spcAft>
-              <a:buClr>
-                <a:srgbClr val="000000"/>
-              </a:buClr>
-              <a:buSzPct val="100000"/>
-              <a:buFont typeface="Times New Roman" panose="02020603050405020304" pitchFamily="18" charset="0"/>
-              <a:buNone/>
-              <a:tabLst/>
-            </a:pPr>
-            <a:endParaRPr kumimoji="0" lang="en-CZ" sz="1800" b="0" i="0" u="none" strike="noStrike" cap="none" normalizeH="0" baseline="0" dirty="0">
-              <a:ln>
-                <a:solidFill>
-                  <a:sysClr val="windowText" lastClr="000000"/>
-                </a:solidFill>
-              </a:ln>
-              <a:solidFill>
-                <a:srgbClr val="E05206"/>
-              </a:solidFill>
-              <a:effectLst/>
-              <a:latin typeface="Arial" panose="020B0604020202020204" pitchFamily="34" charset="0"/>
-              <a:cs typeface="WenQuanYi Zen Hei" charset="0"/>
-            </a:endParaRPr>
-          </a:p>
-        </p:txBody>
-      </p:sp>
-    </p:spTree>
-    <p:extLst>
-      <p:ext uri="{BB962C8B-B14F-4D97-AF65-F5344CB8AC3E}">
-        <p14:creationId xmlns:p14="http://schemas.microsoft.com/office/powerpoint/2010/main" val="2061360001"/>
       </p:ext>
     </p:extLst>
   </p:cSld>

</xml_diff>

<commit_message>
prezentace přidán slide master bez číslovače a nastavení nečíslovaných backup slides
</commit_message>
<xml_diff>
--- a/presentation/Zakopal-prezentace.pptx
+++ b/presentation/Zakopal-prezentace.pptx
@@ -3,25 +3,26 @@
 <p:presentation xmlns:a="http://schemas.openxmlformats.org/drawingml/2006/main" xmlns:r="http://schemas.openxmlformats.org/officeDocument/2006/relationships" xmlns:p="http://schemas.openxmlformats.org/presentationml/2006/main" showSpecialPlsOnTitleSld="0" strictFirstAndLastChars="0" saveSubsetFonts="1">
   <p:sldMasterIdLst>
     <p:sldMasterId id="2147483648" r:id="rId1"/>
+    <p:sldMasterId id="2147483654" r:id="rId2"/>
   </p:sldMasterIdLst>
   <p:notesMasterIdLst>
-    <p:notesMasterId r:id="rId16"/>
+    <p:notesMasterId r:id="rId17"/>
   </p:notesMasterIdLst>
   <p:sldIdLst>
-    <p:sldId id="369" r:id="rId2"/>
-    <p:sldId id="371" r:id="rId3"/>
-    <p:sldId id="373" r:id="rId4"/>
-    <p:sldId id="374" r:id="rId5"/>
-    <p:sldId id="376" r:id="rId6"/>
-    <p:sldId id="378" r:id="rId7"/>
-    <p:sldId id="328" r:id="rId8"/>
-    <p:sldId id="377" r:id="rId9"/>
-    <p:sldId id="334" r:id="rId10"/>
-    <p:sldId id="382" r:id="rId11"/>
-    <p:sldId id="381" r:id="rId12"/>
-    <p:sldId id="380" r:id="rId13"/>
-    <p:sldId id="375" r:id="rId14"/>
-    <p:sldId id="379" r:id="rId15"/>
+    <p:sldId id="369" r:id="rId3"/>
+    <p:sldId id="371" r:id="rId4"/>
+    <p:sldId id="373" r:id="rId5"/>
+    <p:sldId id="374" r:id="rId6"/>
+    <p:sldId id="376" r:id="rId7"/>
+    <p:sldId id="378" r:id="rId8"/>
+    <p:sldId id="328" r:id="rId9"/>
+    <p:sldId id="377" r:id="rId10"/>
+    <p:sldId id="334" r:id="rId11"/>
+    <p:sldId id="382" r:id="rId12"/>
+    <p:sldId id="381" r:id="rId13"/>
+    <p:sldId id="380" r:id="rId14"/>
+    <p:sldId id="375" r:id="rId15"/>
+    <p:sldId id="379" r:id="rId16"/>
   </p:sldIdLst>
   <p:sldSz cx="10080625" cy="7559675"/>
   <p:notesSz cx="6797675" cy="9928225"/>
@@ -1162,7 +1163,89 @@
           <a:bodyPr/>
           <a:lstStyle/>
           <a:p>
+            <a:r>
+              <a:rPr lang="en-CZ" dirty="0"/>
+              <a:t>Cost optimized product announcement</a:t>
+            </a:r>
+          </a:p>
+          <a:p>
+            <a:r>
+              <a:rPr lang="en-GB" dirty="0"/>
+              <a:t>https://</a:t>
+            </a:r>
+            <a:r>
+              <a:rPr lang="en-GB" dirty="0" err="1"/>
+              <a:t>www.xilinx.com</a:t>
+            </a:r>
+            <a:r>
+              <a:rPr lang="en-GB" dirty="0"/>
+              <a:t>/publications/presentations/</a:t>
+            </a:r>
+            <a:r>
+              <a:rPr lang="en-GB" dirty="0" err="1"/>
+              <a:t>xilinx</a:t>
+            </a:r>
+            <a:r>
+              <a:rPr lang="en-GB" dirty="0"/>
+              <a:t>-</a:t>
+            </a:r>
+            <a:r>
+              <a:rPr lang="en-GB" dirty="0" err="1"/>
+              <a:t>kria</a:t>
+            </a:r>
+            <a:r>
+              <a:rPr lang="en-GB" dirty="0"/>
+              <a:t>-</a:t>
+            </a:r>
+            <a:r>
+              <a:rPr lang="en-GB" dirty="0" err="1"/>
+              <a:t>som</a:t>
+            </a:r>
+            <a:r>
+              <a:rPr lang="en-GB" dirty="0"/>
+              <a:t>-product-</a:t>
+            </a:r>
+            <a:r>
+              <a:rPr lang="en-GB" dirty="0" err="1"/>
+              <a:t>presentation.pdf</a:t>
+            </a:r>
             <a:endParaRPr lang="en-CZ" dirty="0"/>
+          </a:p>
+          <a:p>
+            <a:endParaRPr lang="en-CZ" dirty="0"/>
+          </a:p>
+          <a:p>
+            <a:r>
+              <a:rPr lang="en-CZ" dirty="0"/>
+              <a:t>Info about roadmap answered by AMD Xilinx Employee</a:t>
+            </a:r>
+          </a:p>
+          <a:p>
+            <a:r>
+              <a:rPr lang="en-GB" dirty="0"/>
+              <a:t>https://</a:t>
+            </a:r>
+            <a:r>
+              <a:rPr lang="en-GB" dirty="0" err="1"/>
+              <a:t>support.xilinx.com</a:t>
+            </a:r>
+            <a:r>
+              <a:rPr lang="en-GB" dirty="0"/>
+              <a:t>/s/question/0D54U000061e1nASAQ/</a:t>
+            </a:r>
+            <a:r>
+              <a:rPr lang="en-GB" dirty="0" err="1"/>
+              <a:t>kria-soms-roadmap?language</a:t>
+            </a:r>
+            <a:r>
+              <a:rPr lang="en-GB" dirty="0"/>
+              <a:t>=</a:t>
+            </a:r>
+            <a:r>
+              <a:rPr lang="en-GB"/>
+              <a:t>en_US</a:t>
+            </a:r>
+            <a:endParaRPr lang="en-CZ"/>
           </a:p>
         </p:txBody>
       </p:sp>
@@ -1189,7 +1272,7 @@
               <a:pPr>
                 <a:defRPr/>
               </a:pPr>
-              <a:t>5</a:t>
+              <a:t>3</a:t>
             </a:fld>
             <a:endParaRPr lang="cs-CZ" altLang="cs-CZ" dirty="0"/>
           </a:p>
@@ -1198,7 +1281,7 @@
     </p:spTree>
     <p:extLst>
       <p:ext uri="{BB962C8B-B14F-4D97-AF65-F5344CB8AC3E}">
-        <p14:creationId xmlns:p14="http://schemas.microsoft.com/office/powerpoint/2010/main" val="975230295"/>
+        <p14:creationId xmlns:p14="http://schemas.microsoft.com/office/powerpoint/2010/main" val="2561843784"/>
       </p:ext>
     </p:extLst>
   </p:cSld>
@@ -1279,6 +1362,96 @@
               <a:pPr>
                 <a:defRPr/>
               </a:pPr>
+              <a:t>5</a:t>
+            </a:fld>
+            <a:endParaRPr lang="cs-CZ" altLang="cs-CZ" dirty="0"/>
+          </a:p>
+        </p:txBody>
+      </p:sp>
+    </p:spTree>
+    <p:extLst>
+      <p:ext uri="{BB962C8B-B14F-4D97-AF65-F5344CB8AC3E}">
+        <p14:creationId xmlns:p14="http://schemas.microsoft.com/office/powerpoint/2010/main" val="975230295"/>
+      </p:ext>
+    </p:extLst>
+  </p:cSld>
+  <p:clrMapOvr>
+    <a:masterClrMapping/>
+  </p:clrMapOvr>
+</p:notes>
+</file>
+
+<file path=ppt/notesSlides/notesSlide3.xml><?xml version="1.0" encoding="utf-8"?>
+<p:notes xmlns:a="http://schemas.openxmlformats.org/drawingml/2006/main" xmlns:r="http://schemas.openxmlformats.org/officeDocument/2006/relationships" xmlns:p="http://schemas.openxmlformats.org/presentationml/2006/main">
+  <p:cSld>
+    <p:spTree>
+      <p:nvGrpSpPr>
+        <p:cNvPr id="1" name=""/>
+        <p:cNvGrpSpPr/>
+        <p:nvPr/>
+      </p:nvGrpSpPr>
+      <p:grpSpPr>
+        <a:xfrm>
+          <a:off x="0" y="0"/>
+          <a:ext cx="0" cy="0"/>
+          <a:chOff x="0" y="0"/>
+          <a:chExt cx="0" cy="0"/>
+        </a:xfrm>
+      </p:grpSpPr>
+      <p:sp>
+        <p:nvSpPr>
+          <p:cNvPr id="2" name="Slide Image Placeholder 1"/>
+          <p:cNvSpPr>
+            <a:spLocks noGrp="1" noRot="1" noChangeAspect="1"/>
+          </p:cNvSpPr>
+          <p:nvPr>
+            <p:ph type="sldImg"/>
+          </p:nvPr>
+        </p:nvSpPr>
+        <p:spPr/>
+      </p:sp>
+      <p:sp>
+        <p:nvSpPr>
+          <p:cNvPr id="3" name="Notes Placeholder 2"/>
+          <p:cNvSpPr>
+            <a:spLocks noGrp="1"/>
+          </p:cNvSpPr>
+          <p:nvPr>
+            <p:ph type="body" idx="1"/>
+          </p:nvPr>
+        </p:nvSpPr>
+        <p:spPr/>
+        <p:txBody>
+          <a:bodyPr/>
+          <a:lstStyle/>
+          <a:p>
+            <a:endParaRPr lang="en-CZ" dirty="0"/>
+          </a:p>
+        </p:txBody>
+      </p:sp>
+      <p:sp>
+        <p:nvSpPr>
+          <p:cNvPr id="4" name="Slide Number Placeholder 3"/>
+          <p:cNvSpPr>
+            <a:spLocks noGrp="1"/>
+          </p:cNvSpPr>
+          <p:nvPr>
+            <p:ph type="sldNum"/>
+          </p:nvPr>
+        </p:nvSpPr>
+        <p:spPr/>
+        <p:txBody>
+          <a:bodyPr/>
+          <a:lstStyle/>
+          <a:p>
+            <a:pPr>
+              <a:defRPr/>
+            </a:pPr>
+            <a:fld id="{8598801B-DE11-45C9-A143-93468F8D5D2F}" type="slidenum">
+              <a:rPr lang="cs-CZ" altLang="cs-CZ" smtClean="0"/>
+              <a:pPr>
+                <a:defRPr/>
+              </a:pPr>
               <a:t>6</a:t>
             </a:fld>
             <a:endParaRPr lang="cs-CZ" altLang="cs-CZ" dirty="0"/>
@@ -1298,7 +1471,7 @@
 </p:notes>
 </file>
 
-<file path=ppt/notesSlides/notesSlide3.xml><?xml version="1.0" encoding="utf-8"?>
+<file path=ppt/notesSlides/notesSlide4.xml><?xml version="1.0" encoding="utf-8"?>
 <p:notes xmlns:a="http://schemas.openxmlformats.org/drawingml/2006/main" xmlns:r="http://schemas.openxmlformats.org/officeDocument/2006/relationships" xmlns:p="http://schemas.openxmlformats.org/presentationml/2006/main">
   <p:cSld>
     <p:spTree>
@@ -2018,6 +2191,455 @@
     <p:extLst>
       <p:ext uri="{BB962C8B-B14F-4D97-AF65-F5344CB8AC3E}">
         <p14:creationId xmlns:p14="http://schemas.microsoft.com/office/powerpoint/2010/main" val="2870526811"/>
+      </p:ext>
+    </p:extLst>
+  </p:cSld>
+  <p:clrMapOvr>
+    <a:masterClrMapping/>
+  </p:clrMapOvr>
+</p:sldLayout>
+</file>
+
+<file path=ppt/slideLayouts/slideLayout4.xml><?xml version="1.0" encoding="utf-8"?>
+<p:sldLayout xmlns:a="http://schemas.openxmlformats.org/drawingml/2006/main" xmlns:r="http://schemas.openxmlformats.org/officeDocument/2006/relationships" xmlns:p="http://schemas.openxmlformats.org/presentationml/2006/main" type="title" preserve="1">
+  <p:cSld name="Úvodní snímek">
+    <p:spTree>
+      <p:nvGrpSpPr>
+        <p:cNvPr id="1" name=""/>
+        <p:cNvGrpSpPr/>
+        <p:nvPr/>
+      </p:nvGrpSpPr>
+      <p:grpSpPr>
+        <a:xfrm>
+          <a:off x="0" y="0"/>
+          <a:ext cx="0" cy="0"/>
+          <a:chOff x="0" y="0"/>
+          <a:chExt cx="0" cy="0"/>
+        </a:xfrm>
+      </p:grpSpPr>
+      <p:sp>
+        <p:nvSpPr>
+          <p:cNvPr id="2" name="Nadpis 1">
+            <a:extLst>
+              <a:ext uri="{FF2B5EF4-FFF2-40B4-BE49-F238E27FC236}">
+                <a16:creationId xmlns:a16="http://schemas.microsoft.com/office/drawing/2014/main" id="{AAB1AD00-0ED1-4805-B41C-83D7E9E7FC45}"/>
+              </a:ext>
+            </a:extLst>
+          </p:cNvPr>
+          <p:cNvSpPr>
+            <a:spLocks noGrp="1"/>
+          </p:cNvSpPr>
+          <p:nvPr>
+            <p:ph type="ctrTitle"/>
+          </p:nvPr>
+        </p:nvSpPr>
+        <p:spPr>
+          <a:xfrm>
+            <a:off x="1260475" y="467469"/>
+            <a:ext cx="7559675" cy="2952327"/>
+          </a:xfrm>
+        </p:spPr>
+        <p:txBody>
+          <a:bodyPr anchor="ctr" anchorCtr="0"/>
+          <a:lstStyle>
+            <a:lvl1pPr algn="ctr">
+              <a:defRPr sz="4000" cap="all" baseline="0">
+                <a:solidFill>
+                  <a:srgbClr val="005EB8"/>
+                </a:solidFill>
+              </a:defRPr>
+            </a:lvl1pPr>
+          </a:lstStyle>
+          <a:p>
+            <a:r>
+              <a:rPr lang="cs-CZ" dirty="0"/>
+              <a:t>Kliknutím lze upravit styl.</a:t>
+            </a:r>
+          </a:p>
+        </p:txBody>
+      </p:sp>
+      <p:sp>
+        <p:nvSpPr>
+          <p:cNvPr id="3" name="Podnadpis 2">
+            <a:extLst>
+              <a:ext uri="{FF2B5EF4-FFF2-40B4-BE49-F238E27FC236}">
+                <a16:creationId xmlns:a16="http://schemas.microsoft.com/office/drawing/2014/main" id="{3CD36FE8-72CF-49E9-8AD3-1847240B6B3B}"/>
+              </a:ext>
+            </a:extLst>
+          </p:cNvPr>
+          <p:cNvSpPr>
+            <a:spLocks noGrp="1"/>
+          </p:cNvSpPr>
+          <p:nvPr>
+            <p:ph type="subTitle" idx="1"/>
+          </p:nvPr>
+        </p:nvSpPr>
+        <p:spPr>
+          <a:xfrm>
+            <a:off x="1260475" y="3779837"/>
+            <a:ext cx="7559675" cy="3384376"/>
+          </a:xfrm>
+        </p:spPr>
+        <p:txBody>
+          <a:bodyPr/>
+          <a:lstStyle>
+            <a:lvl1pPr marL="0" indent="0" algn="ctr">
+              <a:buNone/>
+              <a:defRPr sz="2400"/>
+            </a:lvl1pPr>
+            <a:lvl2pPr marL="457200" indent="0" algn="ctr">
+              <a:buNone/>
+              <a:defRPr sz="2000"/>
+            </a:lvl2pPr>
+            <a:lvl3pPr marL="914400" indent="0" algn="ctr">
+              <a:buNone/>
+              <a:defRPr sz="1800"/>
+            </a:lvl3pPr>
+            <a:lvl4pPr marL="1371600" indent="0" algn="ctr">
+              <a:buNone/>
+              <a:defRPr sz="1600"/>
+            </a:lvl4pPr>
+            <a:lvl5pPr marL="1828800" indent="0" algn="ctr">
+              <a:buNone/>
+              <a:defRPr sz="1600"/>
+            </a:lvl5pPr>
+            <a:lvl6pPr marL="2286000" indent="0" algn="ctr">
+              <a:buNone/>
+              <a:defRPr sz="1600"/>
+            </a:lvl6pPr>
+            <a:lvl7pPr marL="2743200" indent="0" algn="ctr">
+              <a:buNone/>
+              <a:defRPr sz="1600"/>
+            </a:lvl7pPr>
+            <a:lvl8pPr marL="3200400" indent="0" algn="ctr">
+              <a:buNone/>
+              <a:defRPr sz="1600"/>
+            </a:lvl8pPr>
+            <a:lvl9pPr marL="3657600" indent="0" algn="ctr">
+              <a:buNone/>
+              <a:defRPr sz="1600"/>
+            </a:lvl9pPr>
+          </a:lstStyle>
+          <a:p>
+            <a:r>
+              <a:rPr lang="cs-CZ" dirty="0"/>
+              <a:t>Kliknutím můžete upravit styl předlohy.</a:t>
+            </a:r>
+          </a:p>
+        </p:txBody>
+      </p:sp>
+      <p:sp>
+        <p:nvSpPr>
+          <p:cNvPr id="4" name="TextovéPole 3">
+            <a:extLst>
+              <a:ext uri="{FF2B5EF4-FFF2-40B4-BE49-F238E27FC236}">
+                <a16:creationId xmlns:a16="http://schemas.microsoft.com/office/drawing/2014/main" id="{DA7D8BE0-E26E-FABB-A2BD-41E9F6E5040A}"/>
+              </a:ext>
+            </a:extLst>
+          </p:cNvPr>
+          <p:cNvSpPr txBox="1"/>
+          <p:nvPr userDrawn="1"/>
+        </p:nvSpPr>
+        <p:spPr>
+          <a:xfrm>
+            <a:off x="8424688" y="7251897"/>
+            <a:ext cx="720080" cy="307777"/>
+          </a:xfrm>
+          <a:prstGeom prst="rect">
+            <a:avLst/>
+          </a:prstGeom>
+          <a:solidFill>
+            <a:srgbClr val="0065BD"/>
+          </a:solidFill>
+        </p:spPr>
+        <p:txBody>
+          <a:bodyPr wrap="square" rtlCol="0">
+            <a:spAutoFit/>
+          </a:bodyPr>
+          <a:lstStyle/>
+          <a:p>
+            <a:pPr algn="l"/>
+            <a:endParaRPr lang="cs-CZ" sz="1400" b="1" dirty="0">
+              <a:solidFill>
+                <a:schemeClr val="bg1"/>
+              </a:solidFill>
+              <a:latin typeface="Technika" panose="00000500000000000000" pitchFamily="2" charset="-18"/>
+            </a:endParaRPr>
+          </a:p>
+        </p:txBody>
+      </p:sp>
+    </p:spTree>
+    <p:extLst>
+      <p:ext uri="{BB962C8B-B14F-4D97-AF65-F5344CB8AC3E}">
+        <p14:creationId xmlns:p14="http://schemas.microsoft.com/office/powerpoint/2010/main" val="3404550350"/>
+      </p:ext>
+    </p:extLst>
+  </p:cSld>
+  <p:clrMapOvr>
+    <a:masterClrMapping/>
+  </p:clrMapOvr>
+</p:sldLayout>
+</file>
+
+<file path=ppt/slideLayouts/slideLayout5.xml><?xml version="1.0" encoding="utf-8"?>
+<p:sldLayout xmlns:a="http://schemas.openxmlformats.org/drawingml/2006/main" xmlns:r="http://schemas.openxmlformats.org/officeDocument/2006/relationships" xmlns:p="http://schemas.openxmlformats.org/presentationml/2006/main" type="obj">
+  <p:cSld name="Nadpis a obsah">
+    <p:spTree>
+      <p:nvGrpSpPr>
+        <p:cNvPr id="1" name=""/>
+        <p:cNvGrpSpPr/>
+        <p:nvPr/>
+      </p:nvGrpSpPr>
+      <p:grpSpPr>
+        <a:xfrm>
+          <a:off x="0" y="0"/>
+          <a:ext cx="0" cy="0"/>
+          <a:chOff x="0" y="0"/>
+          <a:chExt cx="0" cy="0"/>
+        </a:xfrm>
+      </p:grpSpPr>
+      <p:sp>
+        <p:nvSpPr>
+          <p:cNvPr id="2" name="Nadpis 1">
+            <a:extLst>
+              <a:ext uri="{FF2B5EF4-FFF2-40B4-BE49-F238E27FC236}">
+                <a16:creationId xmlns:a16="http://schemas.microsoft.com/office/drawing/2014/main" id="{0FE5F38E-A8D0-4A4F-A0AE-02958F61D67F}"/>
+              </a:ext>
+            </a:extLst>
+          </p:cNvPr>
+          <p:cNvSpPr>
+            <a:spLocks noGrp="1"/>
+          </p:cNvSpPr>
+          <p:nvPr>
+            <p:ph type="title"/>
+          </p:nvPr>
+        </p:nvSpPr>
+        <p:spPr/>
+        <p:txBody>
+          <a:bodyPr/>
+          <a:lstStyle>
+            <a:lvl1pPr>
+              <a:defRPr>
+                <a:solidFill>
+                  <a:srgbClr val="005EB8"/>
+                </a:solidFill>
+              </a:defRPr>
+            </a:lvl1pPr>
+          </a:lstStyle>
+          <a:p>
+            <a:r>
+              <a:rPr lang="cs-CZ" dirty="0"/>
+              <a:t>Kliknutím lze upravit styl.</a:t>
+            </a:r>
+          </a:p>
+        </p:txBody>
+      </p:sp>
+      <p:sp>
+        <p:nvSpPr>
+          <p:cNvPr id="3" name="Zástupný obsah 2">
+            <a:extLst>
+              <a:ext uri="{FF2B5EF4-FFF2-40B4-BE49-F238E27FC236}">
+                <a16:creationId xmlns:a16="http://schemas.microsoft.com/office/drawing/2014/main" id="{30171D2A-346B-4676-9A7F-0E7C54DDEE2D}"/>
+              </a:ext>
+            </a:extLst>
+          </p:cNvPr>
+          <p:cNvSpPr>
+            <a:spLocks noGrp="1"/>
+          </p:cNvSpPr>
+          <p:nvPr>
+            <p:ph idx="1"/>
+          </p:nvPr>
+        </p:nvSpPr>
+        <p:spPr/>
+        <p:txBody>
+          <a:bodyPr/>
+          <a:lstStyle>
+            <a:lvl1pPr marL="284400" indent="-284400">
+              <a:buClrTx/>
+              <a:buSzPct val="110000"/>
+              <a:buFont typeface="Arial" panose="020B0604020202020204" pitchFamily="34" charset="0"/>
+              <a:buChar char="•"/>
+              <a:defRPr lang="cs-CZ" altLang="cs-CZ" sz="2000" kern="1200" noProof="0" dirty="0">
+                <a:solidFill>
+                  <a:schemeClr val="tx1"/>
+                </a:solidFill>
+                <a:latin typeface="Cambria" panose="02040503050406030204" pitchFamily="18" charset="0"/>
+                <a:ea typeface="Cambria" panose="02040503050406030204" pitchFamily="18" charset="0"/>
+                <a:cs typeface="Cambria" panose="02040503050406030204" pitchFamily="18" charset="0"/>
+              </a:defRPr>
+            </a:lvl1pPr>
+            <a:lvl2pPr marL="1085850" indent="-342900">
+              <a:buClrTx/>
+              <a:buSzPct val="100000"/>
+              <a:buFont typeface="Arial" panose="020B0604020202020204" pitchFamily="34" charset="0"/>
+              <a:buChar char="•"/>
+              <a:defRPr lang="cs-CZ" altLang="cs-CZ" sz="1900" kern="1200" noProof="0" dirty="0">
+                <a:solidFill>
+                  <a:schemeClr val="tx1"/>
+                </a:solidFill>
+                <a:latin typeface="Cambria" panose="02040503050406030204" pitchFamily="18" charset="0"/>
+                <a:ea typeface="Cambria" panose="02040503050406030204" pitchFamily="18" charset="0"/>
+                <a:cs typeface="Cambria" panose="02040503050406030204" pitchFamily="18" charset="0"/>
+              </a:defRPr>
+            </a:lvl2pPr>
+            <a:lvl3pPr marL="1543050" indent="-342900">
+              <a:buClrTx/>
+              <a:buSzPct val="100000"/>
+              <a:buFont typeface="Arial" panose="020B0604020202020204" pitchFamily="34" charset="0"/>
+              <a:buChar char="•"/>
+              <a:defRPr lang="cs-CZ" altLang="cs-CZ" sz="1900" kern="1200" noProof="0" dirty="0">
+                <a:solidFill>
+                  <a:schemeClr val="tx1"/>
+                </a:solidFill>
+                <a:latin typeface="Cambria" panose="02040503050406030204" pitchFamily="18" charset="0"/>
+                <a:ea typeface="Cambria" panose="02040503050406030204" pitchFamily="18" charset="0"/>
+                <a:cs typeface="Cambria" panose="02040503050406030204" pitchFamily="18" charset="0"/>
+              </a:defRPr>
+            </a:lvl3pPr>
+            <a:lvl4pPr marL="1943100" indent="-284400">
+              <a:buClrTx/>
+              <a:buSzPct val="100000"/>
+              <a:buFont typeface="Arial" panose="020B0604020202020204" pitchFamily="34" charset="0"/>
+              <a:buChar char="•"/>
+              <a:defRPr lang="cs-CZ" altLang="cs-CZ" sz="1800" kern="1200" noProof="0" dirty="0">
+                <a:solidFill>
+                  <a:schemeClr val="tx1"/>
+                </a:solidFill>
+                <a:latin typeface="Cambria" panose="02040503050406030204" pitchFamily="18" charset="0"/>
+                <a:ea typeface="Cambria" panose="02040503050406030204" pitchFamily="18" charset="0"/>
+                <a:cs typeface="Cambria" panose="02040503050406030204" pitchFamily="18" charset="0"/>
+              </a:defRPr>
+            </a:lvl4pPr>
+            <a:lvl5pPr marL="2400300" indent="-284400">
+              <a:buClrTx/>
+              <a:buSzPct val="100000"/>
+              <a:buFont typeface="Arial" panose="020B0604020202020204" pitchFamily="34" charset="0"/>
+              <a:buChar char="•"/>
+              <a:defRPr lang="cs-CZ" altLang="cs-CZ" sz="1800" kern="1200" noProof="0" dirty="0">
+                <a:solidFill>
+                  <a:schemeClr val="tx1"/>
+                </a:solidFill>
+                <a:latin typeface="Cambria" panose="02040503050406030204" pitchFamily="18" charset="0"/>
+                <a:ea typeface="Cambria" panose="02040503050406030204" pitchFamily="18" charset="0"/>
+                <a:cs typeface="Cambria" panose="02040503050406030204" pitchFamily="18" charset="0"/>
+              </a:defRPr>
+            </a:lvl5pPr>
+          </a:lstStyle>
+          <a:p>
+            <a:pPr marL="285750" lvl="0" indent="-285750" algn="just" defTabSz="449263" rtl="0" eaLnBrk="0" fontAlgn="base" hangingPunct="0">
+              <a:lnSpc>
+                <a:spcPct val="100000"/>
+              </a:lnSpc>
+              <a:spcBef>
+                <a:spcPts val="600"/>
+              </a:spcBef>
+              <a:spcAft>
+                <a:spcPts val="600"/>
+              </a:spcAft>
+              <a:buClrTx/>
+              <a:buSzPct val="110000"/>
+              <a:buFont typeface="Arial" panose="020B0604020202020204" pitchFamily="34" charset="0"/>
+              <a:buChar char="•"/>
+            </a:pPr>
+            <a:r>
+              <a:rPr lang="cs-CZ" dirty="0"/>
+              <a:t>Po kliknutí můžete upravovat styly textu v předloze.</a:t>
+            </a:r>
+          </a:p>
+          <a:p>
+            <a:pPr marL="1028700" lvl="1" indent="-285750" algn="just" defTabSz="449263" rtl="0" eaLnBrk="0" fontAlgn="base" hangingPunct="0">
+              <a:lnSpc>
+                <a:spcPct val="100000"/>
+              </a:lnSpc>
+              <a:spcBef>
+                <a:spcPts val="600"/>
+              </a:spcBef>
+              <a:spcAft>
+                <a:spcPts val="600"/>
+              </a:spcAft>
+              <a:buClrTx/>
+              <a:buSzPct val="100000"/>
+              <a:buFont typeface="Arial" panose="020B0604020202020204" pitchFamily="34" charset="0"/>
+              <a:buChar char="•"/>
+            </a:pPr>
+            <a:r>
+              <a:rPr lang="cs-CZ" dirty="0"/>
+              <a:t>Druhá úroveň</a:t>
+            </a:r>
+          </a:p>
+          <a:p>
+            <a:pPr marL="1485900" lvl="2" indent="-285750" algn="just" defTabSz="449263" rtl="0" eaLnBrk="0" fontAlgn="base" hangingPunct="0">
+              <a:lnSpc>
+                <a:spcPct val="100000"/>
+              </a:lnSpc>
+              <a:spcBef>
+                <a:spcPts val="600"/>
+              </a:spcBef>
+              <a:spcAft>
+                <a:spcPts val="600"/>
+              </a:spcAft>
+              <a:buClrTx/>
+              <a:buSzPct val="100000"/>
+              <a:buFont typeface="Arial" panose="020B0604020202020204" pitchFamily="34" charset="0"/>
+              <a:buChar char="•"/>
+            </a:pPr>
+            <a:r>
+              <a:rPr lang="cs-CZ" dirty="0"/>
+              <a:t>Třetí úroveň</a:t>
+            </a:r>
+          </a:p>
+          <a:p>
+            <a:pPr marL="1885950" lvl="3" indent="-285750" algn="just" defTabSz="449263" rtl="0" eaLnBrk="0" fontAlgn="base" hangingPunct="0">
+              <a:lnSpc>
+                <a:spcPct val="100000"/>
+              </a:lnSpc>
+              <a:spcBef>
+                <a:spcPts val="600"/>
+              </a:spcBef>
+              <a:spcAft>
+                <a:spcPts val="600"/>
+              </a:spcAft>
+              <a:buClrTx/>
+              <a:buSzPct val="100000"/>
+              <a:buFont typeface="Arial" panose="020B0604020202020204" pitchFamily="34" charset="0"/>
+              <a:buChar char="•"/>
+            </a:pPr>
+            <a:r>
+              <a:rPr lang="cs-CZ" dirty="0"/>
+              <a:t>Čtvrtá úroveň</a:t>
+            </a:r>
+          </a:p>
+          <a:p>
+            <a:pPr marL="2343150" lvl="4" indent="-285750" algn="just" defTabSz="449263" rtl="0" eaLnBrk="0" fontAlgn="base" hangingPunct="0">
+              <a:lnSpc>
+                <a:spcPct val="100000"/>
+              </a:lnSpc>
+              <a:spcBef>
+                <a:spcPts val="600"/>
+              </a:spcBef>
+              <a:spcAft>
+                <a:spcPts val="600"/>
+              </a:spcAft>
+              <a:buClrTx/>
+              <a:buSzPct val="100000"/>
+              <a:buFont typeface="Arial" panose="020B0604020202020204" pitchFamily="34" charset="0"/>
+              <a:buChar char="•"/>
+            </a:pPr>
+            <a:r>
+              <a:rPr lang="cs-CZ" dirty="0"/>
+              <a:t>Pátá úroveň</a:t>
+            </a:r>
+          </a:p>
+          <a:p>
+            <a:pPr lvl="0"/>
+            <a:endParaRPr lang="cs-CZ" dirty="0"/>
+          </a:p>
+        </p:txBody>
+      </p:sp>
+    </p:spTree>
+    <p:extLst>
+      <p:ext uri="{BB962C8B-B14F-4D97-AF65-F5344CB8AC3E}">
+        <p14:creationId xmlns:p14="http://schemas.microsoft.com/office/powerpoint/2010/main" val="657891222"/>
       </p:ext>
     </p:extLst>
   </p:cSld>
@@ -2420,6 +3042,856 @@
     <p:sldLayoutId id="2147483650" r:id="rId1"/>
     <p:sldLayoutId id="2147483651" r:id="rId2"/>
     <p:sldLayoutId id="2147483653" r:id="rId3"/>
+  </p:sldLayoutIdLst>
+  <p:hf hdr="0" ftr="0" dt="0"/>
+  <p:txStyles>
+    <p:titleStyle>
+      <a:lvl1pPr algn="ctr" defTabSz="449263" rtl="0" eaLnBrk="0" fontAlgn="base" hangingPunct="0">
+        <a:lnSpc>
+          <a:spcPct val="93000"/>
+        </a:lnSpc>
+        <a:spcBef>
+          <a:spcPct val="0"/>
+        </a:spcBef>
+        <a:spcAft>
+          <a:spcPct val="0"/>
+        </a:spcAft>
+        <a:buClr>
+          <a:srgbClr val="000000"/>
+        </a:buClr>
+        <a:buSzPct val="100000"/>
+        <a:buFont typeface="Times New Roman" panose="02020603050405020304" pitchFamily="18" charset="0"/>
+        <a:defRPr sz="4000" kern="1200">
+          <a:solidFill>
+            <a:srgbClr val="0065BD"/>
+          </a:solidFill>
+          <a:latin typeface="Technika" panose="00000500000000000000" pitchFamily="2" charset="-18"/>
+          <a:ea typeface="Technika" panose="00000500000000000000" pitchFamily="2" charset="-18"/>
+          <a:cs typeface="Technika" panose="00000500000000000000" pitchFamily="2" charset="-18"/>
+        </a:defRPr>
+      </a:lvl1pPr>
+      <a:lvl2pPr algn="ctr" defTabSz="449263" rtl="0" eaLnBrk="0" fontAlgn="base" hangingPunct="0">
+        <a:lnSpc>
+          <a:spcPct val="93000"/>
+        </a:lnSpc>
+        <a:spcBef>
+          <a:spcPct val="0"/>
+        </a:spcBef>
+        <a:spcAft>
+          <a:spcPct val="0"/>
+        </a:spcAft>
+        <a:buClr>
+          <a:srgbClr val="000000"/>
+        </a:buClr>
+        <a:buSzPct val="100000"/>
+        <a:buFont typeface="Times New Roman" panose="02020603050405020304" pitchFamily="18" charset="0"/>
+        <a:defRPr sz="4400">
+          <a:solidFill>
+            <a:srgbClr val="000000"/>
+          </a:solidFill>
+          <a:latin typeface="Liberation Sans" panose="020B0604020202020204" pitchFamily="34" charset="0"/>
+          <a:cs typeface="Liberation Sans" panose="020B0604020202020204" pitchFamily="34" charset="0"/>
+        </a:defRPr>
+      </a:lvl2pPr>
+      <a:lvl3pPr algn="ctr" defTabSz="449263" rtl="0" eaLnBrk="0" fontAlgn="base" hangingPunct="0">
+        <a:lnSpc>
+          <a:spcPct val="93000"/>
+        </a:lnSpc>
+        <a:spcBef>
+          <a:spcPct val="0"/>
+        </a:spcBef>
+        <a:spcAft>
+          <a:spcPct val="0"/>
+        </a:spcAft>
+        <a:buClr>
+          <a:srgbClr val="000000"/>
+        </a:buClr>
+        <a:buSzPct val="100000"/>
+        <a:buFont typeface="Times New Roman" panose="02020603050405020304" pitchFamily="18" charset="0"/>
+        <a:defRPr sz="4400">
+          <a:solidFill>
+            <a:srgbClr val="000000"/>
+          </a:solidFill>
+          <a:latin typeface="Liberation Sans" panose="020B0604020202020204" pitchFamily="34" charset="0"/>
+          <a:cs typeface="Liberation Sans" panose="020B0604020202020204" pitchFamily="34" charset="0"/>
+        </a:defRPr>
+      </a:lvl3pPr>
+      <a:lvl4pPr algn="ctr" defTabSz="449263" rtl="0" eaLnBrk="0" fontAlgn="base" hangingPunct="0">
+        <a:lnSpc>
+          <a:spcPct val="93000"/>
+        </a:lnSpc>
+        <a:spcBef>
+          <a:spcPct val="0"/>
+        </a:spcBef>
+        <a:spcAft>
+          <a:spcPct val="0"/>
+        </a:spcAft>
+        <a:buClr>
+          <a:srgbClr val="000000"/>
+        </a:buClr>
+        <a:buSzPct val="100000"/>
+        <a:buFont typeface="Times New Roman" panose="02020603050405020304" pitchFamily="18" charset="0"/>
+        <a:defRPr sz="4400">
+          <a:solidFill>
+            <a:srgbClr val="000000"/>
+          </a:solidFill>
+          <a:latin typeface="Liberation Sans" panose="020B0604020202020204" pitchFamily="34" charset="0"/>
+          <a:cs typeface="Liberation Sans" panose="020B0604020202020204" pitchFamily="34" charset="0"/>
+        </a:defRPr>
+      </a:lvl4pPr>
+      <a:lvl5pPr algn="ctr" defTabSz="449263" rtl="0" eaLnBrk="0" fontAlgn="base" hangingPunct="0">
+        <a:lnSpc>
+          <a:spcPct val="93000"/>
+        </a:lnSpc>
+        <a:spcBef>
+          <a:spcPct val="0"/>
+        </a:spcBef>
+        <a:spcAft>
+          <a:spcPct val="0"/>
+        </a:spcAft>
+        <a:buClr>
+          <a:srgbClr val="000000"/>
+        </a:buClr>
+        <a:buSzPct val="100000"/>
+        <a:buFont typeface="Times New Roman" panose="02020603050405020304" pitchFamily="18" charset="0"/>
+        <a:defRPr sz="4400">
+          <a:solidFill>
+            <a:srgbClr val="000000"/>
+          </a:solidFill>
+          <a:latin typeface="Liberation Sans" panose="020B0604020202020204" pitchFamily="34" charset="0"/>
+          <a:cs typeface="Liberation Sans" panose="020B0604020202020204" pitchFamily="34" charset="0"/>
+        </a:defRPr>
+      </a:lvl5pPr>
+      <a:lvl6pPr marL="2514600" indent="-228600" algn="ctr" defTabSz="449263" rtl="0" fontAlgn="base" hangingPunct="0">
+        <a:lnSpc>
+          <a:spcPct val="93000"/>
+        </a:lnSpc>
+        <a:spcBef>
+          <a:spcPct val="0"/>
+        </a:spcBef>
+        <a:spcAft>
+          <a:spcPct val="0"/>
+        </a:spcAft>
+        <a:buClr>
+          <a:srgbClr val="000000"/>
+        </a:buClr>
+        <a:buSzPct val="100000"/>
+        <a:buFont typeface="Times New Roman" panose="02020603050405020304" pitchFamily="18" charset="0"/>
+        <a:defRPr sz="4400">
+          <a:solidFill>
+            <a:srgbClr val="000000"/>
+          </a:solidFill>
+          <a:latin typeface="Arial" panose="020B0604020202020204" pitchFamily="34" charset="0"/>
+          <a:cs typeface="WenQuanYi Zen Hei" charset="0"/>
+        </a:defRPr>
+      </a:lvl6pPr>
+      <a:lvl7pPr marL="2971800" indent="-228600" algn="ctr" defTabSz="449263" rtl="0" fontAlgn="base" hangingPunct="0">
+        <a:lnSpc>
+          <a:spcPct val="93000"/>
+        </a:lnSpc>
+        <a:spcBef>
+          <a:spcPct val="0"/>
+        </a:spcBef>
+        <a:spcAft>
+          <a:spcPct val="0"/>
+        </a:spcAft>
+        <a:buClr>
+          <a:srgbClr val="000000"/>
+        </a:buClr>
+        <a:buSzPct val="100000"/>
+        <a:buFont typeface="Times New Roman" panose="02020603050405020304" pitchFamily="18" charset="0"/>
+        <a:defRPr sz="4400">
+          <a:solidFill>
+            <a:srgbClr val="000000"/>
+          </a:solidFill>
+          <a:latin typeface="Arial" panose="020B0604020202020204" pitchFamily="34" charset="0"/>
+          <a:cs typeface="WenQuanYi Zen Hei" charset="0"/>
+        </a:defRPr>
+      </a:lvl7pPr>
+      <a:lvl8pPr marL="3429000" indent="-228600" algn="ctr" defTabSz="449263" rtl="0" fontAlgn="base" hangingPunct="0">
+        <a:lnSpc>
+          <a:spcPct val="93000"/>
+        </a:lnSpc>
+        <a:spcBef>
+          <a:spcPct val="0"/>
+        </a:spcBef>
+        <a:spcAft>
+          <a:spcPct val="0"/>
+        </a:spcAft>
+        <a:buClr>
+          <a:srgbClr val="000000"/>
+        </a:buClr>
+        <a:buSzPct val="100000"/>
+        <a:buFont typeface="Times New Roman" panose="02020603050405020304" pitchFamily="18" charset="0"/>
+        <a:defRPr sz="4400">
+          <a:solidFill>
+            <a:srgbClr val="000000"/>
+          </a:solidFill>
+          <a:latin typeface="Arial" panose="020B0604020202020204" pitchFamily="34" charset="0"/>
+          <a:cs typeface="WenQuanYi Zen Hei" charset="0"/>
+        </a:defRPr>
+      </a:lvl8pPr>
+      <a:lvl9pPr marL="3886200" indent="-228600" algn="ctr" defTabSz="449263" rtl="0" fontAlgn="base" hangingPunct="0">
+        <a:lnSpc>
+          <a:spcPct val="93000"/>
+        </a:lnSpc>
+        <a:spcBef>
+          <a:spcPct val="0"/>
+        </a:spcBef>
+        <a:spcAft>
+          <a:spcPct val="0"/>
+        </a:spcAft>
+        <a:buClr>
+          <a:srgbClr val="000000"/>
+        </a:buClr>
+        <a:buSzPct val="100000"/>
+        <a:buFont typeface="Times New Roman" panose="02020603050405020304" pitchFamily="18" charset="0"/>
+        <a:defRPr sz="4400">
+          <a:solidFill>
+            <a:srgbClr val="000000"/>
+          </a:solidFill>
+          <a:latin typeface="Arial" panose="020B0604020202020204" pitchFamily="34" charset="0"/>
+          <a:cs typeface="WenQuanYi Zen Hei" charset="0"/>
+        </a:defRPr>
+      </a:lvl9pPr>
+    </p:titleStyle>
+    <p:bodyStyle>
+      <a:lvl1pPr marL="285750" indent="-285750" algn="just" defTabSz="449263" rtl="0" eaLnBrk="0" fontAlgn="base" hangingPunct="0">
+        <a:lnSpc>
+          <a:spcPct val="100000"/>
+        </a:lnSpc>
+        <a:spcBef>
+          <a:spcPts val="600"/>
+        </a:spcBef>
+        <a:spcAft>
+          <a:spcPts val="600"/>
+        </a:spcAft>
+        <a:buClrTx/>
+        <a:buSzPct val="110000"/>
+        <a:buFont typeface="Arial" panose="020B0604020202020204" pitchFamily="34" charset="0"/>
+        <a:buChar char="•"/>
+        <a:defRPr lang="en-US" altLang="cs-CZ" sz="2000" kern="1200" noProof="0" dirty="0" smtClean="0">
+          <a:solidFill>
+            <a:schemeClr val="tx1"/>
+          </a:solidFill>
+          <a:latin typeface="Cambria" panose="02040503050406030204" pitchFamily="18" charset="0"/>
+          <a:ea typeface="Cambria" panose="02040503050406030204" pitchFamily="18" charset="0"/>
+          <a:cs typeface="Cambria" panose="02040503050406030204" pitchFamily="18" charset="0"/>
+        </a:defRPr>
+      </a:lvl1pPr>
+      <a:lvl2pPr marL="1028700" indent="-285750" algn="just" defTabSz="449263" rtl="0" eaLnBrk="0" fontAlgn="base" hangingPunct="0">
+        <a:lnSpc>
+          <a:spcPct val="100000"/>
+        </a:lnSpc>
+        <a:spcBef>
+          <a:spcPts val="600"/>
+        </a:spcBef>
+        <a:spcAft>
+          <a:spcPts val="600"/>
+        </a:spcAft>
+        <a:buClrTx/>
+        <a:buSzPct val="100000"/>
+        <a:buFont typeface="Arial" panose="020B0604020202020204" pitchFamily="34" charset="0"/>
+        <a:buChar char="•"/>
+        <a:defRPr lang="en-US" altLang="cs-CZ" sz="1900" kern="1200" noProof="0" dirty="0" smtClean="0">
+          <a:solidFill>
+            <a:schemeClr val="tx1"/>
+          </a:solidFill>
+          <a:latin typeface="Cambria" panose="02040503050406030204" pitchFamily="18" charset="0"/>
+          <a:ea typeface="Cambria" panose="02040503050406030204" pitchFamily="18" charset="0"/>
+          <a:cs typeface="Cambria" panose="02040503050406030204" pitchFamily="18" charset="0"/>
+        </a:defRPr>
+      </a:lvl2pPr>
+      <a:lvl3pPr marL="1485900" indent="-285750" algn="just" defTabSz="449263" rtl="0" eaLnBrk="0" fontAlgn="base" hangingPunct="0">
+        <a:lnSpc>
+          <a:spcPct val="100000"/>
+        </a:lnSpc>
+        <a:spcBef>
+          <a:spcPts val="600"/>
+        </a:spcBef>
+        <a:spcAft>
+          <a:spcPts val="600"/>
+        </a:spcAft>
+        <a:buClrTx/>
+        <a:buSzPct val="100000"/>
+        <a:buFont typeface="Arial" panose="020B0604020202020204" pitchFamily="34" charset="0"/>
+        <a:buChar char="•"/>
+        <a:defRPr lang="en-US" altLang="cs-CZ" sz="1900" kern="1200" noProof="0" dirty="0">
+          <a:solidFill>
+            <a:schemeClr val="tx1"/>
+          </a:solidFill>
+          <a:latin typeface="Cambria" panose="02040503050406030204" pitchFamily="18" charset="0"/>
+          <a:ea typeface="Cambria" panose="02040503050406030204" pitchFamily="18" charset="0"/>
+          <a:cs typeface="Cambria" panose="02040503050406030204" pitchFamily="18" charset="0"/>
+        </a:defRPr>
+      </a:lvl3pPr>
+      <a:lvl4pPr marL="1885950" indent="-285750" algn="just" defTabSz="449263" rtl="0" eaLnBrk="0" fontAlgn="base" hangingPunct="0">
+        <a:lnSpc>
+          <a:spcPct val="100000"/>
+        </a:lnSpc>
+        <a:spcBef>
+          <a:spcPts val="600"/>
+        </a:spcBef>
+        <a:spcAft>
+          <a:spcPts val="600"/>
+        </a:spcAft>
+        <a:buClrTx/>
+        <a:buSzPct val="100000"/>
+        <a:buFont typeface="Arial" panose="020B0604020202020204" pitchFamily="34" charset="0"/>
+        <a:buChar char="•"/>
+        <a:defRPr lang="en-US" altLang="cs-CZ" sz="1800" kern="1200" noProof="0" dirty="0">
+          <a:solidFill>
+            <a:schemeClr val="tx1"/>
+          </a:solidFill>
+          <a:latin typeface="Cambria" panose="02040503050406030204" pitchFamily="18" charset="0"/>
+          <a:ea typeface="Cambria" panose="02040503050406030204" pitchFamily="18" charset="0"/>
+          <a:cs typeface="Cambria" panose="02040503050406030204" pitchFamily="18" charset="0"/>
+        </a:defRPr>
+      </a:lvl4pPr>
+      <a:lvl5pPr marL="2343150" indent="-285750" algn="just" defTabSz="449263" rtl="0" eaLnBrk="0" fontAlgn="base" hangingPunct="0">
+        <a:lnSpc>
+          <a:spcPct val="100000"/>
+        </a:lnSpc>
+        <a:spcBef>
+          <a:spcPts val="600"/>
+        </a:spcBef>
+        <a:spcAft>
+          <a:spcPts val="600"/>
+        </a:spcAft>
+        <a:buClrTx/>
+        <a:buSzPct val="100000"/>
+        <a:buFont typeface="Arial" panose="020B0604020202020204" pitchFamily="34" charset="0"/>
+        <a:buChar char="•"/>
+        <a:defRPr lang="en-US" altLang="cs-CZ" sz="1800" kern="1200" noProof="0" dirty="0">
+          <a:solidFill>
+            <a:schemeClr val="tx1"/>
+          </a:solidFill>
+          <a:latin typeface="Cambria" panose="02040503050406030204" pitchFamily="18" charset="0"/>
+          <a:ea typeface="Cambria" panose="02040503050406030204" pitchFamily="18" charset="0"/>
+          <a:cs typeface="Cambria" panose="02040503050406030204" pitchFamily="18" charset="0"/>
+        </a:defRPr>
+      </a:lvl5pPr>
+      <a:lvl6pPr marL="2514600" indent="-228600" algn="l" defTabSz="914400" rtl="0" eaLnBrk="1" latinLnBrk="0" hangingPunct="1">
+        <a:lnSpc>
+          <a:spcPct val="90000"/>
+        </a:lnSpc>
+        <a:spcBef>
+          <a:spcPts val="500"/>
+        </a:spcBef>
+        <a:buFont typeface="Arial" panose="020B0604020202020204" pitchFamily="34" charset="0"/>
+        <a:buChar char="•"/>
+        <a:defRPr sz="1800" kern="1200">
+          <a:solidFill>
+            <a:schemeClr val="tx1"/>
+          </a:solidFill>
+          <a:latin typeface="+mn-lt"/>
+          <a:ea typeface="+mn-ea"/>
+          <a:cs typeface="+mn-cs"/>
+        </a:defRPr>
+      </a:lvl6pPr>
+      <a:lvl7pPr marL="2971800" indent="-228600" algn="l" defTabSz="914400" rtl="0" eaLnBrk="1" latinLnBrk="0" hangingPunct="1">
+        <a:lnSpc>
+          <a:spcPct val="90000"/>
+        </a:lnSpc>
+        <a:spcBef>
+          <a:spcPts val="500"/>
+        </a:spcBef>
+        <a:buFont typeface="Arial" panose="020B0604020202020204" pitchFamily="34" charset="0"/>
+        <a:buChar char="•"/>
+        <a:defRPr sz="1800" kern="1200">
+          <a:solidFill>
+            <a:schemeClr val="tx1"/>
+          </a:solidFill>
+          <a:latin typeface="+mn-lt"/>
+          <a:ea typeface="+mn-ea"/>
+          <a:cs typeface="+mn-cs"/>
+        </a:defRPr>
+      </a:lvl7pPr>
+      <a:lvl8pPr marL="3429000" indent="-228600" algn="l" defTabSz="914400" rtl="0" eaLnBrk="1" latinLnBrk="0" hangingPunct="1">
+        <a:lnSpc>
+          <a:spcPct val="90000"/>
+        </a:lnSpc>
+        <a:spcBef>
+          <a:spcPts val="500"/>
+        </a:spcBef>
+        <a:buFont typeface="Arial" panose="020B0604020202020204" pitchFamily="34" charset="0"/>
+        <a:buChar char="•"/>
+        <a:defRPr sz="1800" kern="1200">
+          <a:solidFill>
+            <a:schemeClr val="tx1"/>
+          </a:solidFill>
+          <a:latin typeface="+mn-lt"/>
+          <a:ea typeface="+mn-ea"/>
+          <a:cs typeface="+mn-cs"/>
+        </a:defRPr>
+      </a:lvl8pPr>
+      <a:lvl9pPr marL="3886200" indent="-228600" algn="l" defTabSz="914400" rtl="0" eaLnBrk="1" latinLnBrk="0" hangingPunct="1">
+        <a:lnSpc>
+          <a:spcPct val="90000"/>
+        </a:lnSpc>
+        <a:spcBef>
+          <a:spcPts val="500"/>
+        </a:spcBef>
+        <a:buFont typeface="Arial" panose="020B0604020202020204" pitchFamily="34" charset="0"/>
+        <a:buChar char="•"/>
+        <a:defRPr sz="1800" kern="1200">
+          <a:solidFill>
+            <a:schemeClr val="tx1"/>
+          </a:solidFill>
+          <a:latin typeface="+mn-lt"/>
+          <a:ea typeface="+mn-ea"/>
+          <a:cs typeface="+mn-cs"/>
+        </a:defRPr>
+      </a:lvl9pPr>
+    </p:bodyStyle>
+    <p:otherStyle>
+      <a:defPPr>
+        <a:defRPr lang="cs-CZ"/>
+      </a:defPPr>
+      <a:lvl1pPr marL="0" algn="l" defTabSz="914400" rtl="0" eaLnBrk="1" latinLnBrk="0" hangingPunct="1">
+        <a:defRPr sz="1800" kern="1200">
+          <a:solidFill>
+            <a:schemeClr val="tx1"/>
+          </a:solidFill>
+          <a:latin typeface="+mn-lt"/>
+          <a:ea typeface="+mn-ea"/>
+          <a:cs typeface="+mn-cs"/>
+        </a:defRPr>
+      </a:lvl1pPr>
+      <a:lvl2pPr marL="457200" algn="l" defTabSz="914400" rtl="0" eaLnBrk="1" latinLnBrk="0" hangingPunct="1">
+        <a:defRPr sz="1800" kern="1200">
+          <a:solidFill>
+            <a:schemeClr val="tx1"/>
+          </a:solidFill>
+          <a:latin typeface="+mn-lt"/>
+          <a:ea typeface="+mn-ea"/>
+          <a:cs typeface="+mn-cs"/>
+        </a:defRPr>
+      </a:lvl2pPr>
+      <a:lvl3pPr marL="914400" algn="l" defTabSz="914400" rtl="0" eaLnBrk="1" latinLnBrk="0" hangingPunct="1">
+        <a:defRPr sz="1800" kern="1200">
+          <a:solidFill>
+            <a:schemeClr val="tx1"/>
+          </a:solidFill>
+          <a:latin typeface="+mn-lt"/>
+          <a:ea typeface="+mn-ea"/>
+          <a:cs typeface="+mn-cs"/>
+        </a:defRPr>
+      </a:lvl3pPr>
+      <a:lvl4pPr marL="1371600" algn="l" defTabSz="914400" rtl="0" eaLnBrk="1" latinLnBrk="0" hangingPunct="1">
+        <a:defRPr sz="1800" kern="1200">
+          <a:solidFill>
+            <a:schemeClr val="tx1"/>
+          </a:solidFill>
+          <a:latin typeface="+mn-lt"/>
+          <a:ea typeface="+mn-ea"/>
+          <a:cs typeface="+mn-cs"/>
+        </a:defRPr>
+      </a:lvl4pPr>
+      <a:lvl5pPr marL="1828800" algn="l" defTabSz="914400" rtl="0" eaLnBrk="1" latinLnBrk="0" hangingPunct="1">
+        <a:defRPr sz="1800" kern="1200">
+          <a:solidFill>
+            <a:schemeClr val="tx1"/>
+          </a:solidFill>
+          <a:latin typeface="+mn-lt"/>
+          <a:ea typeface="+mn-ea"/>
+          <a:cs typeface="+mn-cs"/>
+        </a:defRPr>
+      </a:lvl5pPr>
+      <a:lvl6pPr marL="2286000" algn="l" defTabSz="914400" rtl="0" eaLnBrk="1" latinLnBrk="0" hangingPunct="1">
+        <a:defRPr sz="1800" kern="1200">
+          <a:solidFill>
+            <a:schemeClr val="tx1"/>
+          </a:solidFill>
+          <a:latin typeface="+mn-lt"/>
+          <a:ea typeface="+mn-ea"/>
+          <a:cs typeface="+mn-cs"/>
+        </a:defRPr>
+      </a:lvl6pPr>
+      <a:lvl7pPr marL="2743200" algn="l" defTabSz="914400" rtl="0" eaLnBrk="1" latinLnBrk="0" hangingPunct="1">
+        <a:defRPr sz="1800" kern="1200">
+          <a:solidFill>
+            <a:schemeClr val="tx1"/>
+          </a:solidFill>
+          <a:latin typeface="+mn-lt"/>
+          <a:ea typeface="+mn-ea"/>
+          <a:cs typeface="+mn-cs"/>
+        </a:defRPr>
+      </a:lvl7pPr>
+      <a:lvl8pPr marL="3200400" algn="l" defTabSz="914400" rtl="0" eaLnBrk="1" latinLnBrk="0" hangingPunct="1">
+        <a:defRPr sz="1800" kern="1200">
+          <a:solidFill>
+            <a:schemeClr val="tx1"/>
+          </a:solidFill>
+          <a:latin typeface="+mn-lt"/>
+          <a:ea typeface="+mn-ea"/>
+          <a:cs typeface="+mn-cs"/>
+        </a:defRPr>
+      </a:lvl8pPr>
+      <a:lvl9pPr marL="3657600" algn="l" defTabSz="914400" rtl="0" eaLnBrk="1" latinLnBrk="0" hangingPunct="1">
+        <a:defRPr sz="1800" kern="1200">
+          <a:solidFill>
+            <a:schemeClr val="tx1"/>
+          </a:solidFill>
+          <a:latin typeface="+mn-lt"/>
+          <a:ea typeface="+mn-ea"/>
+          <a:cs typeface="+mn-cs"/>
+        </a:defRPr>
+      </a:lvl9pPr>
+    </p:otherStyle>
+  </p:txStyles>
+</p:sldMaster>
+</file>
+
+<file path=ppt/slideMasters/slideMaster2.xml><?xml version="1.0" encoding="utf-8"?>
+<p:sldMaster xmlns:a="http://schemas.openxmlformats.org/drawingml/2006/main" xmlns:r="http://schemas.openxmlformats.org/officeDocument/2006/relationships" xmlns:p="http://schemas.openxmlformats.org/presentationml/2006/main" preserve="1">
+  <p:cSld>
+    <p:bg>
+      <p:bgPr>
+        <a:solidFill>
+          <a:schemeClr val="bg1"/>
+        </a:solidFill>
+        <a:effectLst/>
+      </p:bgPr>
+    </p:bg>
+    <p:spTree>
+      <p:nvGrpSpPr>
+        <p:cNvPr id="1" name=""/>
+        <p:cNvGrpSpPr/>
+        <p:nvPr/>
+      </p:nvGrpSpPr>
+      <p:grpSpPr>
+        <a:xfrm>
+          <a:off x="0" y="0"/>
+          <a:ext cx="0" cy="0"/>
+          <a:chOff x="0" y="0"/>
+          <a:chExt cx="0" cy="0"/>
+        </a:xfrm>
+      </p:grpSpPr>
+      <p:sp>
+        <p:nvSpPr>
+          <p:cNvPr id="1027" name="Rectangle 2">
+            <a:extLst>
+              <a:ext uri="{FF2B5EF4-FFF2-40B4-BE49-F238E27FC236}">
+                <a16:creationId xmlns:a16="http://schemas.microsoft.com/office/drawing/2014/main" id="{2B462A4E-4E72-4BC8-A837-D4A3AA280498}"/>
+              </a:ext>
+            </a:extLst>
+          </p:cNvPr>
+          <p:cNvSpPr>
+            <a:spLocks noGrp="1" noChangeArrowheads="1"/>
+          </p:cNvSpPr>
+          <p:nvPr>
+            <p:ph type="body" idx="1"/>
+          </p:nvPr>
+        </p:nvSpPr>
+        <p:spPr bwMode="auto">
+          <a:xfrm>
+            <a:off x="359792" y="1619597"/>
+            <a:ext cx="8824433" cy="5539969"/>
+          </a:xfrm>
+          <a:prstGeom prst="rect">
+            <a:avLst/>
+          </a:prstGeom>
+          <a:noFill/>
+          <a:ln>
+            <a:noFill/>
+          </a:ln>
+          <a:effectLst/>
+          <a:extLst>
+            <a:ext uri="{909E8E84-426E-40DD-AFC4-6F175D3DCCD1}">
+              <a14:hiddenFill xmlns:a14="http://schemas.microsoft.com/office/drawing/2010/main">
+                <a:solidFill>
+                  <a:srgbClr val="FFFFFF"/>
+                </a:solidFill>
+              </a14:hiddenFill>
+            </a:ext>
+            <a:ext uri="{91240B29-F687-4F45-9708-019B960494DF}">
+              <a14:hiddenLine xmlns:a14="http://schemas.microsoft.com/office/drawing/2010/main" w="9525">
+                <a:solidFill>
+                  <a:srgbClr val="808080"/>
+                </a:solidFill>
+                <a:round/>
+                <a:headEnd/>
+                <a:tailEnd/>
+              </a14:hiddenLine>
+            </a:ext>
+            <a:ext uri="{AF507438-7753-43E0-B8FC-AC1667EBCBE1}">
+              <a14:hiddenEffects xmlns:a14="http://schemas.microsoft.com/office/drawing/2010/main">
+                <a:effectLst>
+                  <a:outerShdw dist="35921" dir="2700000" algn="ctr" rotWithShape="0">
+                    <a:schemeClr val="bg2"/>
+                  </a:outerShdw>
+                </a:effectLst>
+              </a14:hiddenEffects>
+            </a:ext>
+          </a:extLst>
+        </p:spPr>
+        <p:txBody>
+          <a:bodyPr vert="horz" wrap="square" lIns="0" tIns="24840" rIns="0" bIns="0" numCol="1" anchor="t" anchorCtr="0" compatLnSpc="1">
+            <a:prstTxWarp prst="textNoShape">
+              <a:avLst/>
+            </a:prstTxWarp>
+          </a:bodyPr>
+          <a:lstStyle/>
+          <a:p>
+            <a:pPr lvl="0"/>
+            <a:r>
+              <a:rPr lang="cs-CZ" noProof="0" dirty="0"/>
+              <a:t>Upravte styly předlohy textu.</a:t>
+            </a:r>
+          </a:p>
+          <a:p>
+            <a:pPr lvl="1"/>
+            <a:r>
+              <a:rPr lang="cs-CZ" noProof="0" dirty="0"/>
+              <a:t>Druhá úroveň</a:t>
+            </a:r>
+          </a:p>
+          <a:p>
+            <a:pPr lvl="2"/>
+            <a:r>
+              <a:rPr lang="cs-CZ" noProof="0" dirty="0"/>
+              <a:t>Třetí úroveň</a:t>
+            </a:r>
+          </a:p>
+          <a:p>
+            <a:pPr lvl="3"/>
+            <a:r>
+              <a:rPr lang="cs-CZ" noProof="0" dirty="0"/>
+              <a:t>Čtvrtá úroveň</a:t>
+            </a:r>
+          </a:p>
+          <a:p>
+            <a:pPr lvl="4"/>
+            <a:r>
+              <a:rPr lang="cs-CZ" noProof="0" dirty="0"/>
+              <a:t>Pátá úroveň</a:t>
+            </a:r>
+          </a:p>
+        </p:txBody>
+      </p:sp>
+      <p:sp>
+        <p:nvSpPr>
+          <p:cNvPr id="1026" name="Rectangle 1">
+            <a:extLst>
+              <a:ext uri="{FF2B5EF4-FFF2-40B4-BE49-F238E27FC236}">
+                <a16:creationId xmlns:a16="http://schemas.microsoft.com/office/drawing/2014/main" id="{B7D41CFF-EB71-4F5B-BCFA-F0394C20CB1D}"/>
+              </a:ext>
+            </a:extLst>
+          </p:cNvPr>
+          <p:cNvSpPr>
+            <a:spLocks noGrp="1" noChangeArrowheads="1"/>
+          </p:cNvSpPr>
+          <p:nvPr>
+            <p:ph type="title"/>
+          </p:nvPr>
+        </p:nvSpPr>
+        <p:spPr bwMode="auto">
+          <a:xfrm>
+            <a:off x="898987" y="307777"/>
+            <a:ext cx="9181637" cy="1095796"/>
+          </a:xfrm>
+          <a:prstGeom prst="rect">
+            <a:avLst/>
+          </a:prstGeom>
+          <a:noFill/>
+          <a:ln w="9525">
+            <a:noFill/>
+            <a:round/>
+            <a:headEnd/>
+            <a:tailEnd/>
+          </a:ln>
+          <a:effectLst/>
+          <a:extLst>
+            <a:ext uri="{909E8E84-426E-40DD-AFC4-6F175D3DCCD1}">
+              <a14:hiddenFill xmlns:a14="http://schemas.microsoft.com/office/drawing/2010/main">
+                <a:solidFill>
+                  <a:srgbClr val="FFFFFF"/>
+                </a:solidFill>
+              </a14:hiddenFill>
+            </a:ext>
+            <a:ext uri="{AF507438-7753-43E0-B8FC-AC1667EBCBE1}">
+              <a14:hiddenEffects xmlns:a14="http://schemas.microsoft.com/office/drawing/2010/main">
+                <a:effectLst>
+                  <a:outerShdw dist="35921" dir="2700000" algn="ctr" rotWithShape="0">
+                    <a:schemeClr val="bg2"/>
+                  </a:outerShdw>
+                </a:effectLst>
+              </a14:hiddenEffects>
+            </a:ext>
+          </a:extLst>
+        </p:spPr>
+        <p:txBody>
+          <a:bodyPr vert="horz" wrap="square" lIns="0" tIns="0" rIns="0" bIns="0" numCol="1" anchor="ctr" anchorCtr="0" compatLnSpc="1">
+            <a:prstTxWarp prst="textNoShape">
+              <a:avLst/>
+            </a:prstTxWarp>
+          </a:bodyPr>
+          <a:lstStyle/>
+          <a:p>
+            <a:pPr lvl="0"/>
+            <a:r>
+              <a:rPr lang="cs-CZ" altLang="cs-CZ" noProof="0" dirty="0"/>
+              <a:t>Klikněte pro úpravu formátu textu nadpisu</a:t>
+            </a:r>
+          </a:p>
+        </p:txBody>
+      </p:sp>
+      <p:sp>
+        <p:nvSpPr>
+          <p:cNvPr id="11" name="TextovéPole 10">
+            <a:extLst>
+              <a:ext uri="{FF2B5EF4-FFF2-40B4-BE49-F238E27FC236}">
+                <a16:creationId xmlns:a16="http://schemas.microsoft.com/office/drawing/2014/main" id="{105582DF-2A5D-4BFF-B212-625FE4C962BC}"/>
+              </a:ext>
+            </a:extLst>
+          </p:cNvPr>
+          <p:cNvSpPr txBox="1"/>
+          <p:nvPr userDrawn="1"/>
+        </p:nvSpPr>
+        <p:spPr>
+          <a:xfrm>
+            <a:off x="0" y="7251897"/>
+            <a:ext cx="10080624" cy="307777"/>
+          </a:xfrm>
+          <a:prstGeom prst="rect">
+            <a:avLst/>
+          </a:prstGeom>
+          <a:solidFill>
+            <a:srgbClr val="0065BD"/>
+          </a:solidFill>
+        </p:spPr>
+        <p:txBody>
+          <a:bodyPr wrap="square" rtlCol="0" anchor="ctr" anchorCtr="0">
+            <a:spAutoFit/>
+          </a:bodyPr>
+          <a:lstStyle/>
+          <a:p>
+            <a:pPr algn="l"/>
+            <a:r>
+              <a:rPr lang="cs-CZ" sz="1400" b="1" dirty="0">
+                <a:solidFill>
+                  <a:schemeClr val="bg1"/>
+                </a:solidFill>
+                <a:latin typeface="Technika" panose="00000500000000000000" pitchFamily="2" charset="-18"/>
+              </a:rPr>
+              <a:t>KATEDRA ELEKTRICKÝCH POHONŮ A TRAKCE</a:t>
+            </a:r>
+          </a:p>
+        </p:txBody>
+      </p:sp>
+      <p:sp>
+        <p:nvSpPr>
+          <p:cNvPr id="10" name="TextovéPole 9">
+            <a:extLst>
+              <a:ext uri="{FF2B5EF4-FFF2-40B4-BE49-F238E27FC236}">
+                <a16:creationId xmlns:a16="http://schemas.microsoft.com/office/drawing/2014/main" id="{195E3FBB-7E9A-4CEE-BEA9-C70EC419F692}"/>
+              </a:ext>
+            </a:extLst>
+          </p:cNvPr>
+          <p:cNvSpPr txBox="1"/>
+          <p:nvPr userDrawn="1"/>
+        </p:nvSpPr>
+        <p:spPr>
+          <a:xfrm>
+            <a:off x="0" y="0"/>
+            <a:ext cx="10080626" cy="307777"/>
+          </a:xfrm>
+          <a:prstGeom prst="rect">
+            <a:avLst/>
+          </a:prstGeom>
+          <a:solidFill>
+            <a:srgbClr val="0065BD"/>
+          </a:solidFill>
+        </p:spPr>
+        <p:txBody>
+          <a:bodyPr wrap="square" rtlCol="0" anchor="ctr" anchorCtr="0">
+            <a:spAutoFit/>
+          </a:bodyPr>
+          <a:lstStyle/>
+          <a:p>
+            <a:pPr algn="r"/>
+            <a:r>
+              <a:rPr lang="cs-CZ" sz="1400" b="1" dirty="0">
+                <a:solidFill>
+                  <a:schemeClr val="bg1"/>
+                </a:solidFill>
+                <a:latin typeface="Technika" panose="00000500000000000000" pitchFamily="2" charset="-18"/>
+              </a:rPr>
+              <a:t>FAKULTA ELEKTROTECHNICKÁ ČVUT V PRAZE</a:t>
+            </a:r>
+          </a:p>
+        </p:txBody>
+      </p:sp>
+      <p:pic>
+        <p:nvPicPr>
+          <p:cNvPr id="17" name="Obrázek 16">
+            <a:extLst>
+              <a:ext uri="{FF2B5EF4-FFF2-40B4-BE49-F238E27FC236}">
+                <a16:creationId xmlns:a16="http://schemas.microsoft.com/office/drawing/2014/main" id="{2ED91152-AD9E-4327-BEE5-87959A74B07D}"/>
+              </a:ext>
+            </a:extLst>
+          </p:cNvPr>
+          <p:cNvPicPr>
+            <a:picLocks noChangeAspect="1"/>
+          </p:cNvPicPr>
+          <p:nvPr userDrawn="1"/>
+        </p:nvPicPr>
+        <p:blipFill rotWithShape="1">
+          <a:blip r:embed="rId4"/>
+          <a:srcRect l="-1" t="22245" r="4199" b="4421"/>
+          <a:stretch/>
+        </p:blipFill>
+        <p:spPr>
+          <a:xfrm>
+            <a:off x="9292314" y="6948189"/>
+            <a:ext cx="792088" cy="606838"/>
+          </a:xfrm>
+          <a:prstGeom prst="rect">
+            <a:avLst/>
+          </a:prstGeom>
+        </p:spPr>
+      </p:pic>
+      <p:pic>
+        <p:nvPicPr>
+          <p:cNvPr id="5" name="Obrázek 4">
+            <a:extLst>
+              <a:ext uri="{FF2B5EF4-FFF2-40B4-BE49-F238E27FC236}">
+                <a16:creationId xmlns:a16="http://schemas.microsoft.com/office/drawing/2014/main" id="{22A80E81-2B31-BE54-05F9-3B620D45893A}"/>
+              </a:ext>
+            </a:extLst>
+          </p:cNvPr>
+          <p:cNvPicPr>
+            <a:picLocks/>
+          </p:cNvPicPr>
+          <p:nvPr userDrawn="1"/>
+        </p:nvPicPr>
+        <p:blipFill rotWithShape="1">
+          <a:blip r:embed="rId4"/>
+          <a:srcRect l="2415" t="22246" r="4199" b="4420"/>
+          <a:stretch/>
+        </p:blipFill>
+        <p:spPr>
+          <a:xfrm>
+            <a:off x="0" y="0"/>
+            <a:ext cx="775533" cy="606838"/>
+          </a:xfrm>
+          <a:prstGeom prst="rect">
+            <a:avLst/>
+          </a:prstGeom>
+        </p:spPr>
+      </p:pic>
+    </p:spTree>
+    <p:extLst>
+      <p:ext uri="{BB962C8B-B14F-4D97-AF65-F5344CB8AC3E}">
+        <p14:creationId xmlns:p14="http://schemas.microsoft.com/office/powerpoint/2010/main" val="2702225585"/>
+      </p:ext>
+    </p:extLst>
+  </p:cSld>
+  <p:clrMap bg1="lt1" tx1="dk1" bg2="lt2" tx2="dk2" accent1="accent1" accent2="accent2" accent3="accent3" accent4="accent4" accent5="accent5" accent6="accent6" hlink="hlink" folHlink="folHlink"/>
+  <p:sldLayoutIdLst>
+    <p:sldLayoutId id="2147483655" r:id="rId1"/>
+    <p:sldLayoutId id="2147483656" r:id="rId2"/>
   </p:sldLayoutIdLst>
   <p:hf hdr="0" ftr="0" dt="0"/>
   <p:txStyles>
@@ -4434,8 +5906,8 @@
         </p:blipFill>
         <p:spPr>
           <a:xfrm>
-            <a:off x="359792" y="1290855"/>
-            <a:ext cx="7992888" cy="3622268"/>
+            <a:off x="71760" y="1187549"/>
+            <a:ext cx="8280920" cy="3752800"/>
           </a:xfrm>
           <a:prstGeom prst="rect">
             <a:avLst/>
@@ -4470,8 +5942,8 @@
         </p:blipFill>
         <p:spPr>
           <a:xfrm>
-            <a:off x="110117" y="5147989"/>
-            <a:ext cx="9860389" cy="1120831"/>
+            <a:off x="-2" y="5103428"/>
+            <a:ext cx="10080625" cy="1145865"/>
           </a:xfrm>
           <a:prstGeom prst="rect">
             <a:avLst/>
@@ -4857,7 +6329,7 @@
           <p:nvPr/>
         </p:nvPicPr>
         <p:blipFill rotWithShape="1">
-          <a:blip r:embed="rId2">
+          <a:blip r:embed="rId3">
             <a:extLst>
               <a:ext uri="{28A0092B-C50C-407E-A947-70E740481C1C}">
                 <a14:useLocalDpi xmlns:a14="http://schemas.microsoft.com/office/drawing/2010/main" val="0"/>
@@ -4869,8 +6341,8 @@
         </p:blipFill>
         <p:spPr>
           <a:xfrm>
-            <a:off x="1727943" y="1763613"/>
-            <a:ext cx="6624736" cy="5284017"/>
+            <a:off x="1655936" y="1691605"/>
+            <a:ext cx="6768751" cy="5398886"/>
           </a:xfrm>
           <a:prstGeom prst="rect">
             <a:avLst/>
@@ -6652,6 +8124,648 @@
 </file>
 
 <file path=ppt/theme/theme2.xml><?xml version="1.0" encoding="utf-8"?>
+<a:theme xmlns:a="http://schemas.openxmlformats.org/drawingml/2006/main" name="1_Motiv Office">
+  <a:themeElements>
+    <a:clrScheme name="Vlastní 1">
+      <a:dk1>
+        <a:srgbClr val="000000"/>
+      </a:dk1>
+      <a:lt1>
+        <a:srgbClr val="FFFFFF"/>
+      </a:lt1>
+      <a:dk2>
+        <a:srgbClr val="000000"/>
+      </a:dk2>
+      <a:lt2>
+        <a:srgbClr val="808080"/>
+      </a:lt2>
+      <a:accent1>
+        <a:srgbClr val="00CC99"/>
+      </a:accent1>
+      <a:accent2>
+        <a:srgbClr val="3333CC"/>
+      </a:accent2>
+      <a:accent3>
+        <a:srgbClr val="FFFFFF"/>
+      </a:accent3>
+      <a:accent4>
+        <a:srgbClr val="000000"/>
+      </a:accent4>
+      <a:accent5>
+        <a:srgbClr val="AAE2CA"/>
+      </a:accent5>
+      <a:accent6>
+        <a:srgbClr val="2D2DB9"/>
+      </a:accent6>
+      <a:hlink>
+        <a:srgbClr val="0070C0"/>
+      </a:hlink>
+      <a:folHlink>
+        <a:srgbClr val="B2B2B2"/>
+      </a:folHlink>
+    </a:clrScheme>
+    <a:fontScheme name="Motiv Office">
+      <a:majorFont>
+        <a:latin typeface="Arial"/>
+        <a:ea typeface=""/>
+        <a:cs typeface="WenQuanYi Zen Hei"/>
+      </a:majorFont>
+      <a:minorFont>
+        <a:latin typeface="Arial"/>
+        <a:ea typeface=""/>
+        <a:cs typeface="WenQuanYi Zen Hei"/>
+      </a:minorFont>
+    </a:fontScheme>
+    <a:fmtScheme name="Office">
+      <a:fillStyleLst>
+        <a:solidFill>
+          <a:schemeClr val="phClr"/>
+        </a:solidFill>
+        <a:gradFill rotWithShape="1">
+          <a:gsLst>
+            <a:gs pos="0">
+              <a:schemeClr val="phClr">
+                <a:lumMod val="110000"/>
+                <a:satMod val="105000"/>
+                <a:tint val="67000"/>
+              </a:schemeClr>
+            </a:gs>
+            <a:gs pos="50000">
+              <a:schemeClr val="phClr">
+                <a:lumMod val="105000"/>
+                <a:satMod val="103000"/>
+                <a:tint val="73000"/>
+              </a:schemeClr>
+            </a:gs>
+            <a:gs pos="100000">
+              <a:schemeClr val="phClr">
+                <a:lumMod val="105000"/>
+                <a:satMod val="109000"/>
+                <a:tint val="81000"/>
+              </a:schemeClr>
+            </a:gs>
+          </a:gsLst>
+          <a:lin ang="5400000" scaled="0"/>
+        </a:gradFill>
+        <a:gradFill rotWithShape="1">
+          <a:gsLst>
+            <a:gs pos="0">
+              <a:schemeClr val="phClr">
+                <a:satMod val="103000"/>
+                <a:lumMod val="102000"/>
+                <a:tint val="94000"/>
+              </a:schemeClr>
+            </a:gs>
+            <a:gs pos="50000">
+              <a:schemeClr val="phClr">
+                <a:satMod val="110000"/>
+                <a:lumMod val="100000"/>
+                <a:shade val="100000"/>
+              </a:schemeClr>
+            </a:gs>
+            <a:gs pos="100000">
+              <a:schemeClr val="phClr">
+                <a:lumMod val="99000"/>
+                <a:satMod val="120000"/>
+                <a:shade val="78000"/>
+              </a:schemeClr>
+            </a:gs>
+          </a:gsLst>
+          <a:lin ang="5400000" scaled="0"/>
+        </a:gradFill>
+      </a:fillStyleLst>
+      <a:lnStyleLst>
+        <a:ln w="6350" cap="flat" cmpd="sng" algn="ctr">
+          <a:solidFill>
+            <a:schemeClr val="phClr"/>
+          </a:solidFill>
+          <a:prstDash val="solid"/>
+          <a:miter lim="800000"/>
+        </a:ln>
+        <a:ln w="12700" cap="flat" cmpd="sng" algn="ctr">
+          <a:solidFill>
+            <a:schemeClr val="phClr"/>
+          </a:solidFill>
+          <a:prstDash val="solid"/>
+          <a:miter lim="800000"/>
+        </a:ln>
+        <a:ln w="19050" cap="flat" cmpd="sng" algn="ctr">
+          <a:solidFill>
+            <a:schemeClr val="phClr"/>
+          </a:solidFill>
+          <a:prstDash val="solid"/>
+          <a:miter lim="800000"/>
+        </a:ln>
+      </a:lnStyleLst>
+      <a:effectStyleLst>
+        <a:effectStyle>
+          <a:effectLst/>
+        </a:effectStyle>
+        <a:effectStyle>
+          <a:effectLst/>
+        </a:effectStyle>
+        <a:effectStyle>
+          <a:effectLst>
+            <a:outerShdw blurRad="57150" dist="19050" dir="5400000" algn="ctr" rotWithShape="0">
+              <a:srgbClr val="000000">
+                <a:alpha val="63000"/>
+              </a:srgbClr>
+            </a:outerShdw>
+          </a:effectLst>
+        </a:effectStyle>
+      </a:effectStyleLst>
+      <a:bgFillStyleLst>
+        <a:solidFill>
+          <a:schemeClr val="phClr"/>
+        </a:solidFill>
+        <a:solidFill>
+          <a:schemeClr val="phClr">
+            <a:tint val="95000"/>
+            <a:satMod val="170000"/>
+          </a:schemeClr>
+        </a:solidFill>
+        <a:gradFill rotWithShape="1">
+          <a:gsLst>
+            <a:gs pos="0">
+              <a:schemeClr val="phClr">
+                <a:tint val="93000"/>
+                <a:satMod val="150000"/>
+                <a:shade val="98000"/>
+                <a:lumMod val="102000"/>
+              </a:schemeClr>
+            </a:gs>
+            <a:gs pos="50000">
+              <a:schemeClr val="phClr">
+                <a:tint val="98000"/>
+                <a:satMod val="130000"/>
+                <a:shade val="90000"/>
+                <a:lumMod val="103000"/>
+              </a:schemeClr>
+            </a:gs>
+            <a:gs pos="100000">
+              <a:schemeClr val="phClr">
+                <a:shade val="63000"/>
+                <a:satMod val="120000"/>
+              </a:schemeClr>
+            </a:gs>
+          </a:gsLst>
+          <a:lin ang="5400000" scaled="0"/>
+        </a:gradFill>
+      </a:bgFillStyleLst>
+    </a:fmtScheme>
+  </a:themeElements>
+  <a:objectDefaults>
+    <a:spDef>
+      <a:spPr bwMode="auto">
+        <a:xfrm>
+          <a:off x="0" y="0"/>
+          <a:ext cx="1" cy="1"/>
+        </a:xfrm>
+        <a:custGeom>
+          <a:avLst/>
+          <a:gdLst/>
+          <a:ahLst/>
+          <a:cxnLst/>
+          <a:rect l="0" t="0" r="0" b="0"/>
+          <a:pathLst/>
+        </a:custGeom>
+        <a:solidFill>
+          <a:srgbClr val="00B8FF"/>
+        </a:solidFill>
+        <a:ln w="9525" cap="flat" cmpd="sng" algn="ctr">
+          <a:solidFill>
+            <a:schemeClr val="tx1"/>
+          </a:solidFill>
+          <a:prstDash val="solid"/>
+          <a:round/>
+          <a:headEnd type="none" w="med" len="med"/>
+          <a:tailEnd type="none" w="med" len="med"/>
+        </a:ln>
+        <a:effectLst/>
+        <a:extLst>
+          <a:ext uri="{AF507438-7753-43E0-B8FC-AC1667EBCBE1}">
+            <a14:hiddenEffects xmlns:a14="http://schemas.microsoft.com/office/drawing/2010/main">
+              <a:effectLst>
+                <a:outerShdw dist="35921" dir="2700000" algn="ctr" rotWithShape="0">
+                  <a:schemeClr val="bg2"/>
+                </a:outerShdw>
+              </a:effectLst>
+            </a14:hiddenEffects>
+          </a:ext>
+        </a:extLst>
+      </a:spPr>
+      <a:bodyPr vert="horz" wrap="square" lIns="91440" tIns="45720" rIns="91440" bIns="45720" numCol="1" anchor="t" anchorCtr="0" compatLnSpc="1">
+        <a:prstTxWarp prst="textNoShape">
+          <a:avLst/>
+        </a:prstTxWarp>
+      </a:bodyPr>
+      <a:lstStyle>
+        <a:defPPr marL="0" marR="0" indent="0" algn="l" defTabSz="449263" rtl="0" eaLnBrk="1" fontAlgn="base" latinLnBrk="0" hangingPunct="0">
+          <a:lnSpc>
+            <a:spcPct val="93000"/>
+          </a:lnSpc>
+          <a:spcBef>
+            <a:spcPct val="0"/>
+          </a:spcBef>
+          <a:spcAft>
+            <a:spcPct val="0"/>
+          </a:spcAft>
+          <a:buClr>
+            <a:srgbClr val="000000"/>
+          </a:buClr>
+          <a:buSzPct val="100000"/>
+          <a:buFont typeface="Times New Roman" panose="02020603050405020304" pitchFamily="18" charset="0"/>
+          <a:buNone/>
+          <a:tabLst/>
+          <a:defRPr kumimoji="0" lang="en-GB" altLang="cs-CZ" sz="1800" b="0" i="0" u="none" strike="noStrike" cap="none" normalizeH="0" baseline="0" smtClean="0">
+            <a:ln>
+              <a:noFill/>
+            </a:ln>
+            <a:solidFill>
+              <a:schemeClr val="bg1"/>
+            </a:solidFill>
+            <a:effectLst/>
+            <a:latin typeface="Arial" panose="020B0604020202020204" pitchFamily="34" charset="0"/>
+            <a:cs typeface="WenQuanYi Zen Hei" charset="0"/>
+          </a:defRPr>
+        </a:defPPr>
+      </a:lstStyle>
+    </a:spDef>
+    <a:lnDef>
+      <a:spPr bwMode="auto">
+        <a:xfrm>
+          <a:off x="0" y="0"/>
+          <a:ext cx="1" cy="1"/>
+        </a:xfrm>
+        <a:custGeom>
+          <a:avLst/>
+          <a:gdLst/>
+          <a:ahLst/>
+          <a:cxnLst/>
+          <a:rect l="0" t="0" r="0" b="0"/>
+          <a:pathLst/>
+        </a:custGeom>
+        <a:solidFill>
+          <a:srgbClr val="00B8FF"/>
+        </a:solidFill>
+        <a:ln w="9525" cap="flat" cmpd="sng" algn="ctr">
+          <a:solidFill>
+            <a:schemeClr val="tx1"/>
+          </a:solidFill>
+          <a:prstDash val="solid"/>
+          <a:round/>
+          <a:headEnd type="none" w="med" len="med"/>
+          <a:tailEnd type="none" w="med" len="med"/>
+        </a:ln>
+        <a:effectLst/>
+        <a:extLst>
+          <a:ext uri="{AF507438-7753-43E0-B8FC-AC1667EBCBE1}">
+            <a14:hiddenEffects xmlns:a14="http://schemas.microsoft.com/office/drawing/2010/main">
+              <a:effectLst>
+                <a:outerShdw dist="35921" dir="2700000" algn="ctr" rotWithShape="0">
+                  <a:schemeClr val="bg2"/>
+                </a:outerShdw>
+              </a:effectLst>
+            </a14:hiddenEffects>
+          </a:ext>
+        </a:extLst>
+      </a:spPr>
+      <a:bodyPr vert="horz" wrap="square" lIns="91440" tIns="45720" rIns="91440" bIns="45720" numCol="1" anchor="t" anchorCtr="0" compatLnSpc="1">
+        <a:prstTxWarp prst="textNoShape">
+          <a:avLst/>
+        </a:prstTxWarp>
+      </a:bodyPr>
+      <a:lstStyle>
+        <a:defPPr marL="0" marR="0" indent="0" algn="l" defTabSz="449263" rtl="0" eaLnBrk="1" fontAlgn="base" latinLnBrk="0" hangingPunct="0">
+          <a:lnSpc>
+            <a:spcPct val="93000"/>
+          </a:lnSpc>
+          <a:spcBef>
+            <a:spcPct val="0"/>
+          </a:spcBef>
+          <a:spcAft>
+            <a:spcPct val="0"/>
+          </a:spcAft>
+          <a:buClr>
+            <a:srgbClr val="000000"/>
+          </a:buClr>
+          <a:buSzPct val="100000"/>
+          <a:buFont typeface="Times New Roman" panose="02020603050405020304" pitchFamily="18" charset="0"/>
+          <a:buNone/>
+          <a:tabLst/>
+          <a:defRPr kumimoji="0" lang="en-GB" altLang="cs-CZ" sz="1800" b="0" i="0" u="none" strike="noStrike" cap="none" normalizeH="0" baseline="0" smtClean="0">
+            <a:ln>
+              <a:noFill/>
+            </a:ln>
+            <a:solidFill>
+              <a:schemeClr val="bg1"/>
+            </a:solidFill>
+            <a:effectLst/>
+            <a:latin typeface="Arial" panose="020B0604020202020204" pitchFamily="34" charset="0"/>
+            <a:cs typeface="WenQuanYi Zen Hei" charset="0"/>
+          </a:defRPr>
+        </a:defPPr>
+      </a:lstStyle>
+    </a:lnDef>
+  </a:objectDefaults>
+  <a:extraClrSchemeLst>
+    <a:extraClrScheme>
+      <a:clrScheme name="Motiv Office 1">
+        <a:dk1>
+          <a:srgbClr val="000000"/>
+        </a:dk1>
+        <a:lt1>
+          <a:srgbClr val="FFFFFF"/>
+        </a:lt1>
+        <a:dk2>
+          <a:srgbClr val="000000"/>
+        </a:dk2>
+        <a:lt2>
+          <a:srgbClr val="808080"/>
+        </a:lt2>
+        <a:accent1>
+          <a:srgbClr val="00CC99"/>
+        </a:accent1>
+        <a:accent2>
+          <a:srgbClr val="3333CC"/>
+        </a:accent2>
+        <a:accent3>
+          <a:srgbClr val="FFFFFF"/>
+        </a:accent3>
+        <a:accent4>
+          <a:srgbClr val="000000"/>
+        </a:accent4>
+        <a:accent5>
+          <a:srgbClr val="AAE2CA"/>
+        </a:accent5>
+        <a:accent6>
+          <a:srgbClr val="2D2DB9"/>
+        </a:accent6>
+        <a:hlink>
+          <a:srgbClr val="CCCCFF"/>
+        </a:hlink>
+        <a:folHlink>
+          <a:srgbClr val="B2B2B2"/>
+        </a:folHlink>
+      </a:clrScheme>
+      <a:clrMap bg1="lt1" tx1="dk1" bg2="lt2" tx2="dk2" accent1="accent1" accent2="accent2" accent3="accent3" accent4="accent4" accent5="accent5" accent6="accent6" hlink="hlink" folHlink="folHlink"/>
+    </a:extraClrScheme>
+    <a:extraClrScheme>
+      <a:clrScheme name="Motiv Office 2">
+        <a:dk1>
+          <a:srgbClr val="000000"/>
+        </a:dk1>
+        <a:lt1>
+          <a:srgbClr val="FFFFFF"/>
+        </a:lt1>
+        <a:dk2>
+          <a:srgbClr val="0000FF"/>
+        </a:dk2>
+        <a:lt2>
+          <a:srgbClr val="FFFF00"/>
+        </a:lt2>
+        <a:accent1>
+          <a:srgbClr val="FF9900"/>
+        </a:accent1>
+        <a:accent2>
+          <a:srgbClr val="00FFFF"/>
+        </a:accent2>
+        <a:accent3>
+          <a:srgbClr val="AAAAFF"/>
+        </a:accent3>
+        <a:accent4>
+          <a:srgbClr val="DADADA"/>
+        </a:accent4>
+        <a:accent5>
+          <a:srgbClr val="FFCAAA"/>
+        </a:accent5>
+        <a:accent6>
+          <a:srgbClr val="00E7E7"/>
+        </a:accent6>
+        <a:hlink>
+          <a:srgbClr val="FF0000"/>
+        </a:hlink>
+        <a:folHlink>
+          <a:srgbClr val="969696"/>
+        </a:folHlink>
+      </a:clrScheme>
+      <a:clrMap bg1="dk2" tx1="lt1" bg2="dk1" tx2="lt2" accent1="accent1" accent2="accent2" accent3="accent3" accent4="accent4" accent5="accent5" accent6="accent6" hlink="hlink" folHlink="folHlink"/>
+    </a:extraClrScheme>
+    <a:extraClrScheme>
+      <a:clrScheme name="Motiv Office 3">
+        <a:dk1>
+          <a:srgbClr val="000000"/>
+        </a:dk1>
+        <a:lt1>
+          <a:srgbClr val="FFFFCC"/>
+        </a:lt1>
+        <a:dk2>
+          <a:srgbClr val="808000"/>
+        </a:dk2>
+        <a:lt2>
+          <a:srgbClr val="666633"/>
+        </a:lt2>
+        <a:accent1>
+          <a:srgbClr val="339933"/>
+        </a:accent1>
+        <a:accent2>
+          <a:srgbClr val="800000"/>
+        </a:accent2>
+        <a:accent3>
+          <a:srgbClr val="FFFFE2"/>
+        </a:accent3>
+        <a:accent4>
+          <a:srgbClr val="000000"/>
+        </a:accent4>
+        <a:accent5>
+          <a:srgbClr val="ADCAAD"/>
+        </a:accent5>
+        <a:accent6>
+          <a:srgbClr val="730000"/>
+        </a:accent6>
+        <a:hlink>
+          <a:srgbClr val="0033CC"/>
+        </a:hlink>
+        <a:folHlink>
+          <a:srgbClr val="FFCC66"/>
+        </a:folHlink>
+      </a:clrScheme>
+      <a:clrMap bg1="lt1" tx1="dk1" bg2="lt2" tx2="dk2" accent1="accent1" accent2="accent2" accent3="accent3" accent4="accent4" accent5="accent5" accent6="accent6" hlink="hlink" folHlink="folHlink"/>
+    </a:extraClrScheme>
+    <a:extraClrScheme>
+      <a:clrScheme name="Motiv Office 4">
+        <a:dk1>
+          <a:srgbClr val="000000"/>
+        </a:dk1>
+        <a:lt1>
+          <a:srgbClr val="FFFFFF"/>
+        </a:lt1>
+        <a:dk2>
+          <a:srgbClr val="000000"/>
+        </a:dk2>
+        <a:lt2>
+          <a:srgbClr val="333333"/>
+        </a:lt2>
+        <a:accent1>
+          <a:srgbClr val="DDDDDD"/>
+        </a:accent1>
+        <a:accent2>
+          <a:srgbClr val="808080"/>
+        </a:accent2>
+        <a:accent3>
+          <a:srgbClr val="FFFFFF"/>
+        </a:accent3>
+        <a:accent4>
+          <a:srgbClr val="000000"/>
+        </a:accent4>
+        <a:accent5>
+          <a:srgbClr val="EBEBEB"/>
+        </a:accent5>
+        <a:accent6>
+          <a:srgbClr val="737373"/>
+        </a:accent6>
+        <a:hlink>
+          <a:srgbClr val="4D4D4D"/>
+        </a:hlink>
+        <a:folHlink>
+          <a:srgbClr val="EAEAEA"/>
+        </a:folHlink>
+      </a:clrScheme>
+      <a:clrMap bg1="lt1" tx1="dk1" bg2="lt2" tx2="dk2" accent1="accent1" accent2="accent2" accent3="accent3" accent4="accent4" accent5="accent5" accent6="accent6" hlink="hlink" folHlink="folHlink"/>
+    </a:extraClrScheme>
+    <a:extraClrScheme>
+      <a:clrScheme name="Motiv Office 5">
+        <a:dk1>
+          <a:srgbClr val="000000"/>
+        </a:dk1>
+        <a:lt1>
+          <a:srgbClr val="FFFFFF"/>
+        </a:lt1>
+        <a:dk2>
+          <a:srgbClr val="000000"/>
+        </a:dk2>
+        <a:lt2>
+          <a:srgbClr val="808080"/>
+        </a:lt2>
+        <a:accent1>
+          <a:srgbClr val="FFCC66"/>
+        </a:accent1>
+        <a:accent2>
+          <a:srgbClr val="0000FF"/>
+        </a:accent2>
+        <a:accent3>
+          <a:srgbClr val="FFFFFF"/>
+        </a:accent3>
+        <a:accent4>
+          <a:srgbClr val="000000"/>
+        </a:accent4>
+        <a:accent5>
+          <a:srgbClr val="FFE2B8"/>
+        </a:accent5>
+        <a:accent6>
+          <a:srgbClr val="0000E7"/>
+        </a:accent6>
+        <a:hlink>
+          <a:srgbClr val="CC00CC"/>
+        </a:hlink>
+        <a:folHlink>
+          <a:srgbClr val="C0C0C0"/>
+        </a:folHlink>
+      </a:clrScheme>
+      <a:clrMap bg1="lt1" tx1="dk1" bg2="lt2" tx2="dk2" accent1="accent1" accent2="accent2" accent3="accent3" accent4="accent4" accent5="accent5" accent6="accent6" hlink="hlink" folHlink="folHlink"/>
+    </a:extraClrScheme>
+    <a:extraClrScheme>
+      <a:clrScheme name="Motiv Office 6">
+        <a:dk1>
+          <a:srgbClr val="000000"/>
+        </a:dk1>
+        <a:lt1>
+          <a:srgbClr val="FFFFFF"/>
+        </a:lt1>
+        <a:dk2>
+          <a:srgbClr val="000000"/>
+        </a:dk2>
+        <a:lt2>
+          <a:srgbClr val="808080"/>
+        </a:lt2>
+        <a:accent1>
+          <a:srgbClr val="C0C0C0"/>
+        </a:accent1>
+        <a:accent2>
+          <a:srgbClr val="0066FF"/>
+        </a:accent2>
+        <a:accent3>
+          <a:srgbClr val="FFFFFF"/>
+        </a:accent3>
+        <a:accent4>
+          <a:srgbClr val="000000"/>
+        </a:accent4>
+        <a:accent5>
+          <a:srgbClr val="DCDCDC"/>
+        </a:accent5>
+        <a:accent6>
+          <a:srgbClr val="005CE7"/>
+        </a:accent6>
+        <a:hlink>
+          <a:srgbClr val="FF0000"/>
+        </a:hlink>
+        <a:folHlink>
+          <a:srgbClr val="009900"/>
+        </a:folHlink>
+      </a:clrScheme>
+      <a:clrMap bg1="lt1" tx1="dk1" bg2="lt2" tx2="dk2" accent1="accent1" accent2="accent2" accent3="accent3" accent4="accent4" accent5="accent5" accent6="accent6" hlink="hlink" folHlink="folHlink"/>
+    </a:extraClrScheme>
+    <a:extraClrScheme>
+      <a:clrScheme name="Motiv Office 7">
+        <a:dk1>
+          <a:srgbClr val="000000"/>
+        </a:dk1>
+        <a:lt1>
+          <a:srgbClr val="FFFFFF"/>
+        </a:lt1>
+        <a:dk2>
+          <a:srgbClr val="000000"/>
+        </a:dk2>
+        <a:lt2>
+          <a:srgbClr val="808080"/>
+        </a:lt2>
+        <a:accent1>
+          <a:srgbClr val="3399FF"/>
+        </a:accent1>
+        <a:accent2>
+          <a:srgbClr val="99FFCC"/>
+        </a:accent2>
+        <a:accent3>
+          <a:srgbClr val="FFFFFF"/>
+        </a:accent3>
+        <a:accent4>
+          <a:srgbClr val="000000"/>
+        </a:accent4>
+        <a:accent5>
+          <a:srgbClr val="ADCAFF"/>
+        </a:accent5>
+        <a:accent6>
+          <a:srgbClr val="8AE7B9"/>
+        </a:accent6>
+        <a:hlink>
+          <a:srgbClr val="CC00CC"/>
+        </a:hlink>
+        <a:folHlink>
+          <a:srgbClr val="B2B2B2"/>
+        </a:folHlink>
+      </a:clrScheme>
+      <a:clrMap bg1="lt1" tx1="dk1" bg2="lt2" tx2="dk2" accent1="accent1" accent2="accent2" accent3="accent3" accent4="accent4" accent5="accent5" accent6="accent6" hlink="hlink" folHlink="folHlink"/>
+    </a:extraClrScheme>
+  </a:extraClrSchemeLst>
+  <a:extLst>
+    <a:ext uri="{05A4C25C-085E-4340-85A3-A5531E510DB2}">
+      <thm15:themeFamily xmlns:thm15="http://schemas.microsoft.com/office/thememl/2012/main" name="Office Theme" id="{62F939B6-93AF-4DB8-9C6B-D6C7DFDC589F}" vid="{4A3C46E8-61CC-4603-A589-7422A47A8E4A}"/>
+    </a:ext>
+  </a:extLst>
+</a:theme>
+</file>
+
+<file path=ppt/theme/theme3.xml><?xml version="1.0" encoding="utf-8"?>
 <a:theme xmlns:a="http://schemas.openxmlformats.org/drawingml/2006/main" name="Motiv Office">
   <a:themeElements>
     <a:clrScheme name="">

</xml_diff>

<commit_message>
přidány odpovědi na posudek oponenta
</commit_message>
<xml_diff>
--- a/presentation/Zakopal-prezentace.pptx
+++ b/presentation/Zakopal-prezentace.pptx
@@ -6,7 +6,7 @@
     <p:sldMasterId id="2147483654" r:id="rId2"/>
   </p:sldMasterIdLst>
   <p:notesMasterIdLst>
-    <p:notesMasterId r:id="rId17"/>
+    <p:notesMasterId r:id="rId21"/>
   </p:notesMasterIdLst>
   <p:sldIdLst>
     <p:sldId id="369" r:id="rId3"/>
@@ -18,11 +18,15 @@
     <p:sldId id="328" r:id="rId9"/>
     <p:sldId id="377" r:id="rId10"/>
     <p:sldId id="334" r:id="rId11"/>
-    <p:sldId id="382" r:id="rId12"/>
-    <p:sldId id="381" r:id="rId13"/>
-    <p:sldId id="375" r:id="rId14"/>
-    <p:sldId id="380" r:id="rId15"/>
-    <p:sldId id="379" r:id="rId16"/>
+    <p:sldId id="385" r:id="rId12"/>
+    <p:sldId id="384" r:id="rId13"/>
+    <p:sldId id="383" r:id="rId14"/>
+    <p:sldId id="386" r:id="rId15"/>
+    <p:sldId id="382" r:id="rId16"/>
+    <p:sldId id="381" r:id="rId17"/>
+    <p:sldId id="375" r:id="rId18"/>
+    <p:sldId id="380" r:id="rId19"/>
+    <p:sldId id="379" r:id="rId20"/>
   </p:sldIdLst>
   <p:sldSz cx="10080625" cy="7559675"/>
   <p:notesSz cx="6797675" cy="9928225"/>
@@ -1541,6 +1545,131 @@
           <a:bodyPr/>
           <a:lstStyle/>
           <a:p>
+            <a:r>
+              <a:rPr lang="en-GB" dirty="0"/>
+              <a:t>https://</a:t>
+            </a:r>
+            <a:r>
+              <a:rPr lang="en-GB" dirty="0" err="1"/>
+              <a:t>www.xilinx.com</a:t>
+            </a:r>
+            <a:r>
+              <a:rPr lang="en-GB" dirty="0"/>
+              <a:t>/</a:t>
+            </a:r>
+            <a:r>
+              <a:rPr lang="en-GB" dirty="0" err="1"/>
+              <a:t>htmldocs</a:t>
+            </a:r>
+            <a:r>
+              <a:rPr lang="en-GB" dirty="0"/>
+              <a:t>/xilinx2017_4/</a:t>
+            </a:r>
+            <a:r>
+              <a:rPr lang="en-GB" dirty="0" err="1"/>
+              <a:t>sdaccel_doc</a:t>
+            </a:r>
+            <a:r>
+              <a:rPr lang="en-GB" dirty="0"/>
+              <a:t>/elq1504034325058.html</a:t>
+            </a:r>
+          </a:p>
+          <a:p>
+            <a:endParaRPr lang="en-GB" dirty="0"/>
+          </a:p>
+          <a:p>
+            <a:r>
+              <a:rPr lang="en-GB" dirty="0"/>
+              <a:t>Global Memory</a:t>
+            </a:r>
+          </a:p>
+          <a:p>
+            <a:r>
+              <a:rPr lang="en-GB" dirty="0"/>
+              <a:t>https://</a:t>
+            </a:r>
+            <a:r>
+              <a:rPr lang="en-GB" dirty="0" err="1"/>
+              <a:t>www.xilinx.com</a:t>
+            </a:r>
+            <a:r>
+              <a:rPr lang="en-GB" dirty="0"/>
+              <a:t>/</a:t>
+            </a:r>
+            <a:r>
+              <a:rPr lang="en-GB" dirty="0" err="1"/>
+              <a:t>htmldocs</a:t>
+            </a:r>
+            <a:r>
+              <a:rPr lang="en-GB" dirty="0"/>
+              <a:t>/xilinx2017_4/</a:t>
+            </a:r>
+            <a:r>
+              <a:rPr lang="en-GB" dirty="0" err="1"/>
+              <a:t>sdaccel_doc</a:t>
+            </a:r>
+            <a:r>
+              <a:rPr lang="en-GB" dirty="0"/>
+              <a:t>/vwr1504034321825.html</a:t>
+            </a:r>
+          </a:p>
+          <a:p>
+            <a:endParaRPr lang="en-GB" dirty="0"/>
+          </a:p>
+          <a:p>
+            <a:r>
+              <a:rPr lang="en-GB" dirty="0" err="1"/>
+              <a:t>Ohledně</a:t>
+            </a:r>
+            <a:r>
+              <a:rPr lang="en-GB" dirty="0"/>
+              <a:t> Vitis a DDR</a:t>
+            </a:r>
+          </a:p>
+          <a:p>
+            <a:r>
+              <a:rPr lang="en-GB" dirty="0"/>
+              <a:t>https://</a:t>
+            </a:r>
+            <a:r>
+              <a:rPr lang="en-GB" dirty="0" err="1"/>
+              <a:t>docs.xilinx.com</a:t>
+            </a:r>
+            <a:r>
+              <a:rPr lang="en-GB" dirty="0"/>
+              <a:t>/r/</a:t>
+            </a:r>
+            <a:r>
+              <a:rPr lang="en-GB" dirty="0" err="1"/>
+              <a:t>en</a:t>
+            </a:r>
+            <a:r>
+              <a:rPr lang="en-GB" dirty="0"/>
+              <a:t>-US/ug1393-vitis-application-acceleration/Global-Memory</a:t>
+            </a:r>
+          </a:p>
+          <a:p>
+            <a:endParaRPr lang="en-GB" dirty="0"/>
+          </a:p>
+          <a:p>
+            <a:r>
+              <a:rPr lang="en-GB" dirty="0"/>
+              <a:t>„</a:t>
+            </a:r>
+            <a:r>
+              <a:rPr lang="en-GB" b="0" i="0" dirty="0">
+                <a:solidFill>
+                  <a:srgbClr val="444444"/>
+                </a:solidFill>
+                <a:effectLst/>
+                <a:latin typeface="Roboto" panose="02000000000000000000" pitchFamily="2" charset="0"/>
+              </a:rPr>
+              <a:t>Global memory is accessed by the kernel through AXI4 master interfaces. Each AXI4 interface operates independently of each other, and each AXI4 interface can be connected to one or more memory controllers to off-chip memory such as DDR4. Global memory is primarily used to pass large data sets to and from the kernel from the host. </a:t>
+            </a:r>
+            <a:r>
+              <a:rPr lang="en-GB" dirty="0"/>
+              <a:t>“</a:t>
+            </a:r>
             <a:endParaRPr lang="en-CZ" dirty="0"/>
           </a:p>
         </p:txBody>
@@ -1568,7 +1697,919 @@
               <a:pPr>
                 <a:defRPr/>
               </a:pPr>
-              <a:t>14</a:t>
+              <a:t>9</a:t>
+            </a:fld>
+            <a:endParaRPr lang="cs-CZ" altLang="cs-CZ" dirty="0"/>
+          </a:p>
+        </p:txBody>
+      </p:sp>
+    </p:spTree>
+    <p:extLst>
+      <p:ext uri="{BB962C8B-B14F-4D97-AF65-F5344CB8AC3E}">
+        <p14:creationId xmlns:p14="http://schemas.microsoft.com/office/powerpoint/2010/main" val="1586144398"/>
+      </p:ext>
+    </p:extLst>
+  </p:cSld>
+  <p:clrMapOvr>
+    <a:masterClrMapping/>
+  </p:clrMapOvr>
+</p:notes>
+</file>
+
+<file path=ppt/notesSlides/notesSlide5.xml><?xml version="1.0" encoding="utf-8"?>
+<p:notes xmlns:a="http://schemas.openxmlformats.org/drawingml/2006/main" xmlns:r="http://schemas.openxmlformats.org/officeDocument/2006/relationships" xmlns:p="http://schemas.openxmlformats.org/presentationml/2006/main">
+  <p:cSld>
+    <p:spTree>
+      <p:nvGrpSpPr>
+        <p:cNvPr id="1" name=""/>
+        <p:cNvGrpSpPr/>
+        <p:nvPr/>
+      </p:nvGrpSpPr>
+      <p:grpSpPr>
+        <a:xfrm>
+          <a:off x="0" y="0"/>
+          <a:ext cx="0" cy="0"/>
+          <a:chOff x="0" y="0"/>
+          <a:chExt cx="0" cy="0"/>
+        </a:xfrm>
+      </p:grpSpPr>
+      <p:sp>
+        <p:nvSpPr>
+          <p:cNvPr id="2" name="Slide Image Placeholder 1"/>
+          <p:cNvSpPr>
+            <a:spLocks noGrp="1" noRot="1" noChangeAspect="1"/>
+          </p:cNvSpPr>
+          <p:nvPr>
+            <p:ph type="sldImg"/>
+          </p:nvPr>
+        </p:nvSpPr>
+        <p:spPr/>
+      </p:sp>
+      <p:sp>
+        <p:nvSpPr>
+          <p:cNvPr id="3" name="Notes Placeholder 2"/>
+          <p:cNvSpPr>
+            <a:spLocks noGrp="1"/>
+          </p:cNvSpPr>
+          <p:nvPr>
+            <p:ph type="body" idx="1"/>
+          </p:nvPr>
+        </p:nvSpPr>
+        <p:spPr/>
+        <p:txBody>
+          <a:bodyPr/>
+          <a:lstStyle/>
+          <a:p>
+            <a:r>
+              <a:rPr lang="en-GB" dirty="0" err="1"/>
+              <a:t>Informace</a:t>
+            </a:r>
+            <a:r>
+              <a:rPr lang="en-GB" dirty="0"/>
+              <a:t> o </a:t>
+            </a:r>
+            <a:r>
+              <a:rPr lang="en-GB" dirty="0" err="1"/>
+              <a:t>přenosu</a:t>
+            </a:r>
+            <a:r>
+              <a:rPr lang="en-GB" dirty="0"/>
+              <a:t> do „</a:t>
+            </a:r>
+            <a:r>
+              <a:rPr lang="en-GB" dirty="0" err="1"/>
+              <a:t>globální</a:t>
+            </a:r>
+            <a:r>
+              <a:rPr lang="en-GB" dirty="0"/>
+              <a:t> </a:t>
+            </a:r>
+            <a:r>
+              <a:rPr lang="en-GB" dirty="0" err="1"/>
+              <a:t>pamětí</a:t>
+            </a:r>
+            <a:r>
+              <a:rPr lang="en-GB" dirty="0"/>
+              <a:t>“ https://</a:t>
+            </a:r>
+            <a:r>
+              <a:rPr lang="en-GB" dirty="0" err="1"/>
+              <a:t>www.xilinx.com</a:t>
+            </a:r>
+            <a:r>
+              <a:rPr lang="en-GB" dirty="0"/>
+              <a:t>/</a:t>
+            </a:r>
+            <a:r>
+              <a:rPr lang="en-GB" dirty="0" err="1"/>
+              <a:t>htmldocs</a:t>
+            </a:r>
+            <a:r>
+              <a:rPr lang="en-GB" dirty="0"/>
+              <a:t>/xilinx2017_4/</a:t>
+            </a:r>
+            <a:r>
+              <a:rPr lang="en-GB" dirty="0" err="1"/>
+              <a:t>sdaccel_doc</a:t>
+            </a:r>
+            <a:r>
+              <a:rPr lang="en-GB" dirty="0"/>
+              <a:t>/elq1504034325058.html</a:t>
+            </a:r>
+          </a:p>
+          <a:p>
+            <a:endParaRPr lang="en-GB" dirty="0"/>
+          </a:p>
+          <a:p>
+            <a:r>
+              <a:rPr lang="en-GB" dirty="0" err="1"/>
+              <a:t>Některé</a:t>
+            </a:r>
+            <a:r>
+              <a:rPr lang="en-GB" dirty="0"/>
+              <a:t> </a:t>
+            </a:r>
+            <a:r>
+              <a:rPr lang="en-GB" dirty="0" err="1"/>
+              <a:t>zdroje</a:t>
+            </a:r>
+            <a:r>
+              <a:rPr lang="en-GB" dirty="0"/>
+              <a:t> </a:t>
+            </a:r>
+            <a:r>
+              <a:rPr lang="en-GB" dirty="0" err="1"/>
+              <a:t>udávají</a:t>
+            </a:r>
+            <a:r>
+              <a:rPr lang="en-GB" dirty="0"/>
+              <a:t> </a:t>
+            </a:r>
+            <a:r>
+              <a:rPr lang="en-GB" dirty="0" err="1"/>
+              <a:t>i</a:t>
+            </a:r>
+            <a:r>
+              <a:rPr lang="en-GB" dirty="0"/>
+              <a:t> </a:t>
+            </a:r>
+            <a:r>
+              <a:rPr lang="en-GB" dirty="0" err="1"/>
+              <a:t>možnost</a:t>
+            </a:r>
+            <a:r>
+              <a:rPr lang="en-GB" dirty="0"/>
+              <a:t> </a:t>
+            </a:r>
+            <a:r>
+              <a:rPr lang="en-GB" dirty="0" err="1"/>
+              <a:t>propojení</a:t>
+            </a:r>
+            <a:r>
+              <a:rPr lang="en-GB" dirty="0"/>
+              <a:t> </a:t>
+            </a:r>
+            <a:r>
+              <a:rPr lang="en-GB" dirty="0" err="1"/>
+              <a:t>právě</a:t>
+            </a:r>
+            <a:r>
+              <a:rPr lang="en-GB" dirty="0"/>
+              <a:t> PCIe DDR </a:t>
+            </a:r>
+            <a:r>
+              <a:rPr lang="en-GB" dirty="0" err="1"/>
+              <a:t>externí</a:t>
+            </a:r>
+            <a:r>
+              <a:rPr lang="en-GB" dirty="0"/>
+              <a:t> </a:t>
+            </a:r>
+            <a:r>
+              <a:rPr lang="en-GB" dirty="0" err="1"/>
+              <a:t>paměti</a:t>
+            </a:r>
+            <a:r>
+              <a:rPr lang="en-GB" dirty="0"/>
+              <a:t> pro </a:t>
+            </a:r>
+            <a:r>
+              <a:rPr lang="en-GB" dirty="0" err="1"/>
+              <a:t>SoC.</a:t>
+            </a:r>
+            <a:endParaRPr lang="en-GB" dirty="0"/>
+          </a:p>
+          <a:p>
+            <a:r>
+              <a:rPr lang="en-GB" dirty="0"/>
+              <a:t>https://</a:t>
+            </a:r>
+            <a:r>
+              <a:rPr lang="en-GB" dirty="0" err="1"/>
+              <a:t>www.xilinx.com</a:t>
+            </a:r>
+            <a:r>
+              <a:rPr lang="en-GB" dirty="0"/>
+              <a:t>/video/</a:t>
+            </a:r>
+            <a:r>
+              <a:rPr lang="en-GB" dirty="0" err="1"/>
+              <a:t>fpga</a:t>
+            </a:r>
+            <a:r>
+              <a:rPr lang="en-GB" dirty="0"/>
+              <a:t>/</a:t>
+            </a:r>
+            <a:r>
+              <a:rPr lang="en-GB" dirty="0" err="1"/>
+              <a:t>axi</a:t>
+            </a:r>
+            <a:r>
+              <a:rPr lang="en-GB" dirty="0"/>
+              <a:t>-</a:t>
+            </a:r>
+            <a:r>
+              <a:rPr lang="en-GB" dirty="0" err="1"/>
+              <a:t>pci</a:t>
+            </a:r>
+            <a:r>
+              <a:rPr lang="en-GB" dirty="0"/>
+              <a:t>-express-</a:t>
+            </a:r>
+            <a:r>
+              <a:rPr lang="en-GB" dirty="0" err="1"/>
+              <a:t>mig</a:t>
+            </a:r>
+            <a:r>
+              <a:rPr lang="en-GB" dirty="0"/>
+              <a:t>-subsystem-built-in-</a:t>
+            </a:r>
+            <a:r>
+              <a:rPr lang="en-GB" dirty="0" err="1"/>
+              <a:t>ipi.html</a:t>
+            </a:r>
+            <a:endParaRPr lang="en-GB" dirty="0"/>
+          </a:p>
+          <a:p>
+            <a:endParaRPr lang="en-CZ" dirty="0"/>
+          </a:p>
+        </p:txBody>
+      </p:sp>
+      <p:sp>
+        <p:nvSpPr>
+          <p:cNvPr id="4" name="Slide Number Placeholder 3"/>
+          <p:cNvSpPr>
+            <a:spLocks noGrp="1"/>
+          </p:cNvSpPr>
+          <p:nvPr>
+            <p:ph type="sldNum"/>
+          </p:nvPr>
+        </p:nvSpPr>
+        <p:spPr/>
+        <p:txBody>
+          <a:bodyPr/>
+          <a:lstStyle/>
+          <a:p>
+            <a:pPr>
+              <a:defRPr/>
+            </a:pPr>
+            <a:fld id="{8598801B-DE11-45C9-A143-93468F8D5D2F}" type="slidenum">
+              <a:rPr lang="cs-CZ" altLang="cs-CZ" smtClean="0"/>
+              <a:pPr>
+                <a:defRPr/>
+              </a:pPr>
+              <a:t>10</a:t>
+            </a:fld>
+            <a:endParaRPr lang="cs-CZ" altLang="cs-CZ" dirty="0"/>
+          </a:p>
+        </p:txBody>
+      </p:sp>
+    </p:spTree>
+    <p:extLst>
+      <p:ext uri="{BB962C8B-B14F-4D97-AF65-F5344CB8AC3E}">
+        <p14:creationId xmlns:p14="http://schemas.microsoft.com/office/powerpoint/2010/main" val="780846173"/>
+      </p:ext>
+    </p:extLst>
+  </p:cSld>
+  <p:clrMapOvr>
+    <a:masterClrMapping/>
+  </p:clrMapOvr>
+</p:notes>
+</file>
+
+<file path=ppt/notesSlides/notesSlide6.xml><?xml version="1.0" encoding="utf-8"?>
+<p:notes xmlns:a="http://schemas.openxmlformats.org/drawingml/2006/main" xmlns:r="http://schemas.openxmlformats.org/officeDocument/2006/relationships" xmlns:p="http://schemas.openxmlformats.org/presentationml/2006/main">
+  <p:cSld>
+    <p:spTree>
+      <p:nvGrpSpPr>
+        <p:cNvPr id="1" name=""/>
+        <p:cNvGrpSpPr/>
+        <p:nvPr/>
+      </p:nvGrpSpPr>
+      <p:grpSpPr>
+        <a:xfrm>
+          <a:off x="0" y="0"/>
+          <a:ext cx="0" cy="0"/>
+          <a:chOff x="0" y="0"/>
+          <a:chExt cx="0" cy="0"/>
+        </a:xfrm>
+      </p:grpSpPr>
+      <p:sp>
+        <p:nvSpPr>
+          <p:cNvPr id="2" name="Slide Image Placeholder 1"/>
+          <p:cNvSpPr>
+            <a:spLocks noGrp="1" noRot="1" noChangeAspect="1"/>
+          </p:cNvSpPr>
+          <p:nvPr>
+            <p:ph type="sldImg"/>
+          </p:nvPr>
+        </p:nvSpPr>
+        <p:spPr/>
+      </p:sp>
+      <p:sp>
+        <p:nvSpPr>
+          <p:cNvPr id="3" name="Notes Placeholder 2"/>
+          <p:cNvSpPr>
+            <a:spLocks noGrp="1"/>
+          </p:cNvSpPr>
+          <p:nvPr>
+            <p:ph type="body" idx="1"/>
+          </p:nvPr>
+        </p:nvSpPr>
+        <p:spPr/>
+        <p:txBody>
+          <a:bodyPr/>
+          <a:lstStyle/>
+          <a:p>
+            <a:r>
+              <a:rPr lang="en-GB" dirty="0" err="1"/>
+              <a:t>Zde</a:t>
+            </a:r>
+            <a:r>
+              <a:rPr lang="en-GB" dirty="0"/>
+              <a:t> je </a:t>
+            </a:r>
+            <a:r>
+              <a:rPr lang="en-GB" dirty="0" err="1"/>
+              <a:t>napsáno</a:t>
+            </a:r>
+            <a:r>
+              <a:rPr lang="en-GB" dirty="0"/>
+              <a:t> v </a:t>
+            </a:r>
+            <a:r>
+              <a:rPr lang="en-GB" dirty="0" err="1"/>
+              <a:t>dokumentaci</a:t>
+            </a:r>
+            <a:r>
+              <a:rPr lang="en-GB" dirty="0"/>
+              <a:t> - </a:t>
+            </a:r>
+            <a:r>
+              <a:rPr lang="en-GB" b="1" i="0" dirty="0">
+                <a:solidFill>
+                  <a:srgbClr val="444444"/>
+                </a:solidFill>
+                <a:effectLst/>
+                <a:latin typeface="Roboto" panose="02000000000000000000" pitchFamily="2" charset="0"/>
+              </a:rPr>
+              <a:t>PL Clocks </a:t>
+            </a:r>
+            <a:r>
+              <a:rPr lang="en-GB" b="0" i="0" dirty="0">
+                <a:solidFill>
+                  <a:srgbClr val="444444"/>
+                </a:solidFill>
+                <a:effectLst/>
+                <a:latin typeface="Roboto" panose="02000000000000000000" pitchFamily="2" charset="0"/>
+              </a:rPr>
+              <a:t>– PS generated clock to PL: PL0, PL1, PL2, and PL3</a:t>
+            </a:r>
+            <a:endParaRPr lang="en-GB" dirty="0"/>
+          </a:p>
+          <a:p>
+            <a:r>
+              <a:rPr lang="en-GB" dirty="0"/>
+              <a:t>https://</a:t>
+            </a:r>
+            <a:r>
+              <a:rPr lang="en-GB" dirty="0" err="1"/>
+              <a:t>docs.xilinx.com</a:t>
+            </a:r>
+            <a:r>
+              <a:rPr lang="en-GB" dirty="0"/>
+              <a:t>/r/</a:t>
+            </a:r>
+            <a:r>
+              <a:rPr lang="en-GB" dirty="0" err="1"/>
+              <a:t>en</a:t>
+            </a:r>
+            <a:r>
+              <a:rPr lang="en-GB" dirty="0"/>
+              <a:t>-US/pg201-zynq-ultrascale-plus-processing-system/Output-Clocks-Enable-Manual-Mode</a:t>
+            </a:r>
+          </a:p>
+          <a:p>
+            <a:endParaRPr lang="en-GB" dirty="0"/>
+          </a:p>
+          <a:p>
+            <a:r>
+              <a:rPr lang="en-GB" dirty="0"/>
+              <a:t>Pinout </a:t>
+            </a:r>
+            <a:r>
+              <a:rPr lang="en-GB" dirty="0" err="1"/>
+              <a:t>na</a:t>
+            </a:r>
+            <a:r>
+              <a:rPr lang="en-GB" dirty="0"/>
+              <a:t> Raspberry Pi s GPIO5, </a:t>
+            </a:r>
+            <a:r>
+              <a:rPr lang="en-GB" dirty="0" err="1"/>
+              <a:t>kde</a:t>
+            </a:r>
+            <a:r>
+              <a:rPr lang="en-GB" dirty="0"/>
+              <a:t> je </a:t>
+            </a:r>
+            <a:r>
+              <a:rPr lang="en-GB" dirty="0" err="1"/>
+              <a:t>možný</a:t>
+            </a:r>
+            <a:r>
+              <a:rPr lang="en-GB" dirty="0"/>
+              <a:t> </a:t>
+            </a:r>
+            <a:r>
+              <a:rPr lang="en-GB" dirty="0" err="1"/>
+              <a:t>výstup</a:t>
+            </a:r>
+            <a:r>
+              <a:rPr lang="en-GB" dirty="0"/>
+              <a:t> PLL pro </a:t>
+            </a:r>
+            <a:r>
+              <a:rPr lang="en-GB" dirty="0" err="1"/>
+              <a:t>taktování</a:t>
+            </a:r>
+            <a:r>
+              <a:rPr lang="en-GB" dirty="0"/>
+              <a:t> FPGA bez </a:t>
+            </a:r>
+            <a:r>
+              <a:rPr lang="en-GB" dirty="0" err="1"/>
+              <a:t>dalšího</a:t>
+            </a:r>
+            <a:r>
+              <a:rPr lang="en-GB" dirty="0"/>
+              <a:t> </a:t>
+            </a:r>
+            <a:r>
+              <a:rPr lang="en-GB" dirty="0" err="1"/>
+              <a:t>oscilátoru</a:t>
+            </a:r>
+            <a:endParaRPr lang="en-GB" dirty="0"/>
+          </a:p>
+          <a:p>
+            <a:r>
+              <a:rPr lang="en-GB" dirty="0"/>
+              <a:t>https://</a:t>
+            </a:r>
+            <a:r>
+              <a:rPr lang="en-GB" dirty="0" err="1"/>
+              <a:t>pinout.xyz</a:t>
+            </a:r>
+            <a:r>
+              <a:rPr lang="en-GB" dirty="0"/>
+              <a:t>/pinout/</a:t>
+            </a:r>
+            <a:r>
+              <a:rPr lang="en-GB" dirty="0" err="1"/>
+              <a:t>gpclk</a:t>
+            </a:r>
+            <a:endParaRPr lang="en-GB" dirty="0"/>
+          </a:p>
+          <a:p>
+            <a:endParaRPr lang="en-GB" dirty="0"/>
+          </a:p>
+          <a:p>
+            <a:r>
+              <a:rPr lang="en-GB" dirty="0" err="1"/>
+              <a:t>Nejspíše</a:t>
+            </a:r>
+            <a:r>
+              <a:rPr lang="en-GB" dirty="0"/>
+              <a:t> to </a:t>
+            </a:r>
+            <a:r>
+              <a:rPr lang="en-GB" dirty="0" err="1"/>
+              <a:t>funguje</a:t>
+            </a:r>
+            <a:r>
+              <a:rPr lang="en-GB" dirty="0"/>
+              <a:t> </a:t>
+            </a:r>
+            <a:r>
+              <a:rPr lang="en-GB" dirty="0" err="1"/>
+              <a:t>tak</a:t>
+            </a:r>
+            <a:r>
+              <a:rPr lang="en-GB" dirty="0"/>
+              <a:t>, </a:t>
+            </a:r>
+            <a:r>
+              <a:rPr lang="en-GB" dirty="0" err="1"/>
+              <a:t>že</a:t>
+            </a:r>
+            <a:r>
+              <a:rPr lang="en-GB" dirty="0"/>
+              <a:t> </a:t>
+            </a:r>
+            <a:r>
+              <a:rPr lang="en-GB" dirty="0" err="1"/>
+              <a:t>pomocí</a:t>
+            </a:r>
+            <a:r>
+              <a:rPr lang="en-GB" dirty="0"/>
+              <a:t> </a:t>
+            </a:r>
+            <a:r>
+              <a:rPr lang="en-GB" dirty="0" err="1"/>
+              <a:t>oscilátoru</a:t>
+            </a:r>
+            <a:r>
+              <a:rPr lang="en-GB" dirty="0"/>
+              <a:t> je </a:t>
+            </a:r>
+            <a:r>
+              <a:rPr lang="en-GB" dirty="0" err="1"/>
+              <a:t>taktován</a:t>
+            </a:r>
+            <a:r>
+              <a:rPr lang="en-GB" dirty="0"/>
+              <a:t> PS a </a:t>
+            </a:r>
+            <a:r>
+              <a:rPr lang="en-GB" dirty="0" err="1"/>
+              <a:t>pak</a:t>
+            </a:r>
+            <a:r>
+              <a:rPr lang="en-GB" dirty="0"/>
+              <a:t> je v PS PLL (</a:t>
+            </a:r>
+            <a:r>
+              <a:rPr lang="en-GB" dirty="0" err="1"/>
+              <a:t>fázový</a:t>
+            </a:r>
+            <a:r>
+              <a:rPr lang="en-GB" dirty="0"/>
+              <a:t> </a:t>
+            </a:r>
+            <a:r>
+              <a:rPr lang="en-GB" dirty="0" err="1"/>
+              <a:t>závěs</a:t>
+            </a:r>
+            <a:r>
+              <a:rPr lang="en-GB" dirty="0"/>
+              <a:t>), </a:t>
+            </a:r>
+            <a:r>
+              <a:rPr lang="en-GB" dirty="0" err="1"/>
+              <a:t>který</a:t>
+            </a:r>
+            <a:r>
+              <a:rPr lang="en-GB" dirty="0"/>
+              <a:t> </a:t>
+            </a:r>
+            <a:r>
+              <a:rPr lang="en-GB" dirty="0" err="1"/>
+              <a:t>generuje</a:t>
+            </a:r>
+            <a:r>
+              <a:rPr lang="en-GB" dirty="0"/>
+              <a:t> </a:t>
+            </a:r>
+            <a:r>
+              <a:rPr lang="en-GB" dirty="0" err="1"/>
+              <a:t>na</a:t>
+            </a:r>
+            <a:r>
+              <a:rPr lang="en-GB" dirty="0"/>
+              <a:t> </a:t>
+            </a:r>
+            <a:r>
+              <a:rPr lang="en-GB" dirty="0" err="1"/>
+              <a:t>různé</a:t>
+            </a:r>
+            <a:r>
+              <a:rPr lang="en-GB" dirty="0"/>
+              <a:t> </a:t>
+            </a:r>
+            <a:r>
+              <a:rPr lang="en-GB" dirty="0" err="1"/>
+              <a:t>výstupy</a:t>
+            </a:r>
+            <a:r>
+              <a:rPr lang="en-GB" dirty="0"/>
+              <a:t> </a:t>
+            </a:r>
+            <a:r>
+              <a:rPr lang="en-GB" dirty="0" err="1"/>
+              <a:t>různé</a:t>
+            </a:r>
+            <a:r>
+              <a:rPr lang="en-GB" dirty="0"/>
+              <a:t> CLK </a:t>
+            </a:r>
+            <a:r>
+              <a:rPr lang="en-GB" dirty="0" err="1"/>
+              <a:t>signály</a:t>
+            </a:r>
+            <a:r>
+              <a:rPr lang="en-GB" dirty="0"/>
+              <a:t>, </a:t>
+            </a:r>
+            <a:r>
+              <a:rPr lang="en-GB" dirty="0" err="1"/>
+              <a:t>které</a:t>
+            </a:r>
+            <a:r>
+              <a:rPr lang="en-GB" dirty="0"/>
+              <a:t> </a:t>
+            </a:r>
+            <a:r>
+              <a:rPr lang="en-GB" dirty="0" err="1"/>
+              <a:t>poté</a:t>
+            </a:r>
+            <a:r>
+              <a:rPr lang="en-GB" dirty="0"/>
+              <a:t> </a:t>
+            </a:r>
+            <a:r>
+              <a:rPr lang="en-GB" dirty="0" err="1"/>
+              <a:t>jsou</a:t>
+            </a:r>
+            <a:r>
+              <a:rPr lang="en-GB" dirty="0"/>
+              <a:t> v </a:t>
+            </a:r>
+            <a:r>
+              <a:rPr lang="en-GB" dirty="0" err="1"/>
+              <a:t>ZynQ</a:t>
+            </a:r>
+            <a:r>
+              <a:rPr lang="en-GB" dirty="0"/>
+              <a:t> </a:t>
+            </a:r>
+            <a:r>
+              <a:rPr lang="en-GB" dirty="0" err="1"/>
+              <a:t>MPSoC</a:t>
+            </a:r>
+            <a:r>
+              <a:rPr lang="en-GB" dirty="0"/>
+              <a:t> </a:t>
+            </a:r>
+            <a:r>
+              <a:rPr lang="en-GB" dirty="0" err="1"/>
+              <a:t>bloku</a:t>
+            </a:r>
+            <a:r>
+              <a:rPr lang="en-GB" dirty="0"/>
+              <a:t> </a:t>
+            </a:r>
+            <a:r>
+              <a:rPr lang="en-GB" dirty="0" err="1"/>
+              <a:t>nastaveny</a:t>
+            </a:r>
+            <a:r>
+              <a:rPr lang="en-GB" dirty="0"/>
+              <a:t> </a:t>
+            </a:r>
+            <a:r>
+              <a:rPr lang="en-GB" dirty="0" err="1"/>
+              <a:t>jako</a:t>
+            </a:r>
+            <a:r>
+              <a:rPr lang="en-GB" dirty="0"/>
+              <a:t> </a:t>
+            </a:r>
+            <a:r>
+              <a:rPr lang="en-GB" dirty="0" err="1"/>
+              <a:t>vstupy</a:t>
+            </a:r>
+            <a:r>
+              <a:rPr lang="en-GB" dirty="0"/>
+              <a:t> pro PL clock.</a:t>
+            </a:r>
+            <a:endParaRPr lang="en-CZ" dirty="0"/>
+          </a:p>
+        </p:txBody>
+      </p:sp>
+      <p:sp>
+        <p:nvSpPr>
+          <p:cNvPr id="4" name="Slide Number Placeholder 3"/>
+          <p:cNvSpPr>
+            <a:spLocks noGrp="1"/>
+          </p:cNvSpPr>
+          <p:nvPr>
+            <p:ph type="sldNum"/>
+          </p:nvPr>
+        </p:nvSpPr>
+        <p:spPr/>
+        <p:txBody>
+          <a:bodyPr/>
+          <a:lstStyle/>
+          <a:p>
+            <a:pPr>
+              <a:defRPr/>
+            </a:pPr>
+            <a:fld id="{8598801B-DE11-45C9-A143-93468F8D5D2F}" type="slidenum">
+              <a:rPr lang="cs-CZ" altLang="cs-CZ" smtClean="0"/>
+              <a:pPr>
+                <a:defRPr/>
+              </a:pPr>
+              <a:t>12</a:t>
+            </a:fld>
+            <a:endParaRPr lang="cs-CZ" altLang="cs-CZ" dirty="0"/>
+          </a:p>
+        </p:txBody>
+      </p:sp>
+    </p:spTree>
+    <p:extLst>
+      <p:ext uri="{BB962C8B-B14F-4D97-AF65-F5344CB8AC3E}">
+        <p14:creationId xmlns:p14="http://schemas.microsoft.com/office/powerpoint/2010/main" val="2063119388"/>
+      </p:ext>
+    </p:extLst>
+  </p:cSld>
+  <p:clrMapOvr>
+    <a:masterClrMapping/>
+  </p:clrMapOvr>
+</p:notes>
+</file>
+
+<file path=ppt/notesSlides/notesSlide7.xml><?xml version="1.0" encoding="utf-8"?>
+<p:notes xmlns:a="http://schemas.openxmlformats.org/drawingml/2006/main" xmlns:r="http://schemas.openxmlformats.org/officeDocument/2006/relationships" xmlns:p="http://schemas.openxmlformats.org/presentationml/2006/main">
+  <p:cSld>
+    <p:spTree>
+      <p:nvGrpSpPr>
+        <p:cNvPr id="1" name=""/>
+        <p:cNvGrpSpPr/>
+        <p:nvPr/>
+      </p:nvGrpSpPr>
+      <p:grpSpPr>
+        <a:xfrm>
+          <a:off x="0" y="0"/>
+          <a:ext cx="0" cy="0"/>
+          <a:chOff x="0" y="0"/>
+          <a:chExt cx="0" cy="0"/>
+        </a:xfrm>
+      </p:grpSpPr>
+      <p:sp>
+        <p:nvSpPr>
+          <p:cNvPr id="2" name="Slide Image Placeholder 1"/>
+          <p:cNvSpPr>
+            <a:spLocks noGrp="1" noRot="1" noChangeAspect="1"/>
+          </p:cNvSpPr>
+          <p:nvPr>
+            <p:ph type="sldImg"/>
+          </p:nvPr>
+        </p:nvSpPr>
+        <p:spPr/>
+      </p:sp>
+      <p:sp>
+        <p:nvSpPr>
+          <p:cNvPr id="3" name="Notes Placeholder 2"/>
+          <p:cNvSpPr>
+            <a:spLocks noGrp="1"/>
+          </p:cNvSpPr>
+          <p:nvPr>
+            <p:ph type="body" idx="1"/>
+          </p:nvPr>
+        </p:nvSpPr>
+        <p:spPr/>
+        <p:txBody>
+          <a:bodyPr/>
+          <a:lstStyle/>
+          <a:p>
+            <a:endParaRPr lang="en-CZ" dirty="0"/>
+          </a:p>
+        </p:txBody>
+      </p:sp>
+      <p:sp>
+        <p:nvSpPr>
+          <p:cNvPr id="4" name="Slide Number Placeholder 3"/>
+          <p:cNvSpPr>
+            <a:spLocks noGrp="1"/>
+          </p:cNvSpPr>
+          <p:nvPr>
+            <p:ph type="sldNum"/>
+          </p:nvPr>
+        </p:nvSpPr>
+        <p:spPr/>
+        <p:txBody>
+          <a:bodyPr/>
+          <a:lstStyle/>
+          <a:p>
+            <a:pPr>
+              <a:defRPr/>
+            </a:pPr>
+            <a:fld id="{8598801B-DE11-45C9-A143-93468F8D5D2F}" type="slidenum">
+              <a:rPr lang="cs-CZ" altLang="cs-CZ" smtClean="0"/>
+              <a:pPr>
+                <a:defRPr/>
+              </a:pPr>
+              <a:t>13</a:t>
+            </a:fld>
+            <a:endParaRPr lang="cs-CZ" altLang="cs-CZ" dirty="0"/>
+          </a:p>
+        </p:txBody>
+      </p:sp>
+    </p:spTree>
+    <p:extLst>
+      <p:ext uri="{BB962C8B-B14F-4D97-AF65-F5344CB8AC3E}">
+        <p14:creationId xmlns:p14="http://schemas.microsoft.com/office/powerpoint/2010/main" val="3470336303"/>
+      </p:ext>
+    </p:extLst>
+  </p:cSld>
+  <p:clrMapOvr>
+    <a:masterClrMapping/>
+  </p:clrMapOvr>
+</p:notes>
+</file>
+
+<file path=ppt/notesSlides/notesSlide8.xml><?xml version="1.0" encoding="utf-8"?>
+<p:notes xmlns:a="http://schemas.openxmlformats.org/drawingml/2006/main" xmlns:r="http://schemas.openxmlformats.org/officeDocument/2006/relationships" xmlns:p="http://schemas.openxmlformats.org/presentationml/2006/main">
+  <p:cSld>
+    <p:spTree>
+      <p:nvGrpSpPr>
+        <p:cNvPr id="1" name=""/>
+        <p:cNvGrpSpPr/>
+        <p:nvPr/>
+      </p:nvGrpSpPr>
+      <p:grpSpPr>
+        <a:xfrm>
+          <a:off x="0" y="0"/>
+          <a:ext cx="0" cy="0"/>
+          <a:chOff x="0" y="0"/>
+          <a:chExt cx="0" cy="0"/>
+        </a:xfrm>
+      </p:grpSpPr>
+      <p:sp>
+        <p:nvSpPr>
+          <p:cNvPr id="2" name="Slide Image Placeholder 1"/>
+          <p:cNvSpPr>
+            <a:spLocks noGrp="1" noRot="1" noChangeAspect="1"/>
+          </p:cNvSpPr>
+          <p:nvPr>
+            <p:ph type="sldImg"/>
+          </p:nvPr>
+        </p:nvSpPr>
+        <p:spPr/>
+      </p:sp>
+      <p:sp>
+        <p:nvSpPr>
+          <p:cNvPr id="3" name="Notes Placeholder 2"/>
+          <p:cNvSpPr>
+            <a:spLocks noGrp="1"/>
+          </p:cNvSpPr>
+          <p:nvPr>
+            <p:ph type="body" idx="1"/>
+          </p:nvPr>
+        </p:nvSpPr>
+        <p:spPr/>
+        <p:txBody>
+          <a:bodyPr/>
+          <a:lstStyle/>
+          <a:p>
+            <a:endParaRPr lang="en-CZ" dirty="0"/>
+          </a:p>
+        </p:txBody>
+      </p:sp>
+      <p:sp>
+        <p:nvSpPr>
+          <p:cNvPr id="4" name="Slide Number Placeholder 3"/>
+          <p:cNvSpPr>
+            <a:spLocks noGrp="1"/>
+          </p:cNvSpPr>
+          <p:nvPr>
+            <p:ph type="sldNum"/>
+          </p:nvPr>
+        </p:nvSpPr>
+        <p:spPr/>
+        <p:txBody>
+          <a:bodyPr/>
+          <a:lstStyle/>
+          <a:p>
+            <a:pPr>
+              <a:defRPr/>
+            </a:pPr>
+            <a:fld id="{8598801B-DE11-45C9-A143-93468F8D5D2F}" type="slidenum">
+              <a:rPr lang="cs-CZ" altLang="cs-CZ" smtClean="0"/>
+              <a:pPr>
+                <a:defRPr/>
+              </a:pPr>
+              <a:t>18</a:t>
             </a:fld>
             <a:endParaRPr lang="cs-CZ" altLang="cs-CZ" dirty="0"/>
           </a:p>
@@ -5320,6 +6361,2151 @@
       </p:grpSpPr>
       <p:sp>
         <p:nvSpPr>
+          <p:cNvPr id="2" name="Nadpis 1">
+            <a:extLst>
+              <a:ext uri="{FF2B5EF4-FFF2-40B4-BE49-F238E27FC236}">
+                <a16:creationId xmlns:a16="http://schemas.microsoft.com/office/drawing/2014/main" id="{50B1320F-8B04-28D1-3DC3-1D0E0863C753}"/>
+              </a:ext>
+            </a:extLst>
+          </p:cNvPr>
+          <p:cNvSpPr>
+            <a:spLocks noGrp="1"/>
+          </p:cNvSpPr>
+          <p:nvPr>
+            <p:ph type="title"/>
+          </p:nvPr>
+        </p:nvSpPr>
+        <p:spPr/>
+        <p:txBody>
+          <a:bodyPr/>
+          <a:lstStyle/>
+          <a:p>
+            <a:r>
+              <a:rPr lang="cs-CZ" dirty="0"/>
+              <a:t>Otázka č. 1</a:t>
+            </a:r>
+            <a:endParaRPr lang="en-US" dirty="0"/>
+          </a:p>
+        </p:txBody>
+      </p:sp>
+      <p:sp>
+        <p:nvSpPr>
+          <p:cNvPr id="3" name="Zástupný obsah 2">
+            <a:extLst>
+              <a:ext uri="{FF2B5EF4-FFF2-40B4-BE49-F238E27FC236}">
+                <a16:creationId xmlns:a16="http://schemas.microsoft.com/office/drawing/2014/main" id="{E7D969BC-ADF2-0ADD-9B62-A691718A88B3}"/>
+              </a:ext>
+            </a:extLst>
+          </p:cNvPr>
+          <p:cNvSpPr>
+            <a:spLocks noGrp="1"/>
+          </p:cNvSpPr>
+          <p:nvPr>
+            <p:ph idx="1"/>
+          </p:nvPr>
+        </p:nvSpPr>
+        <p:spPr/>
+        <p:txBody>
+          <a:bodyPr/>
+          <a:lstStyle/>
+          <a:p>
+            <a:pPr marL="285750" indent="-285750"/>
+            <a:r>
+              <a:rPr lang="cs-CZ" b="1" dirty="0">
+                <a:solidFill>
+                  <a:srgbClr val="0050A0"/>
+                </a:solidFill>
+              </a:rPr>
+              <a:t>Otázka</a:t>
+            </a:r>
+            <a:r>
+              <a:rPr lang="cs-CZ" dirty="0">
+                <a:solidFill>
+                  <a:srgbClr val="0050A0"/>
+                </a:solidFill>
+              </a:rPr>
+              <a:t>: </a:t>
+            </a:r>
+            <a:r>
+              <a:rPr lang="cs-CZ" sz="1600" dirty="0">
+                <a:solidFill>
+                  <a:srgbClr val="0050A0"/>
+                </a:solidFill>
+              </a:rPr>
+              <a:t>V kapitole 18.1 na str. 8 je uvedeno, cituji: "Je vhodné doplnit informaci z [5], že </a:t>
+            </a:r>
+            <a:r>
+              <a:rPr lang="cs-CZ" sz="1600" dirty="0" err="1">
+                <a:solidFill>
+                  <a:srgbClr val="0050A0"/>
+                </a:solidFill>
+              </a:rPr>
+              <a:t>Xilinx</a:t>
+            </a:r>
+            <a:r>
+              <a:rPr lang="cs-CZ" sz="1600" dirty="0">
+                <a:solidFill>
+                  <a:srgbClr val="0050A0"/>
+                </a:solidFill>
+              </a:rPr>
+              <a:t> </a:t>
+            </a:r>
+            <a:r>
+              <a:rPr lang="cs-CZ" sz="1600" dirty="0" err="1">
+                <a:solidFill>
+                  <a:srgbClr val="0050A0"/>
+                </a:solidFill>
+              </a:rPr>
+              <a:t>MPSoC</a:t>
+            </a:r>
+            <a:r>
+              <a:rPr lang="cs-CZ" sz="1600" dirty="0">
+                <a:solidFill>
+                  <a:srgbClr val="0050A0"/>
+                </a:solidFill>
+              </a:rPr>
+              <a:t> K26 používá pro přenos dat z PS do globální paměti </a:t>
+            </a:r>
+            <a:r>
+              <a:rPr lang="cs-CZ" sz="1600" dirty="0" err="1">
+                <a:solidFill>
+                  <a:srgbClr val="0050A0"/>
+                </a:solidFill>
+              </a:rPr>
+              <a:t>PCIe</a:t>
+            </a:r>
+            <a:r>
+              <a:rPr lang="cs-CZ" sz="1600" dirty="0">
+                <a:solidFill>
+                  <a:srgbClr val="0050A0"/>
+                </a:solidFill>
+              </a:rPr>
+              <a:t> s propustností dat až 6,0 </a:t>
+            </a:r>
+            <a:r>
+              <a:rPr lang="cs-CZ" sz="1600" dirty="0" err="1">
+                <a:solidFill>
+                  <a:srgbClr val="0050A0"/>
+                </a:solidFill>
+              </a:rPr>
+              <a:t>Gb</a:t>
+            </a:r>
+            <a:r>
+              <a:rPr lang="cs-CZ" sz="1600" dirty="0">
+                <a:solidFill>
+                  <a:srgbClr val="0050A0"/>
+                </a:solidFill>
+              </a:rPr>
+              <a:t>/s. V tomto případě se nejedná o </a:t>
+            </a:r>
+            <a:r>
+              <a:rPr lang="cs-CZ" sz="1600" dirty="0" err="1">
+                <a:solidFill>
+                  <a:srgbClr val="0050A0"/>
+                </a:solidFill>
+              </a:rPr>
+              <a:t>PCIe</a:t>
+            </a:r>
+            <a:r>
+              <a:rPr lang="cs-CZ" sz="1600" dirty="0">
+                <a:solidFill>
+                  <a:srgbClr val="0050A0"/>
+                </a:solidFill>
+              </a:rPr>
+              <a:t> pro komunikaci s externími prvky, ale s globální pamětí umístěné na </a:t>
+            </a:r>
+            <a:r>
+              <a:rPr lang="cs-CZ" sz="1600" dirty="0" err="1">
+                <a:solidFill>
+                  <a:srgbClr val="0050A0"/>
+                </a:solidFill>
+              </a:rPr>
+              <a:t>MPSoC</a:t>
+            </a:r>
+            <a:r>
+              <a:rPr lang="cs-CZ" sz="1600" dirty="0">
+                <a:solidFill>
+                  <a:srgbClr val="0050A0"/>
+                </a:solidFill>
+              </a:rPr>
+              <a:t>." Přes jakou konkrétní paměť probíhá předávání dat mezi procesory (ARM) a programovatelnou logikou (FPGA)? Je připojena opravdu přes interní </a:t>
+            </a:r>
+            <a:r>
+              <a:rPr lang="cs-CZ" sz="1600" dirty="0" err="1">
+                <a:solidFill>
+                  <a:srgbClr val="0050A0"/>
+                </a:solidFill>
+              </a:rPr>
+              <a:t>PCIe</a:t>
+            </a:r>
+            <a:r>
+              <a:rPr lang="cs-CZ" sz="1600" dirty="0">
+                <a:solidFill>
+                  <a:srgbClr val="0050A0"/>
+                </a:solidFill>
+              </a:rPr>
+              <a:t>? Jakým způsobem by se na úrovni HW a SW řešila situace, kdy by tato paměť neměla dostatečnou velikost?</a:t>
+            </a:r>
+          </a:p>
+          <a:p>
+            <a:pPr marL="285750" indent="-285750"/>
+            <a:r>
+              <a:rPr lang="cs-CZ" b="1" dirty="0"/>
+              <a:t>Odpověď</a:t>
+            </a:r>
+            <a:r>
+              <a:rPr lang="cs-CZ" dirty="0"/>
+              <a:t>: </a:t>
+            </a:r>
+          </a:p>
+          <a:p>
+            <a:pPr marL="1087200" lvl="1" indent="-285750"/>
+            <a:r>
+              <a:rPr lang="cs-CZ" dirty="0"/>
+              <a:t>HW: V případě nedostatečné velikosti paměti DDR (celkově 4x1 GB), umístěné na </a:t>
+            </a:r>
+            <a:r>
+              <a:rPr lang="cs-CZ" dirty="0" err="1"/>
+              <a:t>MPSoC</a:t>
+            </a:r>
+            <a:r>
+              <a:rPr lang="cs-CZ" dirty="0"/>
+              <a:t> by bylo nutné umístit dodatečné paměti DDR na </a:t>
+            </a:r>
+            <a:r>
+              <a:rPr lang="cs-CZ" i="1" dirty="0" err="1"/>
+              <a:t>Carrier</a:t>
+            </a:r>
+            <a:r>
+              <a:rPr lang="cs-CZ" i="1" dirty="0"/>
+              <a:t> </a:t>
+            </a:r>
+            <a:r>
+              <a:rPr lang="cs-CZ" i="1" dirty="0" err="1"/>
+              <a:t>Card</a:t>
+            </a:r>
+            <a:r>
+              <a:rPr lang="cs-CZ" i="1" dirty="0"/>
+              <a:t> </a:t>
+            </a:r>
+            <a:r>
+              <a:rPr lang="cs-CZ" dirty="0"/>
+              <a:t>a v prostředí </a:t>
+            </a:r>
+            <a:r>
+              <a:rPr lang="cs-CZ" dirty="0" err="1"/>
+              <a:t>Vivado</a:t>
+            </a:r>
+            <a:r>
+              <a:rPr lang="cs-CZ" dirty="0"/>
+              <a:t> použít např. </a:t>
+            </a:r>
+            <a:r>
+              <a:rPr lang="cs-CZ" dirty="0" err="1"/>
+              <a:t>MiG</a:t>
+            </a:r>
+            <a:r>
+              <a:rPr lang="cs-CZ" dirty="0"/>
+              <a:t> IP blok pro komunikaci s danou pamětí.</a:t>
+            </a:r>
+          </a:p>
+          <a:p>
+            <a:pPr marL="1087200" lvl="1" indent="-285750"/>
+            <a:r>
+              <a:rPr lang="cs-CZ" dirty="0"/>
+              <a:t>SW&amp;HW: Další možností je realizovaný algoritmus rozdělit na více částí a využívat jen dostupnou velikost pamětí a výsledky postupně ukládat na vloženou SD kartu, či jinou paměťovou jednotku, připojenou přes USB.</a:t>
+            </a:r>
+          </a:p>
+          <a:p>
+            <a:pPr marL="1087200" lvl="1" indent="-285750"/>
+            <a:r>
+              <a:rPr lang="cs-CZ" dirty="0"/>
+              <a:t>SW: Data by bylo možné zpracovávat postupně a zasílat přes Ethernet do externího úložiště.</a:t>
+            </a:r>
+          </a:p>
+        </p:txBody>
+      </p:sp>
+    </p:spTree>
+    <p:extLst>
+      <p:ext uri="{BB962C8B-B14F-4D97-AF65-F5344CB8AC3E}">
+        <p14:creationId xmlns:p14="http://schemas.microsoft.com/office/powerpoint/2010/main" val="815674670"/>
+      </p:ext>
+    </p:extLst>
+  </p:cSld>
+  <p:clrMapOvr>
+    <a:masterClrMapping/>
+  </p:clrMapOvr>
+</p:sld>
+</file>
+
+<file path=ppt/slides/slide11.xml><?xml version="1.0" encoding="utf-8"?>
+<p:sld xmlns:a="http://schemas.openxmlformats.org/drawingml/2006/main" xmlns:r="http://schemas.openxmlformats.org/officeDocument/2006/relationships" xmlns:p="http://schemas.openxmlformats.org/presentationml/2006/main">
+  <p:cSld>
+    <p:spTree>
+      <p:nvGrpSpPr>
+        <p:cNvPr id="1" name=""/>
+        <p:cNvGrpSpPr/>
+        <p:nvPr/>
+      </p:nvGrpSpPr>
+      <p:grpSpPr>
+        <a:xfrm>
+          <a:off x="0" y="0"/>
+          <a:ext cx="0" cy="0"/>
+          <a:chOff x="0" y="0"/>
+          <a:chExt cx="0" cy="0"/>
+        </a:xfrm>
+      </p:grpSpPr>
+      <p:sp>
+        <p:nvSpPr>
+          <p:cNvPr id="2" name="Nadpis 1">
+            <a:extLst>
+              <a:ext uri="{FF2B5EF4-FFF2-40B4-BE49-F238E27FC236}">
+                <a16:creationId xmlns:a16="http://schemas.microsoft.com/office/drawing/2014/main" id="{50B1320F-8B04-28D1-3DC3-1D0E0863C753}"/>
+              </a:ext>
+            </a:extLst>
+          </p:cNvPr>
+          <p:cNvSpPr>
+            <a:spLocks noGrp="1"/>
+          </p:cNvSpPr>
+          <p:nvPr>
+            <p:ph type="title"/>
+          </p:nvPr>
+        </p:nvSpPr>
+        <p:spPr/>
+        <p:txBody>
+          <a:bodyPr/>
+          <a:lstStyle/>
+          <a:p>
+            <a:r>
+              <a:rPr lang="cs-CZ" dirty="0"/>
+              <a:t>Otázka č. 1</a:t>
+            </a:r>
+            <a:endParaRPr lang="en-US" dirty="0"/>
+          </a:p>
+        </p:txBody>
+      </p:sp>
+      <p:pic>
+        <p:nvPicPr>
+          <p:cNvPr id="4" name="Picture 3">
+            <a:extLst>
+              <a:ext uri="{FF2B5EF4-FFF2-40B4-BE49-F238E27FC236}">
+                <a16:creationId xmlns:a16="http://schemas.microsoft.com/office/drawing/2014/main" id="{36627FA0-BE3F-8CF3-20E2-175DCAF65FDD}"/>
+              </a:ext>
+            </a:extLst>
+          </p:cNvPr>
+          <p:cNvPicPr>
+            <a:picLocks noChangeAspect="1"/>
+          </p:cNvPicPr>
+          <p:nvPr/>
+        </p:nvPicPr>
+        <p:blipFill>
+          <a:blip r:embed="rId2"/>
+          <a:stretch>
+            <a:fillRect/>
+          </a:stretch>
+        </p:blipFill>
+        <p:spPr>
+          <a:xfrm>
+            <a:off x="1943968" y="1161310"/>
+            <a:ext cx="5648233" cy="5669101"/>
+          </a:xfrm>
+          <a:prstGeom prst="rect">
+            <a:avLst/>
+          </a:prstGeom>
+        </p:spPr>
+      </p:pic>
+      <p:cxnSp>
+        <p:nvCxnSpPr>
+          <p:cNvPr id="9" name="Straight Connector 8">
+            <a:extLst>
+              <a:ext uri="{FF2B5EF4-FFF2-40B4-BE49-F238E27FC236}">
+                <a16:creationId xmlns:a16="http://schemas.microsoft.com/office/drawing/2014/main" id="{0BAE1294-18C4-C04E-5C1A-6DCD4A12F75F}"/>
+              </a:ext>
+            </a:extLst>
+          </p:cNvPr>
+          <p:cNvCxnSpPr/>
+          <p:nvPr/>
+        </p:nvCxnSpPr>
+        <p:spPr bwMode="auto">
+          <a:xfrm>
+            <a:off x="5103048" y="4106492"/>
+            <a:ext cx="0" cy="1880049"/>
+          </a:xfrm>
+          <a:prstGeom prst="line">
+            <a:avLst/>
+          </a:prstGeom>
+          <a:solidFill>
+            <a:srgbClr val="00B8FF"/>
+          </a:solidFill>
+          <a:ln w="28575" cap="flat" cmpd="sng" algn="ctr">
+            <a:solidFill>
+              <a:srgbClr val="C60C30"/>
+            </a:solidFill>
+            <a:prstDash val="solid"/>
+            <a:round/>
+            <a:headEnd type="none" w="med" len="med"/>
+            <a:tailEnd type="none" w="med" len="med"/>
+          </a:ln>
+          <a:effectLst/>
+          <a:extLst>
+            <a:ext uri="{AF507438-7753-43E0-B8FC-AC1667EBCBE1}">
+              <a14:hiddenEffects xmlns:a14="http://schemas.microsoft.com/office/drawing/2010/main">
+                <a:effectLst>
+                  <a:outerShdw dist="35921" dir="2700000" algn="ctr" rotWithShape="0">
+                    <a:schemeClr val="bg2"/>
+                  </a:outerShdw>
+                </a:effectLst>
+              </a14:hiddenEffects>
+            </a:ext>
+          </a:extLst>
+        </p:spPr>
+      </p:cxnSp>
+      <p:cxnSp>
+        <p:nvCxnSpPr>
+          <p:cNvPr id="12" name="Straight Connector 11">
+            <a:extLst>
+              <a:ext uri="{FF2B5EF4-FFF2-40B4-BE49-F238E27FC236}">
+                <a16:creationId xmlns:a16="http://schemas.microsoft.com/office/drawing/2014/main" id="{5E48381A-C3DF-2439-83B9-6116E00B661F}"/>
+              </a:ext>
+            </a:extLst>
+          </p:cNvPr>
+          <p:cNvCxnSpPr/>
+          <p:nvPr/>
+        </p:nvCxnSpPr>
+        <p:spPr bwMode="auto">
+          <a:xfrm>
+            <a:off x="4954034" y="6156101"/>
+            <a:ext cx="0" cy="460318"/>
+          </a:xfrm>
+          <a:prstGeom prst="line">
+            <a:avLst/>
+          </a:prstGeom>
+          <a:solidFill>
+            <a:srgbClr val="00B8FF"/>
+          </a:solidFill>
+          <a:ln w="28575" cap="flat" cmpd="sng" algn="ctr">
+            <a:solidFill>
+              <a:srgbClr val="C60C30"/>
+            </a:solidFill>
+            <a:prstDash val="solid"/>
+            <a:round/>
+            <a:headEnd type="none" w="med" len="med"/>
+            <a:tailEnd type="none" w="med" len="med"/>
+          </a:ln>
+          <a:effectLst/>
+          <a:extLst>
+            <a:ext uri="{AF507438-7753-43E0-B8FC-AC1667EBCBE1}">
+              <a14:hiddenEffects xmlns:a14="http://schemas.microsoft.com/office/drawing/2010/main">
+                <a:effectLst>
+                  <a:outerShdw dist="35921" dir="2700000" algn="ctr" rotWithShape="0">
+                    <a:schemeClr val="bg2"/>
+                  </a:outerShdw>
+                </a:effectLst>
+              </a14:hiddenEffects>
+            </a:ext>
+          </a:extLst>
+        </p:spPr>
+      </p:cxnSp>
+      <p:cxnSp>
+        <p:nvCxnSpPr>
+          <p:cNvPr id="14" name="Straight Connector 13">
+            <a:extLst>
+              <a:ext uri="{FF2B5EF4-FFF2-40B4-BE49-F238E27FC236}">
+                <a16:creationId xmlns:a16="http://schemas.microsoft.com/office/drawing/2014/main" id="{10823096-9031-3C70-A91E-5E57F8B79675}"/>
+              </a:ext>
+            </a:extLst>
+          </p:cNvPr>
+          <p:cNvCxnSpPr/>
+          <p:nvPr/>
+        </p:nvCxnSpPr>
+        <p:spPr bwMode="auto">
+          <a:xfrm flipH="1">
+            <a:off x="6694781" y="3210704"/>
+            <a:ext cx="6773" cy="706217"/>
+          </a:xfrm>
+          <a:prstGeom prst="line">
+            <a:avLst/>
+          </a:prstGeom>
+          <a:solidFill>
+            <a:srgbClr val="00B8FF"/>
+          </a:solidFill>
+          <a:ln w="28575" cap="flat" cmpd="sng" algn="ctr">
+            <a:solidFill>
+              <a:srgbClr val="C60C30"/>
+            </a:solidFill>
+            <a:prstDash val="solid"/>
+            <a:round/>
+            <a:headEnd type="none" w="med" len="med"/>
+            <a:tailEnd type="none" w="med" len="med"/>
+          </a:ln>
+          <a:effectLst/>
+          <a:extLst>
+            <a:ext uri="{AF507438-7753-43E0-B8FC-AC1667EBCBE1}">
+              <a14:hiddenEffects xmlns:a14="http://schemas.microsoft.com/office/drawing/2010/main">
+                <a:effectLst>
+                  <a:outerShdw dist="35921" dir="2700000" algn="ctr" rotWithShape="0">
+                    <a:schemeClr val="bg2"/>
+                  </a:outerShdw>
+                </a:effectLst>
+              </a14:hiddenEffects>
+            </a:ext>
+          </a:extLst>
+        </p:spPr>
+      </p:cxnSp>
+      <p:cxnSp>
+        <p:nvCxnSpPr>
+          <p:cNvPr id="16" name="Straight Connector 15">
+            <a:extLst>
+              <a:ext uri="{FF2B5EF4-FFF2-40B4-BE49-F238E27FC236}">
+                <a16:creationId xmlns:a16="http://schemas.microsoft.com/office/drawing/2014/main" id="{2EFCFF24-F466-336C-CF44-832743644894}"/>
+              </a:ext>
+            </a:extLst>
+          </p:cNvPr>
+          <p:cNvCxnSpPr/>
+          <p:nvPr/>
+        </p:nvCxnSpPr>
+        <p:spPr bwMode="auto">
+          <a:xfrm>
+            <a:off x="6640594" y="4163531"/>
+            <a:ext cx="0" cy="882985"/>
+          </a:xfrm>
+          <a:prstGeom prst="line">
+            <a:avLst/>
+          </a:prstGeom>
+          <a:solidFill>
+            <a:srgbClr val="00B8FF"/>
+          </a:solidFill>
+          <a:ln w="28575" cap="flat" cmpd="sng" algn="ctr">
+            <a:solidFill>
+              <a:srgbClr val="C60C30"/>
+            </a:solidFill>
+            <a:prstDash val="solid"/>
+            <a:round/>
+            <a:headEnd type="none" w="med" len="med"/>
+            <a:tailEnd type="none" w="med" len="med"/>
+          </a:ln>
+          <a:effectLst/>
+          <a:extLst>
+            <a:ext uri="{AF507438-7753-43E0-B8FC-AC1667EBCBE1}">
+              <a14:hiddenEffects xmlns:a14="http://schemas.microsoft.com/office/drawing/2010/main">
+                <a:effectLst>
+                  <a:outerShdw dist="35921" dir="2700000" algn="ctr" rotWithShape="0">
+                    <a:schemeClr val="bg2"/>
+                  </a:outerShdw>
+                </a:effectLst>
+              </a14:hiddenEffects>
+            </a:ext>
+          </a:extLst>
+        </p:spPr>
+      </p:cxnSp>
+      <p:cxnSp>
+        <p:nvCxnSpPr>
+          <p:cNvPr id="18" name="Straight Connector 17">
+            <a:extLst>
+              <a:ext uri="{FF2B5EF4-FFF2-40B4-BE49-F238E27FC236}">
+                <a16:creationId xmlns:a16="http://schemas.microsoft.com/office/drawing/2014/main" id="{D78F2B14-F50C-E6F9-F88B-2AC1C8260E39}"/>
+              </a:ext>
+            </a:extLst>
+          </p:cNvPr>
+          <p:cNvCxnSpPr/>
+          <p:nvPr/>
+        </p:nvCxnSpPr>
+        <p:spPr bwMode="auto">
+          <a:xfrm>
+            <a:off x="6694781" y="5292005"/>
+            <a:ext cx="0" cy="694536"/>
+          </a:xfrm>
+          <a:prstGeom prst="line">
+            <a:avLst/>
+          </a:prstGeom>
+          <a:solidFill>
+            <a:srgbClr val="00B8FF"/>
+          </a:solidFill>
+          <a:ln w="28575" cap="flat" cmpd="sng" algn="ctr">
+            <a:solidFill>
+              <a:srgbClr val="C60C30"/>
+            </a:solidFill>
+            <a:prstDash val="solid"/>
+            <a:round/>
+            <a:headEnd type="none" w="med" len="med"/>
+            <a:tailEnd type="none" w="med" len="med"/>
+          </a:ln>
+          <a:effectLst/>
+          <a:extLst>
+            <a:ext uri="{AF507438-7753-43E0-B8FC-AC1667EBCBE1}">
+              <a14:hiddenEffects xmlns:a14="http://schemas.microsoft.com/office/drawing/2010/main">
+                <a:effectLst>
+                  <a:outerShdw dist="35921" dir="2700000" algn="ctr" rotWithShape="0">
+                    <a:schemeClr val="bg2"/>
+                  </a:outerShdw>
+                </a:effectLst>
+              </a14:hiddenEffects>
+            </a:ext>
+          </a:extLst>
+        </p:spPr>
+      </p:cxnSp>
+      <p:cxnSp>
+        <p:nvCxnSpPr>
+          <p:cNvPr id="27" name="Straight Arrow Connector 26">
+            <a:extLst>
+              <a:ext uri="{FF2B5EF4-FFF2-40B4-BE49-F238E27FC236}">
+                <a16:creationId xmlns:a16="http://schemas.microsoft.com/office/drawing/2014/main" id="{4E1B3C39-0E7E-9916-DECC-E509B8FEE053}"/>
+              </a:ext>
+            </a:extLst>
+          </p:cNvPr>
+          <p:cNvCxnSpPr/>
+          <p:nvPr/>
+        </p:nvCxnSpPr>
+        <p:spPr bwMode="auto">
+          <a:xfrm>
+            <a:off x="1943968" y="2339677"/>
+            <a:ext cx="3159080" cy="1080120"/>
+          </a:xfrm>
+          <a:prstGeom prst="straightConnector1">
+            <a:avLst/>
+          </a:prstGeom>
+          <a:solidFill>
+            <a:srgbClr val="00B8FF"/>
+          </a:solidFill>
+          <a:ln w="76200" cap="flat" cmpd="sng" algn="ctr">
+            <a:solidFill>
+              <a:srgbClr val="C60C30"/>
+            </a:solidFill>
+            <a:prstDash val="solid"/>
+            <a:round/>
+            <a:headEnd type="none" w="med" len="med"/>
+            <a:tailEnd type="triangle"/>
+          </a:ln>
+          <a:effectLst/>
+          <a:extLst>
+            <a:ext uri="{AF507438-7753-43E0-B8FC-AC1667EBCBE1}">
+              <a14:hiddenEffects xmlns:a14="http://schemas.microsoft.com/office/drawing/2010/main">
+                <a:effectLst>
+                  <a:outerShdw dist="35921" dir="2700000" algn="ctr" rotWithShape="0">
+                    <a:schemeClr val="bg2"/>
+                  </a:outerShdw>
+                </a:effectLst>
+              </a14:hiddenEffects>
+            </a:ext>
+          </a:extLst>
+        </p:spPr>
+      </p:cxnSp>
+      <p:cxnSp>
+        <p:nvCxnSpPr>
+          <p:cNvPr id="28" name="Straight Arrow Connector 27">
+            <a:extLst>
+              <a:ext uri="{FF2B5EF4-FFF2-40B4-BE49-F238E27FC236}">
+                <a16:creationId xmlns:a16="http://schemas.microsoft.com/office/drawing/2014/main" id="{6BCB0EE1-E09C-4F97-6B6E-A2E1D21CD57A}"/>
+              </a:ext>
+            </a:extLst>
+          </p:cNvPr>
+          <p:cNvCxnSpPr/>
+          <p:nvPr/>
+        </p:nvCxnSpPr>
+        <p:spPr bwMode="auto">
+          <a:xfrm flipH="1">
+            <a:off x="6779111" y="2557635"/>
+            <a:ext cx="1551383" cy="1006178"/>
+          </a:xfrm>
+          <a:prstGeom prst="straightConnector1">
+            <a:avLst/>
+          </a:prstGeom>
+          <a:solidFill>
+            <a:srgbClr val="00B8FF"/>
+          </a:solidFill>
+          <a:ln w="76200" cap="flat" cmpd="sng" algn="ctr">
+            <a:solidFill>
+              <a:srgbClr val="C60C30"/>
+            </a:solidFill>
+            <a:prstDash val="solid"/>
+            <a:round/>
+            <a:headEnd type="none" w="med" len="med"/>
+            <a:tailEnd type="triangle"/>
+          </a:ln>
+          <a:effectLst/>
+          <a:extLst>
+            <a:ext uri="{AF507438-7753-43E0-B8FC-AC1667EBCBE1}">
+              <a14:hiddenEffects xmlns:a14="http://schemas.microsoft.com/office/drawing/2010/main">
+                <a:effectLst>
+                  <a:outerShdw dist="35921" dir="2700000" algn="ctr" rotWithShape="0">
+                    <a:schemeClr val="bg2"/>
+                  </a:outerShdw>
+                </a:effectLst>
+              </a14:hiddenEffects>
+            </a:ext>
+          </a:extLst>
+        </p:spPr>
+      </p:cxnSp>
+      <p:sp>
+        <p:nvSpPr>
+          <p:cNvPr id="31" name="TextBox 30">
+            <a:extLst>
+              <a:ext uri="{FF2B5EF4-FFF2-40B4-BE49-F238E27FC236}">
+                <a16:creationId xmlns:a16="http://schemas.microsoft.com/office/drawing/2014/main" id="{C9B4F550-C0E7-BB80-7597-8300640B2BC1}"/>
+              </a:ext>
+            </a:extLst>
+          </p:cNvPr>
+          <p:cNvSpPr txBox="1"/>
+          <p:nvPr/>
+        </p:nvSpPr>
+        <p:spPr>
+          <a:xfrm>
+            <a:off x="51561" y="6808716"/>
+            <a:ext cx="9433045" cy="461665"/>
+          </a:xfrm>
+          <a:prstGeom prst="rect">
+            <a:avLst/>
+          </a:prstGeom>
+          <a:noFill/>
+        </p:spPr>
+        <p:txBody>
+          <a:bodyPr wrap="square" rtlCol="0">
+            <a:spAutoFit/>
+          </a:bodyPr>
+          <a:lstStyle/>
+          <a:p>
+            <a:r>
+              <a:rPr lang="en-GB" sz="1200" dirty="0">
+                <a:solidFill>
+                  <a:schemeClr val="bg2"/>
+                </a:solidFill>
+                <a:effectLst/>
+                <a:latin typeface="TimesNewRomanPSMT"/>
+              </a:rPr>
+              <a:t>XILINX, Inc. </a:t>
+            </a:r>
+            <a:r>
+              <a:rPr lang="en-GB" sz="1200" dirty="0" err="1">
+                <a:solidFill>
+                  <a:schemeClr val="bg2"/>
+                </a:solidFill>
+                <a:effectLst/>
+                <a:latin typeface="TimesNewRomanPSMT"/>
+              </a:rPr>
+              <a:t>Kria</a:t>
+            </a:r>
+            <a:r>
+              <a:rPr lang="en-GB" sz="1200" dirty="0">
+                <a:solidFill>
+                  <a:schemeClr val="bg2"/>
+                </a:solidFill>
+                <a:effectLst/>
+                <a:latin typeface="TimesNewRomanPSMT"/>
+              </a:rPr>
+              <a:t> K26 SOM Data Sheet (DS987). In: </a:t>
+            </a:r>
+            <a:r>
+              <a:rPr lang="en-GB" sz="1200" dirty="0">
+                <a:solidFill>
+                  <a:schemeClr val="bg2"/>
+                </a:solidFill>
+                <a:effectLst/>
+                <a:latin typeface="TimesNewRomanPS"/>
+              </a:rPr>
+              <a:t>AMD Xilinx Documentation Portal </a:t>
+            </a:r>
+            <a:r>
+              <a:rPr lang="en-GB" sz="1200" dirty="0">
+                <a:solidFill>
+                  <a:schemeClr val="bg2"/>
+                </a:solidFill>
+                <a:effectLst/>
+                <a:latin typeface="TimesNewRomanPSMT"/>
+              </a:rPr>
+              <a:t>[online]. 26. 07. 2022 [cit. 2023-03-18]. </a:t>
+            </a:r>
+            <a:r>
+              <a:rPr lang="en-GB" sz="1200" dirty="0" err="1">
+                <a:solidFill>
+                  <a:schemeClr val="bg2"/>
+                </a:solidFill>
+                <a:effectLst/>
+                <a:latin typeface="TimesNewRomanPSMT"/>
+              </a:rPr>
+              <a:t>Dostupn</a:t>
+            </a:r>
+            <a:r>
+              <a:rPr lang="en-GB" sz="1200" dirty="0" err="1">
+                <a:solidFill>
+                  <a:schemeClr val="bg2"/>
+                </a:solidFill>
+                <a:latin typeface="TimesNewRomanPSMT"/>
+              </a:rPr>
+              <a:t>é</a:t>
+            </a:r>
+            <a:r>
+              <a:rPr lang="en-GB" sz="1200" dirty="0">
+                <a:solidFill>
+                  <a:schemeClr val="bg2"/>
+                </a:solidFill>
+                <a:effectLst/>
+                <a:latin typeface="TimesNewRomanPSMT"/>
+              </a:rPr>
+              <a:t> z: https://</a:t>
+            </a:r>
+            <a:r>
+              <a:rPr lang="en-GB" sz="1200" dirty="0" err="1">
+                <a:solidFill>
+                  <a:schemeClr val="bg2"/>
+                </a:solidFill>
+                <a:effectLst/>
+                <a:latin typeface="TimesNewRomanPSMT"/>
+              </a:rPr>
+              <a:t>docs.xilinx.com</a:t>
+            </a:r>
+            <a:r>
+              <a:rPr lang="en-GB" sz="1200" dirty="0">
+                <a:solidFill>
+                  <a:schemeClr val="bg2"/>
+                </a:solidFill>
+                <a:effectLst/>
+                <a:latin typeface="TimesNewRomanPSMT"/>
+              </a:rPr>
+              <a:t>/r/</a:t>
+            </a:r>
+            <a:r>
+              <a:rPr lang="en-GB" sz="1200" dirty="0" err="1">
+                <a:solidFill>
+                  <a:schemeClr val="bg2"/>
+                </a:solidFill>
+                <a:effectLst/>
+                <a:latin typeface="TimesNewRomanPSMT"/>
+              </a:rPr>
+              <a:t>en</a:t>
+            </a:r>
+            <a:r>
+              <a:rPr lang="en-GB" sz="1200" dirty="0">
+                <a:solidFill>
+                  <a:schemeClr val="bg2"/>
+                </a:solidFill>
+                <a:effectLst/>
+                <a:latin typeface="TimesNewRomanPSMT"/>
+              </a:rPr>
+              <a:t>-US/ds987-k26-som. </a:t>
+            </a:r>
+            <a:endParaRPr lang="en-GB" sz="1200" dirty="0">
+              <a:solidFill>
+                <a:schemeClr val="bg2"/>
+              </a:solidFill>
+              <a:effectLst/>
+            </a:endParaRPr>
+          </a:p>
+        </p:txBody>
+      </p:sp>
+      <p:cxnSp>
+        <p:nvCxnSpPr>
+          <p:cNvPr id="32" name="Straight Connector 31">
+            <a:extLst>
+              <a:ext uri="{FF2B5EF4-FFF2-40B4-BE49-F238E27FC236}">
+                <a16:creationId xmlns:a16="http://schemas.microsoft.com/office/drawing/2014/main" id="{E36F17AD-8BF1-A63C-9250-70BE7CACC5D3}"/>
+              </a:ext>
+            </a:extLst>
+          </p:cNvPr>
+          <p:cNvCxnSpPr/>
+          <p:nvPr/>
+        </p:nvCxnSpPr>
+        <p:spPr bwMode="auto">
+          <a:xfrm>
+            <a:off x="5204762" y="3178395"/>
+            <a:ext cx="0" cy="287715"/>
+          </a:xfrm>
+          <a:prstGeom prst="line">
+            <a:avLst/>
+          </a:prstGeom>
+          <a:solidFill>
+            <a:srgbClr val="00B8FF"/>
+          </a:solidFill>
+          <a:ln w="28575" cap="flat" cmpd="sng" algn="ctr">
+            <a:solidFill>
+              <a:srgbClr val="C60C30"/>
+            </a:solidFill>
+            <a:prstDash val="solid"/>
+            <a:round/>
+            <a:headEnd type="none" w="med" len="med"/>
+            <a:tailEnd type="none" w="med" len="med"/>
+          </a:ln>
+          <a:effectLst/>
+          <a:extLst>
+            <a:ext uri="{AF507438-7753-43E0-B8FC-AC1667EBCBE1}">
+              <a14:hiddenEffects xmlns:a14="http://schemas.microsoft.com/office/drawing/2010/main">
+                <a:effectLst>
+                  <a:outerShdw dist="35921" dir="2700000" algn="ctr" rotWithShape="0">
+                    <a:schemeClr val="bg2"/>
+                  </a:outerShdw>
+                </a:effectLst>
+              </a14:hiddenEffects>
+            </a:ext>
+          </a:extLst>
+        </p:spPr>
+      </p:cxnSp>
+    </p:spTree>
+    <p:extLst>
+      <p:ext uri="{BB962C8B-B14F-4D97-AF65-F5344CB8AC3E}">
+        <p14:creationId xmlns:p14="http://schemas.microsoft.com/office/powerpoint/2010/main" val="479906141"/>
+      </p:ext>
+    </p:extLst>
+  </p:cSld>
+  <p:clrMapOvr>
+    <a:masterClrMapping/>
+  </p:clrMapOvr>
+</p:sld>
+</file>
+
+<file path=ppt/slides/slide12.xml><?xml version="1.0" encoding="utf-8"?>
+<p:sld xmlns:a="http://schemas.openxmlformats.org/drawingml/2006/main" xmlns:r="http://schemas.openxmlformats.org/officeDocument/2006/relationships" xmlns:p="http://schemas.openxmlformats.org/presentationml/2006/main">
+  <p:cSld>
+    <p:spTree>
+      <p:nvGrpSpPr>
+        <p:cNvPr id="1" name=""/>
+        <p:cNvGrpSpPr/>
+        <p:nvPr/>
+      </p:nvGrpSpPr>
+      <p:grpSpPr>
+        <a:xfrm>
+          <a:off x="0" y="0"/>
+          <a:ext cx="0" cy="0"/>
+          <a:chOff x="0" y="0"/>
+          <a:chExt cx="0" cy="0"/>
+        </a:xfrm>
+      </p:grpSpPr>
+      <p:sp>
+        <p:nvSpPr>
+          <p:cNvPr id="2" name="Nadpis 1">
+            <a:extLst>
+              <a:ext uri="{FF2B5EF4-FFF2-40B4-BE49-F238E27FC236}">
+                <a16:creationId xmlns:a16="http://schemas.microsoft.com/office/drawing/2014/main" id="{50B1320F-8B04-28D1-3DC3-1D0E0863C753}"/>
+              </a:ext>
+            </a:extLst>
+          </p:cNvPr>
+          <p:cNvSpPr>
+            <a:spLocks noGrp="1"/>
+          </p:cNvSpPr>
+          <p:nvPr>
+            <p:ph type="title"/>
+          </p:nvPr>
+        </p:nvSpPr>
+        <p:spPr/>
+        <p:txBody>
+          <a:bodyPr/>
+          <a:lstStyle/>
+          <a:p>
+            <a:r>
+              <a:rPr lang="cs-CZ" dirty="0"/>
+              <a:t>Otázka č. 2</a:t>
+            </a:r>
+            <a:endParaRPr lang="en-US" dirty="0"/>
+          </a:p>
+        </p:txBody>
+      </p:sp>
+      <p:sp>
+        <p:nvSpPr>
+          <p:cNvPr id="3" name="Zástupný obsah 2">
+            <a:extLst>
+              <a:ext uri="{FF2B5EF4-FFF2-40B4-BE49-F238E27FC236}">
+                <a16:creationId xmlns:a16="http://schemas.microsoft.com/office/drawing/2014/main" id="{E7D969BC-ADF2-0ADD-9B62-A691718A88B3}"/>
+              </a:ext>
+            </a:extLst>
+          </p:cNvPr>
+          <p:cNvSpPr>
+            <a:spLocks noGrp="1"/>
+          </p:cNvSpPr>
+          <p:nvPr>
+            <p:ph idx="1"/>
+          </p:nvPr>
+        </p:nvSpPr>
+        <p:spPr/>
+        <p:txBody>
+          <a:bodyPr/>
+          <a:lstStyle/>
+          <a:p>
+            <a:pPr marL="285750" indent="-285750"/>
+            <a:r>
+              <a:rPr lang="cs-CZ" b="1" dirty="0">
+                <a:solidFill>
+                  <a:srgbClr val="0050A0"/>
+                </a:solidFill>
+              </a:rPr>
+              <a:t>Otázka</a:t>
+            </a:r>
+            <a:r>
+              <a:rPr lang="cs-CZ" dirty="0">
+                <a:solidFill>
+                  <a:srgbClr val="0050A0"/>
+                </a:solidFill>
+              </a:rPr>
+              <a:t>: </a:t>
+            </a:r>
+            <a:r>
+              <a:rPr lang="en-GB" dirty="0">
+                <a:solidFill>
+                  <a:srgbClr val="0050A0"/>
+                </a:solidFill>
+              </a:rPr>
+              <a:t>V </a:t>
+            </a:r>
+            <a:r>
+              <a:rPr lang="en-GB" dirty="0" err="1">
+                <a:solidFill>
+                  <a:srgbClr val="0050A0"/>
+                </a:solidFill>
+              </a:rPr>
+              <a:t>kapitole</a:t>
+            </a:r>
+            <a:r>
+              <a:rPr lang="en-GB" dirty="0">
+                <a:solidFill>
+                  <a:srgbClr val="0050A0"/>
+                </a:solidFill>
+              </a:rPr>
+              <a:t> 4.2.2 </a:t>
+            </a:r>
+            <a:r>
+              <a:rPr lang="en-GB" dirty="0" err="1">
+                <a:solidFill>
+                  <a:srgbClr val="0050A0"/>
+                </a:solidFill>
+              </a:rPr>
+              <a:t>na</a:t>
+            </a:r>
+            <a:r>
+              <a:rPr lang="en-GB" dirty="0">
+                <a:solidFill>
+                  <a:srgbClr val="0050A0"/>
+                </a:solidFill>
+              </a:rPr>
+              <a:t> str. 8 je </a:t>
+            </a:r>
+            <a:r>
+              <a:rPr lang="en-GB" dirty="0" err="1">
+                <a:solidFill>
+                  <a:srgbClr val="0050A0"/>
+                </a:solidFill>
+              </a:rPr>
+              <a:t>uvedeno</a:t>
+            </a:r>
+            <a:r>
+              <a:rPr lang="en-GB" dirty="0">
+                <a:solidFill>
+                  <a:srgbClr val="0050A0"/>
+                </a:solidFill>
+              </a:rPr>
+              <a:t>: "</a:t>
+            </a:r>
+            <a:r>
+              <a:rPr lang="en-GB" dirty="0" err="1">
+                <a:solidFill>
+                  <a:srgbClr val="0050A0"/>
+                </a:solidFill>
+              </a:rPr>
+              <a:t>Paměťové</a:t>
+            </a:r>
+            <a:r>
+              <a:rPr lang="en-GB" dirty="0">
+                <a:solidFill>
+                  <a:srgbClr val="0050A0"/>
+                </a:solidFill>
+              </a:rPr>
+              <a:t> </a:t>
+            </a:r>
+            <a:r>
+              <a:rPr lang="en-GB" dirty="0" err="1">
+                <a:solidFill>
+                  <a:srgbClr val="0050A0"/>
+                </a:solidFill>
+              </a:rPr>
+              <a:t>elementy</a:t>
+            </a:r>
+            <a:r>
+              <a:rPr lang="en-GB" dirty="0">
+                <a:solidFill>
+                  <a:srgbClr val="0050A0"/>
+                </a:solidFill>
+              </a:rPr>
+              <a:t> </a:t>
+            </a:r>
+            <a:r>
+              <a:rPr lang="en-GB" dirty="0" err="1">
+                <a:solidFill>
+                  <a:srgbClr val="0050A0"/>
+                </a:solidFill>
+              </a:rPr>
+              <a:t>jsou</a:t>
+            </a:r>
+            <a:r>
+              <a:rPr lang="en-GB" dirty="0">
+                <a:solidFill>
+                  <a:srgbClr val="0050A0"/>
+                </a:solidFill>
+              </a:rPr>
+              <a:t> v LUT </a:t>
+            </a:r>
+            <a:r>
+              <a:rPr lang="en-GB" dirty="0" err="1">
+                <a:solidFill>
+                  <a:srgbClr val="0050A0"/>
+                </a:solidFill>
+              </a:rPr>
+              <a:t>realizovány</a:t>
+            </a:r>
+            <a:r>
+              <a:rPr lang="en-GB" dirty="0">
+                <a:solidFill>
+                  <a:srgbClr val="0050A0"/>
+                </a:solidFill>
+              </a:rPr>
+              <a:t> </a:t>
+            </a:r>
+            <a:r>
+              <a:rPr lang="en-GB" dirty="0" err="1">
+                <a:solidFill>
+                  <a:srgbClr val="0050A0"/>
+                </a:solidFill>
+              </a:rPr>
+              <a:t>pomocí</a:t>
+            </a:r>
+            <a:r>
+              <a:rPr lang="en-GB" dirty="0">
+                <a:solidFill>
+                  <a:srgbClr val="0050A0"/>
+                </a:solidFill>
+              </a:rPr>
+              <a:t> D-</a:t>
+            </a:r>
+            <a:r>
+              <a:rPr lang="en-GB" dirty="0" err="1">
+                <a:solidFill>
+                  <a:srgbClr val="0050A0"/>
+                </a:solidFill>
+              </a:rPr>
+              <a:t>klopných</a:t>
+            </a:r>
+            <a:r>
+              <a:rPr lang="en-GB" dirty="0">
+                <a:solidFill>
+                  <a:srgbClr val="0050A0"/>
+                </a:solidFill>
+              </a:rPr>
+              <a:t> </a:t>
+            </a:r>
+            <a:r>
+              <a:rPr lang="en-GB" dirty="0" err="1">
+                <a:solidFill>
+                  <a:srgbClr val="0050A0"/>
+                </a:solidFill>
+              </a:rPr>
+              <a:t>obvodů</a:t>
+            </a:r>
+            <a:r>
+              <a:rPr lang="en-GB" dirty="0">
+                <a:solidFill>
+                  <a:srgbClr val="0050A0"/>
+                </a:solidFill>
+              </a:rPr>
+              <a:t>. Tyto </a:t>
+            </a:r>
+            <a:r>
+              <a:rPr lang="en-GB" dirty="0" err="1">
+                <a:solidFill>
+                  <a:srgbClr val="0050A0"/>
+                </a:solidFill>
+              </a:rPr>
+              <a:t>obvody</a:t>
+            </a:r>
+            <a:r>
+              <a:rPr lang="en-GB" dirty="0">
+                <a:solidFill>
+                  <a:srgbClr val="0050A0"/>
+                </a:solidFill>
+              </a:rPr>
+              <a:t> </a:t>
+            </a:r>
+            <a:r>
+              <a:rPr lang="en-GB" dirty="0" err="1">
+                <a:solidFill>
+                  <a:srgbClr val="0050A0"/>
+                </a:solidFill>
+              </a:rPr>
+              <a:t>mohou</a:t>
+            </a:r>
+            <a:r>
+              <a:rPr lang="en-GB" dirty="0">
+                <a:solidFill>
+                  <a:srgbClr val="0050A0"/>
+                </a:solidFill>
+              </a:rPr>
+              <a:t> </a:t>
+            </a:r>
+            <a:r>
+              <a:rPr lang="en-GB" dirty="0" err="1">
+                <a:solidFill>
+                  <a:srgbClr val="0050A0"/>
+                </a:solidFill>
+              </a:rPr>
+              <a:t>při</a:t>
+            </a:r>
+            <a:r>
+              <a:rPr lang="en-GB" dirty="0">
+                <a:solidFill>
+                  <a:srgbClr val="0050A0"/>
+                </a:solidFill>
+              </a:rPr>
+              <a:t> </a:t>
+            </a:r>
+            <a:r>
+              <a:rPr lang="en-GB" dirty="0" err="1">
+                <a:solidFill>
+                  <a:srgbClr val="0050A0"/>
+                </a:solidFill>
+              </a:rPr>
+              <a:t>konfiguraci</a:t>
+            </a:r>
+            <a:r>
+              <a:rPr lang="en-GB" dirty="0">
+                <a:solidFill>
+                  <a:srgbClr val="0050A0"/>
+                </a:solidFill>
+              </a:rPr>
+              <a:t> FPGA </a:t>
+            </a:r>
+            <a:r>
+              <a:rPr lang="en-GB" dirty="0" err="1">
+                <a:solidFill>
+                  <a:srgbClr val="0050A0"/>
+                </a:solidFill>
+              </a:rPr>
+              <a:t>být</a:t>
+            </a:r>
+            <a:r>
+              <a:rPr lang="en-GB" dirty="0">
+                <a:solidFill>
+                  <a:srgbClr val="0050A0"/>
+                </a:solidFill>
+              </a:rPr>
+              <a:t> </a:t>
+            </a:r>
+            <a:r>
+              <a:rPr lang="en-GB" dirty="0" err="1">
+                <a:solidFill>
+                  <a:srgbClr val="0050A0"/>
+                </a:solidFill>
+              </a:rPr>
+              <a:t>nastaveny</a:t>
+            </a:r>
+            <a:r>
+              <a:rPr lang="en-GB" dirty="0">
+                <a:solidFill>
+                  <a:srgbClr val="0050A0"/>
+                </a:solidFill>
+              </a:rPr>
+              <a:t> </a:t>
+            </a:r>
+            <a:r>
+              <a:rPr lang="en-GB" dirty="0" err="1">
+                <a:solidFill>
+                  <a:srgbClr val="0050A0"/>
+                </a:solidFill>
+              </a:rPr>
+              <a:t>tak</a:t>
+            </a:r>
+            <a:r>
+              <a:rPr lang="en-GB" dirty="0">
+                <a:solidFill>
+                  <a:srgbClr val="0050A0"/>
+                </a:solidFill>
+              </a:rPr>
+              <a:t>, </a:t>
+            </a:r>
+            <a:r>
+              <a:rPr lang="en-GB" dirty="0" err="1">
+                <a:solidFill>
+                  <a:srgbClr val="0050A0"/>
+                </a:solidFill>
+              </a:rPr>
+              <a:t>že</a:t>
+            </a:r>
+            <a:r>
+              <a:rPr lang="en-GB" dirty="0">
+                <a:solidFill>
+                  <a:srgbClr val="0050A0"/>
+                </a:solidFill>
+              </a:rPr>
+              <a:t> </a:t>
+            </a:r>
+            <a:r>
+              <a:rPr lang="en-GB" dirty="0" err="1">
+                <a:solidFill>
+                  <a:srgbClr val="0050A0"/>
+                </a:solidFill>
+              </a:rPr>
+              <a:t>budou</a:t>
+            </a:r>
+            <a:r>
+              <a:rPr lang="en-GB" dirty="0">
+                <a:solidFill>
+                  <a:srgbClr val="0050A0"/>
+                </a:solidFill>
+              </a:rPr>
+              <a:t> </a:t>
+            </a:r>
+            <a:r>
+              <a:rPr lang="en-GB" dirty="0" err="1">
+                <a:solidFill>
+                  <a:srgbClr val="0050A0"/>
+                </a:solidFill>
+              </a:rPr>
+              <a:t>reagovat</a:t>
+            </a:r>
+            <a:r>
+              <a:rPr lang="en-GB" dirty="0">
+                <a:solidFill>
+                  <a:srgbClr val="0050A0"/>
+                </a:solidFill>
+              </a:rPr>
+              <a:t> </a:t>
+            </a:r>
+            <a:r>
+              <a:rPr lang="en-GB" dirty="0" err="1">
+                <a:solidFill>
+                  <a:srgbClr val="0050A0"/>
+                </a:solidFill>
+              </a:rPr>
+              <a:t>na</a:t>
+            </a:r>
+            <a:r>
+              <a:rPr lang="en-GB" dirty="0">
+                <a:solidFill>
+                  <a:srgbClr val="0050A0"/>
+                </a:solidFill>
+              </a:rPr>
+              <a:t> </a:t>
+            </a:r>
+            <a:r>
+              <a:rPr lang="en-GB" dirty="0" err="1">
+                <a:solidFill>
+                  <a:srgbClr val="0050A0"/>
+                </a:solidFill>
+              </a:rPr>
+              <a:t>nástupnou</a:t>
+            </a:r>
+            <a:r>
+              <a:rPr lang="en-GB" dirty="0">
+                <a:solidFill>
+                  <a:srgbClr val="0050A0"/>
+                </a:solidFill>
+              </a:rPr>
+              <a:t> </a:t>
+            </a:r>
+            <a:r>
+              <a:rPr lang="en-GB" dirty="0" err="1">
+                <a:solidFill>
+                  <a:srgbClr val="0050A0"/>
+                </a:solidFill>
+              </a:rPr>
+              <a:t>nebo</a:t>
+            </a:r>
+            <a:r>
+              <a:rPr lang="en-GB" dirty="0">
+                <a:solidFill>
+                  <a:srgbClr val="0050A0"/>
+                </a:solidFill>
+              </a:rPr>
+              <a:t> </a:t>
+            </a:r>
+            <a:r>
+              <a:rPr lang="en-GB" dirty="0" err="1">
+                <a:solidFill>
+                  <a:srgbClr val="0050A0"/>
+                </a:solidFill>
+              </a:rPr>
+              <a:t>sestupnou</a:t>
+            </a:r>
+            <a:r>
+              <a:rPr lang="en-GB" dirty="0">
+                <a:solidFill>
+                  <a:srgbClr val="0050A0"/>
+                </a:solidFill>
+              </a:rPr>
+              <a:t> </a:t>
+            </a:r>
+            <a:r>
+              <a:rPr lang="en-GB" dirty="0" err="1">
+                <a:solidFill>
+                  <a:srgbClr val="0050A0"/>
+                </a:solidFill>
+              </a:rPr>
+              <a:t>hranu</a:t>
+            </a:r>
+            <a:r>
+              <a:rPr lang="en-GB" dirty="0">
+                <a:solidFill>
+                  <a:srgbClr val="0050A0"/>
+                </a:solidFill>
+              </a:rPr>
+              <a:t> </a:t>
+            </a:r>
+            <a:r>
+              <a:rPr lang="en-GB" dirty="0" err="1">
+                <a:solidFill>
+                  <a:srgbClr val="0050A0"/>
+                </a:solidFill>
+              </a:rPr>
+              <a:t>časovacího</a:t>
+            </a:r>
+            <a:r>
+              <a:rPr lang="en-GB" dirty="0">
+                <a:solidFill>
+                  <a:srgbClr val="0050A0"/>
+                </a:solidFill>
+              </a:rPr>
+              <a:t> </a:t>
+            </a:r>
+            <a:r>
+              <a:rPr lang="en-GB" dirty="0" err="1">
+                <a:solidFill>
+                  <a:srgbClr val="0050A0"/>
+                </a:solidFill>
+              </a:rPr>
+              <a:t>signálu</a:t>
+            </a:r>
+            <a:r>
+              <a:rPr lang="en-GB" dirty="0">
+                <a:solidFill>
+                  <a:srgbClr val="0050A0"/>
+                </a:solidFill>
+              </a:rPr>
+              <a:t> (clock, CLK) </a:t>
+            </a:r>
+            <a:r>
+              <a:rPr lang="en-GB" dirty="0" err="1">
+                <a:solidFill>
+                  <a:srgbClr val="0050A0"/>
+                </a:solidFill>
+              </a:rPr>
+              <a:t>řídícího</a:t>
+            </a:r>
+            <a:r>
+              <a:rPr lang="en-GB" dirty="0">
+                <a:solidFill>
+                  <a:srgbClr val="0050A0"/>
+                </a:solidFill>
+              </a:rPr>
+              <a:t> </a:t>
+            </a:r>
+            <a:r>
+              <a:rPr lang="en-GB" dirty="0" err="1">
+                <a:solidFill>
+                  <a:srgbClr val="0050A0"/>
+                </a:solidFill>
+              </a:rPr>
+              <a:t>procesoru</a:t>
+            </a:r>
+            <a:r>
+              <a:rPr lang="en-GB" dirty="0">
+                <a:solidFill>
+                  <a:srgbClr val="0050A0"/>
+                </a:solidFill>
+              </a:rPr>
+              <a:t> </a:t>
+            </a:r>
+            <a:r>
+              <a:rPr lang="en-GB" dirty="0" err="1">
+                <a:solidFill>
+                  <a:srgbClr val="0050A0"/>
+                </a:solidFill>
+              </a:rPr>
+              <a:t>nebo</a:t>
+            </a:r>
+            <a:r>
+              <a:rPr lang="en-GB" dirty="0">
+                <a:solidFill>
+                  <a:srgbClr val="0050A0"/>
+                </a:solidFill>
+              </a:rPr>
+              <a:t> </a:t>
+            </a:r>
+            <a:r>
+              <a:rPr lang="en-GB" dirty="0" err="1">
+                <a:solidFill>
+                  <a:srgbClr val="0050A0"/>
+                </a:solidFill>
+              </a:rPr>
+              <a:t>na</a:t>
+            </a:r>
+            <a:r>
+              <a:rPr lang="en-GB" dirty="0">
+                <a:solidFill>
+                  <a:srgbClr val="0050A0"/>
+                </a:solidFill>
+              </a:rPr>
+              <a:t> </a:t>
+            </a:r>
+            <a:r>
+              <a:rPr lang="en-GB" dirty="0" err="1">
+                <a:solidFill>
+                  <a:srgbClr val="0050A0"/>
+                </a:solidFill>
+              </a:rPr>
+              <a:t>úroveň</a:t>
+            </a:r>
+            <a:r>
+              <a:rPr lang="en-GB" dirty="0">
+                <a:solidFill>
+                  <a:srgbClr val="0050A0"/>
+                </a:solidFill>
+              </a:rPr>
+              <a:t> </a:t>
+            </a:r>
+            <a:r>
+              <a:rPr lang="en-GB" dirty="0" err="1">
+                <a:solidFill>
+                  <a:srgbClr val="0050A0"/>
+                </a:solidFill>
+              </a:rPr>
+              <a:t>řídícího</a:t>
+            </a:r>
+            <a:r>
+              <a:rPr lang="en-GB" dirty="0">
+                <a:solidFill>
+                  <a:srgbClr val="0050A0"/>
+                </a:solidFill>
+              </a:rPr>
+              <a:t> </a:t>
+            </a:r>
+            <a:r>
+              <a:rPr lang="en-GB" dirty="0" err="1">
+                <a:solidFill>
+                  <a:srgbClr val="0050A0"/>
+                </a:solidFill>
+              </a:rPr>
+              <a:t>signálu</a:t>
+            </a:r>
+            <a:r>
+              <a:rPr lang="en-GB" dirty="0">
+                <a:solidFill>
+                  <a:srgbClr val="0050A0"/>
+                </a:solidFill>
+              </a:rPr>
+              <a:t> (latch)." Co je v </a:t>
+            </a:r>
+            <a:r>
+              <a:rPr lang="en-GB" dirty="0" err="1">
+                <a:solidFill>
+                  <a:srgbClr val="0050A0"/>
+                </a:solidFill>
+              </a:rPr>
+              <a:t>tomto</a:t>
+            </a:r>
+            <a:r>
+              <a:rPr lang="en-GB" dirty="0">
+                <a:solidFill>
+                  <a:srgbClr val="0050A0"/>
+                </a:solidFill>
+              </a:rPr>
+              <a:t> </a:t>
+            </a:r>
+            <a:r>
+              <a:rPr lang="en-GB" dirty="0" err="1">
+                <a:solidFill>
+                  <a:srgbClr val="0050A0"/>
+                </a:solidFill>
+              </a:rPr>
+              <a:t>případě</a:t>
+            </a:r>
+            <a:r>
+              <a:rPr lang="en-GB" dirty="0">
+                <a:solidFill>
+                  <a:srgbClr val="0050A0"/>
+                </a:solidFill>
+              </a:rPr>
+              <a:t> </a:t>
+            </a:r>
+            <a:r>
+              <a:rPr lang="en-GB" dirty="0" err="1">
+                <a:solidFill>
+                  <a:srgbClr val="0050A0"/>
+                </a:solidFill>
+              </a:rPr>
+              <a:t>myšleno</a:t>
+            </a:r>
+            <a:r>
+              <a:rPr lang="en-GB" dirty="0">
+                <a:solidFill>
+                  <a:srgbClr val="0050A0"/>
+                </a:solidFill>
+              </a:rPr>
+              <a:t> </a:t>
+            </a:r>
+            <a:r>
+              <a:rPr lang="en-GB" dirty="0" err="1">
+                <a:solidFill>
+                  <a:srgbClr val="0050A0"/>
+                </a:solidFill>
+              </a:rPr>
+              <a:t>řídícím</a:t>
+            </a:r>
+            <a:r>
+              <a:rPr lang="en-GB" dirty="0">
+                <a:solidFill>
+                  <a:srgbClr val="0050A0"/>
+                </a:solidFill>
+              </a:rPr>
+              <a:t> </a:t>
+            </a:r>
+            <a:r>
+              <a:rPr lang="en-GB" dirty="0" err="1">
+                <a:solidFill>
+                  <a:srgbClr val="0050A0"/>
+                </a:solidFill>
+              </a:rPr>
+              <a:t>procesorem</a:t>
+            </a:r>
+            <a:r>
+              <a:rPr lang="en-GB" dirty="0">
+                <a:solidFill>
+                  <a:srgbClr val="0050A0"/>
+                </a:solidFill>
+              </a:rPr>
+              <a:t> a je </a:t>
+            </a:r>
+            <a:r>
+              <a:rPr lang="en-GB" dirty="0" err="1">
+                <a:solidFill>
+                  <a:srgbClr val="0050A0"/>
+                </a:solidFill>
+              </a:rPr>
+              <a:t>nějaký</a:t>
+            </a:r>
+            <a:r>
+              <a:rPr lang="en-GB" dirty="0">
+                <a:solidFill>
+                  <a:srgbClr val="0050A0"/>
+                </a:solidFill>
+              </a:rPr>
+              <a:t> </a:t>
+            </a:r>
+            <a:r>
+              <a:rPr lang="en-GB" dirty="0" err="1">
+                <a:solidFill>
+                  <a:srgbClr val="0050A0"/>
+                </a:solidFill>
+              </a:rPr>
+              <a:t>takový</a:t>
+            </a:r>
+            <a:r>
+              <a:rPr lang="en-GB" dirty="0">
+                <a:solidFill>
+                  <a:srgbClr val="0050A0"/>
+                </a:solidFill>
+              </a:rPr>
+              <a:t> v </a:t>
+            </a:r>
+            <a:r>
+              <a:rPr lang="en-GB" dirty="0" err="1">
+                <a:solidFill>
+                  <a:srgbClr val="0050A0"/>
+                </a:solidFill>
+              </a:rPr>
+              <a:t>navrženém</a:t>
+            </a:r>
+            <a:r>
+              <a:rPr lang="en-GB" dirty="0">
+                <a:solidFill>
+                  <a:srgbClr val="0050A0"/>
+                </a:solidFill>
+              </a:rPr>
+              <a:t> </a:t>
+            </a:r>
+            <a:r>
+              <a:rPr lang="en-GB" dirty="0" err="1">
+                <a:solidFill>
+                  <a:srgbClr val="0050A0"/>
+                </a:solidFill>
+              </a:rPr>
+              <a:t>příkladě</a:t>
+            </a:r>
+            <a:r>
+              <a:rPr lang="en-GB" dirty="0">
+                <a:solidFill>
+                  <a:srgbClr val="0050A0"/>
+                </a:solidFill>
+              </a:rPr>
+              <a:t>?</a:t>
+            </a:r>
+            <a:endParaRPr lang="cs-CZ" dirty="0">
+              <a:solidFill>
+                <a:srgbClr val="0050A0"/>
+              </a:solidFill>
+            </a:endParaRPr>
+          </a:p>
+          <a:p>
+            <a:pPr marL="285750" indent="-285750">
+              <a:buFont typeface="Arial" panose="020B0604020202020204" pitchFamily="34" charset="0"/>
+              <a:buChar char="•"/>
+            </a:pPr>
+            <a:r>
+              <a:rPr lang="cs-CZ" b="1" dirty="0"/>
+              <a:t>Odpověď</a:t>
+            </a:r>
+            <a:r>
+              <a:rPr lang="cs-CZ" dirty="0"/>
+              <a:t>:</a:t>
+            </a:r>
+          </a:p>
+          <a:p>
+            <a:pPr marL="1087200" lvl="1" indent="-285750"/>
+            <a:r>
+              <a:rPr lang="cs-CZ" dirty="0"/>
+              <a:t>Použitím řídícího procesoru pro taktování je zde myšleno, že pokud by např. FPGA bylo využito jako samostatný prvek, mohl by být k jeho taktování použitý např. digitální signálový procesor nebo jiný </a:t>
+            </a:r>
+            <a:r>
+              <a:rPr lang="cs-CZ" dirty="0" err="1"/>
+              <a:t>SoC</a:t>
+            </a:r>
+            <a:r>
+              <a:rPr lang="cs-CZ" dirty="0"/>
+              <a:t>, který ve struktuře obsahuje oscilátor, jehož výstup je možné vyvést na taktovací vstup FPGA. Pokud by bylo využito samostatného FPGA, bylo by vhodnější využít samostatného oscilátoru.</a:t>
+            </a:r>
+          </a:p>
+          <a:p>
+            <a:pPr marL="1087200" lvl="1" indent="-285750"/>
+            <a:r>
+              <a:rPr lang="cs-CZ" dirty="0"/>
+              <a:t>V navrženém příkladě je využit taktovací signál </a:t>
+            </a:r>
+            <a:r>
+              <a:rPr lang="cs-CZ" i="1" dirty="0"/>
+              <a:t>pl_clk0 (99 MHz) </a:t>
+            </a:r>
+            <a:r>
+              <a:rPr lang="cs-CZ" dirty="0"/>
+              <a:t>generovaný PS (</a:t>
+            </a:r>
+            <a:r>
+              <a:rPr lang="cs-CZ" dirty="0" err="1"/>
+              <a:t>processing</a:t>
+            </a:r>
+            <a:r>
+              <a:rPr lang="cs-CZ" dirty="0"/>
+              <a:t> </a:t>
+            </a:r>
+            <a:r>
+              <a:rPr lang="cs-CZ" dirty="0" err="1"/>
+              <a:t>system</a:t>
+            </a:r>
+            <a:r>
+              <a:rPr lang="cs-CZ" dirty="0"/>
+              <a:t>) pro taktování bloku </a:t>
+            </a:r>
+            <a:r>
+              <a:rPr lang="cs-CZ" i="1" dirty="0" err="1"/>
+              <a:t>Clocking</a:t>
+            </a:r>
+            <a:r>
+              <a:rPr lang="cs-CZ" i="1" dirty="0"/>
+              <a:t> </a:t>
+            </a:r>
+            <a:r>
+              <a:rPr lang="cs-CZ" i="1" dirty="0" err="1"/>
+              <a:t>Wizard</a:t>
+            </a:r>
+            <a:r>
+              <a:rPr lang="cs-CZ" i="1" dirty="0"/>
+              <a:t>, </a:t>
+            </a:r>
+            <a:r>
+              <a:rPr lang="cs-CZ" dirty="0"/>
+              <a:t>který dále generuje signál </a:t>
+            </a:r>
+            <a:r>
+              <a:rPr lang="cs-CZ" i="1" dirty="0"/>
+              <a:t>(200 MHz pro AXI, 20 MHz pro výstup 10 MHz SPI CLK)</a:t>
+            </a:r>
+            <a:r>
+              <a:rPr lang="cs-CZ" dirty="0"/>
+              <a:t> např.</a:t>
+            </a:r>
+            <a:r>
+              <a:rPr lang="cs-CZ" i="1" dirty="0"/>
+              <a:t> </a:t>
+            </a:r>
+            <a:r>
+              <a:rPr lang="cs-CZ" dirty="0"/>
+              <a:t>pro blok </a:t>
+            </a:r>
+            <a:r>
+              <a:rPr lang="cs-CZ" i="1" dirty="0"/>
+              <a:t>axi_quad_spi_0, který je </a:t>
+            </a:r>
+            <a:r>
+              <a:rPr lang="cs-CZ" dirty="0"/>
+              <a:t>realizován na PL.</a:t>
+            </a:r>
+          </a:p>
+          <a:p>
+            <a:pPr marL="0" indent="0">
+              <a:buNone/>
+            </a:pPr>
+            <a:endParaRPr lang="en-US" dirty="0"/>
+          </a:p>
+        </p:txBody>
+      </p:sp>
+    </p:spTree>
+    <p:extLst>
+      <p:ext uri="{BB962C8B-B14F-4D97-AF65-F5344CB8AC3E}">
+        <p14:creationId xmlns:p14="http://schemas.microsoft.com/office/powerpoint/2010/main" val="1652032963"/>
+      </p:ext>
+    </p:extLst>
+  </p:cSld>
+  <p:clrMapOvr>
+    <a:masterClrMapping/>
+  </p:clrMapOvr>
+</p:sld>
+</file>
+
+<file path=ppt/slides/slide13.xml><?xml version="1.0" encoding="utf-8"?>
+<p:sld xmlns:a="http://schemas.openxmlformats.org/drawingml/2006/main" xmlns:r="http://schemas.openxmlformats.org/officeDocument/2006/relationships" xmlns:p="http://schemas.openxmlformats.org/presentationml/2006/main">
+  <p:cSld>
+    <p:spTree>
+      <p:nvGrpSpPr>
+        <p:cNvPr id="1" name=""/>
+        <p:cNvGrpSpPr/>
+        <p:nvPr/>
+      </p:nvGrpSpPr>
+      <p:grpSpPr>
+        <a:xfrm>
+          <a:off x="0" y="0"/>
+          <a:ext cx="0" cy="0"/>
+          <a:chOff x="0" y="0"/>
+          <a:chExt cx="0" cy="0"/>
+        </a:xfrm>
+      </p:grpSpPr>
+      <p:sp>
+        <p:nvSpPr>
+          <p:cNvPr id="2" name="Nadpis 1">
+            <a:extLst>
+              <a:ext uri="{FF2B5EF4-FFF2-40B4-BE49-F238E27FC236}">
+                <a16:creationId xmlns:a16="http://schemas.microsoft.com/office/drawing/2014/main" id="{50B1320F-8B04-28D1-3DC3-1D0E0863C753}"/>
+              </a:ext>
+            </a:extLst>
+          </p:cNvPr>
+          <p:cNvSpPr>
+            <a:spLocks noGrp="1"/>
+          </p:cNvSpPr>
+          <p:nvPr>
+            <p:ph type="title"/>
+          </p:nvPr>
+        </p:nvSpPr>
+        <p:spPr/>
+        <p:txBody>
+          <a:bodyPr/>
+          <a:lstStyle/>
+          <a:p>
+            <a:r>
+              <a:rPr lang="cs-CZ" dirty="0"/>
+              <a:t>Otázka č. 2</a:t>
+            </a:r>
+            <a:endParaRPr lang="en-US" dirty="0"/>
+          </a:p>
+        </p:txBody>
+      </p:sp>
+      <p:pic>
+        <p:nvPicPr>
+          <p:cNvPr id="6" name="Picture 5" descr="A picture containing text, diagram, plan, parallel&#10;&#10;Description automatically generated">
+            <a:extLst>
+              <a:ext uri="{FF2B5EF4-FFF2-40B4-BE49-F238E27FC236}">
+                <a16:creationId xmlns:a16="http://schemas.microsoft.com/office/drawing/2014/main" id="{DA0B73CF-3463-2791-1431-71133801B9C0}"/>
+              </a:ext>
+            </a:extLst>
+          </p:cNvPr>
+          <p:cNvPicPr>
+            <a:picLocks noChangeAspect="1"/>
+          </p:cNvPicPr>
+          <p:nvPr/>
+        </p:nvPicPr>
+        <p:blipFill>
+          <a:blip r:embed="rId3">
+            <a:extLst>
+              <a:ext uri="{28A0092B-C50C-407E-A947-70E740481C1C}">
+                <a14:useLocalDpi xmlns:a14="http://schemas.microsoft.com/office/drawing/2010/main" val="0"/>
+              </a:ext>
+            </a:extLst>
+          </a:blip>
+          <a:stretch>
+            <a:fillRect/>
+          </a:stretch>
+        </p:blipFill>
+        <p:spPr>
+          <a:xfrm>
+            <a:off x="143892" y="1263745"/>
+            <a:ext cx="9792840" cy="4928506"/>
+          </a:xfrm>
+          <a:prstGeom prst="rect">
+            <a:avLst/>
+          </a:prstGeom>
+        </p:spPr>
+      </p:pic>
+      <p:cxnSp>
+        <p:nvCxnSpPr>
+          <p:cNvPr id="7" name="Straight Connector 6">
+            <a:extLst>
+              <a:ext uri="{FF2B5EF4-FFF2-40B4-BE49-F238E27FC236}">
+                <a16:creationId xmlns:a16="http://schemas.microsoft.com/office/drawing/2014/main" id="{95B166C4-4714-C270-A383-56B8BDD058AC}"/>
+              </a:ext>
+            </a:extLst>
+          </p:cNvPr>
+          <p:cNvCxnSpPr/>
+          <p:nvPr/>
+        </p:nvCxnSpPr>
+        <p:spPr bwMode="auto">
+          <a:xfrm flipH="1">
+            <a:off x="5832400" y="2915741"/>
+            <a:ext cx="164566" cy="0"/>
+          </a:xfrm>
+          <a:prstGeom prst="line">
+            <a:avLst/>
+          </a:prstGeom>
+          <a:solidFill>
+            <a:srgbClr val="00B8FF"/>
+          </a:solidFill>
+          <a:ln w="28575" cap="flat" cmpd="sng" algn="ctr">
+            <a:solidFill>
+              <a:srgbClr val="C60C30"/>
+            </a:solidFill>
+            <a:prstDash val="solid"/>
+            <a:round/>
+            <a:headEnd type="none" w="med" len="med"/>
+            <a:tailEnd type="none" w="med" len="med"/>
+          </a:ln>
+          <a:effectLst/>
+          <a:extLst>
+            <a:ext uri="{AF507438-7753-43E0-B8FC-AC1667EBCBE1}">
+              <a14:hiddenEffects xmlns:a14="http://schemas.microsoft.com/office/drawing/2010/main">
+                <a:effectLst>
+                  <a:outerShdw dist="35921" dir="2700000" algn="ctr" rotWithShape="0">
+                    <a:schemeClr val="bg2"/>
+                  </a:outerShdw>
+                </a:effectLst>
+              </a14:hiddenEffects>
+            </a:ext>
+          </a:extLst>
+        </p:spPr>
+      </p:cxnSp>
+      <p:cxnSp>
+        <p:nvCxnSpPr>
+          <p:cNvPr id="9" name="Straight Connector 8">
+            <a:extLst>
+              <a:ext uri="{FF2B5EF4-FFF2-40B4-BE49-F238E27FC236}">
+                <a16:creationId xmlns:a16="http://schemas.microsoft.com/office/drawing/2014/main" id="{944175AB-4DAF-82E6-4636-026ACC7E92AD}"/>
+              </a:ext>
+            </a:extLst>
+          </p:cNvPr>
+          <p:cNvCxnSpPr/>
+          <p:nvPr/>
+        </p:nvCxnSpPr>
+        <p:spPr bwMode="auto">
+          <a:xfrm>
+            <a:off x="4373149" y="2195661"/>
+            <a:ext cx="1466970" cy="0"/>
+          </a:xfrm>
+          <a:prstGeom prst="line">
+            <a:avLst/>
+          </a:prstGeom>
+          <a:solidFill>
+            <a:srgbClr val="00B8FF"/>
+          </a:solidFill>
+          <a:ln w="28575" cap="flat" cmpd="sng" algn="ctr">
+            <a:solidFill>
+              <a:srgbClr val="C60C30"/>
+            </a:solidFill>
+            <a:prstDash val="solid"/>
+            <a:round/>
+            <a:headEnd type="none" w="med" len="med"/>
+            <a:tailEnd type="none" w="med" len="med"/>
+          </a:ln>
+          <a:effectLst/>
+          <a:extLst>
+            <a:ext uri="{AF507438-7753-43E0-B8FC-AC1667EBCBE1}">
+              <a14:hiddenEffects xmlns:a14="http://schemas.microsoft.com/office/drawing/2010/main">
+                <a:effectLst>
+                  <a:outerShdw dist="35921" dir="2700000" algn="ctr" rotWithShape="0">
+                    <a:schemeClr val="bg2"/>
+                  </a:outerShdw>
+                </a:effectLst>
+              </a14:hiddenEffects>
+            </a:ext>
+          </a:extLst>
+        </p:spPr>
+      </p:cxnSp>
+      <p:cxnSp>
+        <p:nvCxnSpPr>
+          <p:cNvPr id="13" name="Straight Connector 12">
+            <a:extLst>
+              <a:ext uri="{FF2B5EF4-FFF2-40B4-BE49-F238E27FC236}">
+                <a16:creationId xmlns:a16="http://schemas.microsoft.com/office/drawing/2014/main" id="{C6E6927B-2EE3-85A8-369B-ECBEE528A55B}"/>
+              </a:ext>
+            </a:extLst>
+          </p:cNvPr>
+          <p:cNvCxnSpPr/>
+          <p:nvPr/>
+        </p:nvCxnSpPr>
+        <p:spPr bwMode="auto">
+          <a:xfrm>
+            <a:off x="5840119" y="2194881"/>
+            <a:ext cx="0" cy="720860"/>
+          </a:xfrm>
+          <a:prstGeom prst="line">
+            <a:avLst/>
+          </a:prstGeom>
+          <a:solidFill>
+            <a:srgbClr val="00B8FF"/>
+          </a:solidFill>
+          <a:ln w="28575" cap="flat" cmpd="sng" algn="ctr">
+            <a:solidFill>
+              <a:srgbClr val="C60C30"/>
+            </a:solidFill>
+            <a:prstDash val="solid"/>
+            <a:round/>
+            <a:headEnd type="none" w="med" len="med"/>
+            <a:tailEnd type="none" w="med" len="med"/>
+          </a:ln>
+          <a:effectLst/>
+          <a:extLst>
+            <a:ext uri="{AF507438-7753-43E0-B8FC-AC1667EBCBE1}">
+              <a14:hiddenEffects xmlns:a14="http://schemas.microsoft.com/office/drawing/2010/main">
+                <a:effectLst>
+                  <a:outerShdw dist="35921" dir="2700000" algn="ctr" rotWithShape="0">
+                    <a:schemeClr val="bg2"/>
+                  </a:outerShdw>
+                </a:effectLst>
+              </a14:hiddenEffects>
+            </a:ext>
+          </a:extLst>
+        </p:spPr>
+      </p:cxnSp>
+      <p:cxnSp>
+        <p:nvCxnSpPr>
+          <p:cNvPr id="16" name="Straight Arrow Connector 15">
+            <a:extLst>
+              <a:ext uri="{FF2B5EF4-FFF2-40B4-BE49-F238E27FC236}">
+                <a16:creationId xmlns:a16="http://schemas.microsoft.com/office/drawing/2014/main" id="{AEB6720F-DBFA-C619-5FE9-36751206C47B}"/>
+              </a:ext>
+            </a:extLst>
+          </p:cNvPr>
+          <p:cNvCxnSpPr/>
+          <p:nvPr/>
+        </p:nvCxnSpPr>
+        <p:spPr bwMode="auto">
+          <a:xfrm flipH="1">
+            <a:off x="5858202" y="1594111"/>
+            <a:ext cx="1701978" cy="633956"/>
+          </a:xfrm>
+          <a:prstGeom prst="straightConnector1">
+            <a:avLst/>
+          </a:prstGeom>
+          <a:solidFill>
+            <a:srgbClr val="00B8FF"/>
+          </a:solidFill>
+          <a:ln w="76200" cap="flat" cmpd="sng" algn="ctr">
+            <a:solidFill>
+              <a:srgbClr val="C60C30"/>
+            </a:solidFill>
+            <a:prstDash val="solid"/>
+            <a:round/>
+            <a:headEnd type="none" w="med" len="med"/>
+            <a:tailEnd type="triangle"/>
+          </a:ln>
+          <a:effectLst/>
+          <a:extLst>
+            <a:ext uri="{AF507438-7753-43E0-B8FC-AC1667EBCBE1}">
+              <a14:hiddenEffects xmlns:a14="http://schemas.microsoft.com/office/drawing/2010/main">
+                <a:effectLst>
+                  <a:outerShdw dist="35921" dir="2700000" algn="ctr" rotWithShape="0">
+                    <a:schemeClr val="bg2"/>
+                  </a:outerShdw>
+                </a:effectLst>
+              </a14:hiddenEffects>
+            </a:ext>
+          </a:extLst>
+        </p:spPr>
+      </p:cxnSp>
+      <p:cxnSp>
+        <p:nvCxnSpPr>
+          <p:cNvPr id="21" name="Curved Connector 20">
+            <a:extLst>
+              <a:ext uri="{FF2B5EF4-FFF2-40B4-BE49-F238E27FC236}">
+                <a16:creationId xmlns:a16="http://schemas.microsoft.com/office/drawing/2014/main" id="{23D197D7-C449-03B7-E6CA-DE1D3C5A5853}"/>
+              </a:ext>
+            </a:extLst>
+          </p:cNvPr>
+          <p:cNvCxnSpPr/>
+          <p:nvPr/>
+        </p:nvCxnSpPr>
+        <p:spPr bwMode="auto">
+          <a:xfrm rot="5400000">
+            <a:off x="4860292" y="3527809"/>
+            <a:ext cx="1728192" cy="1080120"/>
+          </a:xfrm>
+          <a:prstGeom prst="curvedConnector3">
+            <a:avLst/>
+          </a:prstGeom>
+          <a:solidFill>
+            <a:srgbClr val="00B8FF"/>
+          </a:solidFill>
+          <a:ln w="57150" cap="flat" cmpd="sng" algn="ctr">
+            <a:solidFill>
+              <a:srgbClr val="C60C30"/>
+            </a:solidFill>
+            <a:prstDash val="solid"/>
+            <a:round/>
+            <a:headEnd type="triangle"/>
+            <a:tailEnd type="triangle"/>
+          </a:ln>
+          <a:effectLst/>
+          <a:extLst>
+            <a:ext uri="{AF507438-7753-43E0-B8FC-AC1667EBCBE1}">
+              <a14:hiddenEffects xmlns:a14="http://schemas.microsoft.com/office/drawing/2010/main">
+                <a:effectLst>
+                  <a:outerShdw dist="35921" dir="2700000" algn="ctr" rotWithShape="0">
+                    <a:schemeClr val="bg2"/>
+                  </a:outerShdw>
+                </a:effectLst>
+              </a14:hiddenEffects>
+            </a:ext>
+          </a:extLst>
+        </p:spPr>
+      </p:cxnSp>
+    </p:spTree>
+    <p:extLst>
+      <p:ext uri="{BB962C8B-B14F-4D97-AF65-F5344CB8AC3E}">
+        <p14:creationId xmlns:p14="http://schemas.microsoft.com/office/powerpoint/2010/main" val="2122271556"/>
+      </p:ext>
+    </p:extLst>
+  </p:cSld>
+  <p:clrMapOvr>
+    <a:masterClrMapping/>
+  </p:clrMapOvr>
+</p:sld>
+</file>
+
+<file path=ppt/slides/slide14.xml><?xml version="1.0" encoding="utf-8"?>
+<p:sld xmlns:a="http://schemas.openxmlformats.org/drawingml/2006/main" xmlns:r="http://schemas.openxmlformats.org/officeDocument/2006/relationships" xmlns:p="http://schemas.openxmlformats.org/presentationml/2006/main">
+  <p:cSld>
+    <p:spTree>
+      <p:nvGrpSpPr>
+        <p:cNvPr id="1" name=""/>
+        <p:cNvGrpSpPr/>
+        <p:nvPr/>
+      </p:nvGrpSpPr>
+      <p:grpSpPr>
+        <a:xfrm>
+          <a:off x="0" y="0"/>
+          <a:ext cx="0" cy="0"/>
+          <a:chOff x="0" y="0"/>
+          <a:chExt cx="0" cy="0"/>
+        </a:xfrm>
+      </p:grpSpPr>
+      <p:sp>
+        <p:nvSpPr>
           <p:cNvPr id="4" name="Rectangle 3">
             <a:extLst>
               <a:ext uri="{FF2B5EF4-FFF2-40B4-BE49-F238E27FC236}">
@@ -5407,7 +8593,7 @@
 </p:sld>
 </file>
 
-<file path=ppt/slides/slide11.xml><?xml version="1.0" encoding="utf-8"?>
+<file path=ppt/slides/slide15.xml><?xml version="1.0" encoding="utf-8"?>
 <p:sld xmlns:a="http://schemas.openxmlformats.org/drawingml/2006/main" xmlns:r="http://schemas.openxmlformats.org/officeDocument/2006/relationships" xmlns:p="http://schemas.openxmlformats.org/presentationml/2006/main">
   <p:cSld>
     <p:spTree>
@@ -5511,7 +8697,7 @@
 </p:sld>
 </file>
 
-<file path=ppt/slides/slide12.xml><?xml version="1.0" encoding="utf-8"?>
+<file path=ppt/slides/slide16.xml><?xml version="1.0" encoding="utf-8"?>
 <p:sld xmlns:a="http://schemas.openxmlformats.org/drawingml/2006/main" xmlns:r="http://schemas.openxmlformats.org/officeDocument/2006/relationships" xmlns:p="http://schemas.openxmlformats.org/presentationml/2006/main">
   <p:cSld>
     <p:spTree>
@@ -5610,7 +8796,7 @@
 </p:sld>
 </file>
 
-<file path=ppt/slides/slide13.xml><?xml version="1.0" encoding="utf-8"?>
+<file path=ppt/slides/slide17.xml><?xml version="1.0" encoding="utf-8"?>
 <p:sld xmlns:a="http://schemas.openxmlformats.org/drawingml/2006/main" xmlns:r="http://schemas.openxmlformats.org/officeDocument/2006/relationships" xmlns:p="http://schemas.openxmlformats.org/presentationml/2006/main">
   <p:cSld>
     <p:spTree>
@@ -5709,7 +8895,7 @@
 </p:sld>
 </file>
 
-<file path=ppt/slides/slide14.xml><?xml version="1.0" encoding="utf-8"?>
+<file path=ppt/slides/slide18.xml><?xml version="1.0" encoding="utf-8"?>
 <p:sld xmlns:a="http://schemas.openxmlformats.org/drawingml/2006/main" xmlns:r="http://schemas.openxmlformats.org/officeDocument/2006/relationships" xmlns:p="http://schemas.openxmlformats.org/presentationml/2006/main">
   <p:cSld>
     <p:spTree>
@@ -7475,17 +10661,14 @@
           <a:bodyPr/>
           <a:lstStyle/>
           <a:p>
-            <a:pPr marL="285750" indent="-285750">
-              <a:buFont typeface="Arial" panose="020B0604020202020204" pitchFamily="34" charset="0"/>
-              <a:buChar char="•"/>
-            </a:pPr>
+            <a:pPr marL="285750" indent="-285750"/>
             <a:r>
               <a:rPr lang="cs-CZ" b="1" dirty="0">
                 <a:solidFill>
                   <a:srgbClr val="0050A0"/>
                 </a:solidFill>
               </a:rPr>
-              <a:t>Q</a:t>
+              <a:t>Otázka</a:t>
             </a:r>
             <a:r>
               <a:rPr lang="cs-CZ" dirty="0">
@@ -7493,22 +10676,199 @@
                   <a:srgbClr val="0050A0"/>
                 </a:solidFill>
               </a:rPr>
-              <a:t>: Otázka 1.</a:t>
-            </a:r>
-          </a:p>
-          <a:p>
-            <a:pPr marL="285750" indent="-285750">
-              <a:buFont typeface="Arial" panose="020B0604020202020204" pitchFamily="34" charset="0"/>
-              <a:buChar char="•"/>
-            </a:pPr>
+              <a:t>: V kapitole 18.1 na str. 8 je uvedeno, cituji: "Je vhodné doplnit informaci z [5], že </a:t>
+            </a:r>
+            <a:r>
+              <a:rPr lang="cs-CZ" dirty="0" err="1">
+                <a:solidFill>
+                  <a:srgbClr val="0050A0"/>
+                </a:solidFill>
+              </a:rPr>
+              <a:t>Xilinx</a:t>
+            </a:r>
+            <a:r>
+              <a:rPr lang="cs-CZ" dirty="0">
+                <a:solidFill>
+                  <a:srgbClr val="0050A0"/>
+                </a:solidFill>
+              </a:rPr>
+              <a:t> </a:t>
+            </a:r>
+            <a:r>
+              <a:rPr lang="cs-CZ" dirty="0" err="1">
+                <a:solidFill>
+                  <a:srgbClr val="0050A0"/>
+                </a:solidFill>
+              </a:rPr>
+              <a:t>MPSoC</a:t>
+            </a:r>
+            <a:r>
+              <a:rPr lang="cs-CZ" dirty="0">
+                <a:solidFill>
+                  <a:srgbClr val="0050A0"/>
+                </a:solidFill>
+              </a:rPr>
+              <a:t> K26 používá pro přenos dat z PS do globální paměti </a:t>
+            </a:r>
+            <a:r>
+              <a:rPr lang="cs-CZ" dirty="0" err="1">
+                <a:solidFill>
+                  <a:srgbClr val="0050A0"/>
+                </a:solidFill>
+              </a:rPr>
+              <a:t>PCIe</a:t>
+            </a:r>
+            <a:r>
+              <a:rPr lang="cs-CZ" dirty="0">
+                <a:solidFill>
+                  <a:srgbClr val="0050A0"/>
+                </a:solidFill>
+              </a:rPr>
+              <a:t> s propustností dat až 6,0 </a:t>
+            </a:r>
+            <a:r>
+              <a:rPr lang="cs-CZ" dirty="0" err="1">
+                <a:solidFill>
+                  <a:srgbClr val="0050A0"/>
+                </a:solidFill>
+              </a:rPr>
+              <a:t>Gb</a:t>
+            </a:r>
+            <a:r>
+              <a:rPr lang="cs-CZ" dirty="0">
+                <a:solidFill>
+                  <a:srgbClr val="0050A0"/>
+                </a:solidFill>
+              </a:rPr>
+              <a:t>/s. V tomto případě se nejedná o </a:t>
+            </a:r>
+            <a:r>
+              <a:rPr lang="cs-CZ" dirty="0" err="1">
+                <a:solidFill>
+                  <a:srgbClr val="0050A0"/>
+                </a:solidFill>
+              </a:rPr>
+              <a:t>PCIe</a:t>
+            </a:r>
+            <a:r>
+              <a:rPr lang="cs-CZ" dirty="0">
+                <a:solidFill>
+                  <a:srgbClr val="0050A0"/>
+                </a:solidFill>
+              </a:rPr>
+              <a:t> pro komunikaci s externími prvky, ale s globální pamětí umístěné na </a:t>
+            </a:r>
+            <a:r>
+              <a:rPr lang="cs-CZ" dirty="0" err="1">
+                <a:solidFill>
+                  <a:srgbClr val="0050A0"/>
+                </a:solidFill>
+              </a:rPr>
+              <a:t>MPSoC</a:t>
+            </a:r>
+            <a:r>
+              <a:rPr lang="cs-CZ" dirty="0">
+                <a:solidFill>
+                  <a:srgbClr val="0050A0"/>
+                </a:solidFill>
+              </a:rPr>
+              <a:t>." Přes jakou konkrétní paměť probíhá předávání dat mezi procesory (ARM) a programovatelnou logikou (FPGA)? Je připojena opravdu přes interní </a:t>
+            </a:r>
+            <a:r>
+              <a:rPr lang="cs-CZ" dirty="0" err="1">
+                <a:solidFill>
+                  <a:srgbClr val="0050A0"/>
+                </a:solidFill>
+              </a:rPr>
+              <a:t>PCIe</a:t>
+            </a:r>
+            <a:r>
+              <a:rPr lang="cs-CZ" dirty="0">
+                <a:solidFill>
+                  <a:srgbClr val="0050A0"/>
+                </a:solidFill>
+              </a:rPr>
+              <a:t>? Jakým způsobem by se na úrovni HW a SW řešila situace, kdy by tato paměť neměla dostatečnou velikost?</a:t>
+            </a:r>
+          </a:p>
+          <a:p>
+            <a:pPr marL="285750" indent="-285750"/>
             <a:r>
               <a:rPr lang="cs-CZ" b="1" dirty="0"/>
-              <a:t>A</a:t>
+              <a:t>Odpověď</a:t>
             </a:r>
             <a:r>
               <a:rPr lang="cs-CZ" dirty="0"/>
-              <a:t>: Odpověď 1.</a:t>
-            </a:r>
+              <a:t>: </a:t>
+            </a:r>
+          </a:p>
+          <a:p>
+            <a:pPr marL="1087200" lvl="1" indent="-285750"/>
+            <a:r>
+              <a:rPr lang="cs-CZ" dirty="0"/>
+              <a:t>Výměna dat je prováděna přes DDR paměť.</a:t>
+            </a:r>
+          </a:p>
+          <a:p>
+            <a:pPr marL="1087200" lvl="1" indent="-285750"/>
+            <a:r>
+              <a:rPr lang="cs-CZ" dirty="0"/>
+              <a:t>Ne, interní paměť není připojena přes </a:t>
+            </a:r>
+            <a:r>
+              <a:rPr lang="cs-CZ" dirty="0" err="1"/>
+              <a:t>PCIe</a:t>
+            </a:r>
+            <a:r>
+              <a:rPr lang="cs-CZ" dirty="0"/>
+              <a:t> rozhraní. Při vyhledávání informací v dokumentaci jsem se nechal zmást označením na snímku </a:t>
+            </a:r>
+            <a:r>
+              <a:rPr lang="cs-CZ" i="1" dirty="0" err="1"/>
+              <a:t>fig</a:t>
+            </a:r>
+            <a:r>
+              <a:rPr lang="cs-CZ" i="1" dirty="0"/>
+              <a:t>: K26 SOM </a:t>
+            </a:r>
+            <a:r>
+              <a:rPr lang="cs-CZ" i="1" dirty="0" err="1"/>
+              <a:t>Block</a:t>
+            </a:r>
+            <a:r>
+              <a:rPr lang="cs-CZ" i="1" dirty="0"/>
+              <a:t> Diagram </a:t>
+            </a:r>
+            <a:r>
+              <a:rPr lang="cs-CZ" dirty="0"/>
+              <a:t>a textem ohledně PS-GTR </a:t>
+            </a:r>
+            <a:r>
+              <a:rPr lang="cs-CZ" dirty="0" err="1"/>
+              <a:t>transcievers</a:t>
+            </a:r>
+            <a:r>
+              <a:rPr lang="cs-CZ" dirty="0"/>
+              <a:t> (</a:t>
+            </a:r>
+            <a:r>
+              <a:rPr lang="cs-CZ" i="1" dirty="0">
+                <a:hlinkClick r:id="rId3"/>
+              </a:rPr>
+              <a:t>https://docs.xilinx.com/r/en-US/ds987-k26-som/MIO-Peripherals</a:t>
+            </a:r>
+            <a:r>
+              <a:rPr lang="cs-CZ" dirty="0"/>
+              <a:t>) a špatně jsem popsal způsob přenosu dat mezi PS a PL. </a:t>
+            </a:r>
+          </a:p>
+          <a:p>
+            <a:pPr marL="1087200" lvl="1" indent="-285750"/>
+            <a:r>
+              <a:rPr lang="cs-CZ" dirty="0"/>
+              <a:t>Komunikace FPGA a pamětí DDR je provedena pomocí AXI4 rozhraní.</a:t>
+            </a:r>
+            <a:endParaRPr lang="cs-CZ" i="1" dirty="0"/>
           </a:p>
           <a:p>
             <a:pPr marL="0" indent="0">

</xml_diff>

<commit_message>
přidán další slide odpovědi na otázku
</commit_message>
<xml_diff>
--- a/presentation/Zakopal-prezentace.pptx
+++ b/presentation/Zakopal-prezentace.pptx
@@ -6,7 +6,7 @@
     <p:sldMasterId id="2147483654" r:id="rId2"/>
   </p:sldMasterIdLst>
   <p:notesMasterIdLst>
-    <p:notesMasterId r:id="rId21"/>
+    <p:notesMasterId r:id="rId22"/>
   </p:notesMasterIdLst>
   <p:sldIdLst>
     <p:sldId id="369" r:id="rId3"/>
@@ -21,12 +21,13 @@
     <p:sldId id="385" r:id="rId12"/>
     <p:sldId id="384" r:id="rId13"/>
     <p:sldId id="383" r:id="rId14"/>
-    <p:sldId id="386" r:id="rId15"/>
-    <p:sldId id="382" r:id="rId16"/>
-    <p:sldId id="381" r:id="rId17"/>
-    <p:sldId id="375" r:id="rId18"/>
-    <p:sldId id="380" r:id="rId19"/>
-    <p:sldId id="379" r:id="rId20"/>
+    <p:sldId id="387" r:id="rId15"/>
+    <p:sldId id="386" r:id="rId16"/>
+    <p:sldId id="382" r:id="rId17"/>
+    <p:sldId id="381" r:id="rId18"/>
+    <p:sldId id="375" r:id="rId19"/>
+    <p:sldId id="380" r:id="rId20"/>
+    <p:sldId id="379" r:id="rId21"/>
   </p:sldIdLst>
   <p:sldSz cx="10080625" cy="7559675"/>
   <p:notesSz cx="6797675" cy="9928225"/>
@@ -2402,6 +2403,31 @@
               <a:rPr lang="en-GB" dirty="0"/>
               <a:t> pro PL clock.</a:t>
             </a:r>
+          </a:p>
+          <a:p>
+            <a:endParaRPr lang="en-GB" dirty="0"/>
+          </a:p>
+          <a:p>
+            <a:r>
+              <a:rPr lang="en-GB" dirty="0"/>
+              <a:t>https://</a:t>
+            </a:r>
+            <a:r>
+              <a:rPr lang="en-GB" dirty="0" err="1"/>
+              <a:t>docs.xilinx.com</a:t>
+            </a:r>
+            <a:r>
+              <a:rPr lang="en-GB" dirty="0"/>
+              <a:t>/r/</a:t>
+            </a:r>
+            <a:r>
+              <a:rPr lang="en-GB" dirty="0" err="1"/>
+              <a:t>en</a:t>
+            </a:r>
+            <a:r>
+              <a:rPr lang="en-GB" dirty="0"/>
+              <a:t>-US/ug1085-zynq-ultrascale-trm</a:t>
+            </a:r>
             <a:endParaRPr lang="en-CZ" dirty="0"/>
           </a:p>
         </p:txBody>
@@ -2519,7 +2545,7 @@
               <a:pPr>
                 <a:defRPr/>
               </a:pPr>
-              <a:t>13</a:t>
+              <a:t>14</a:t>
             </a:fld>
             <a:endParaRPr lang="cs-CZ" altLang="cs-CZ" dirty="0"/>
           </a:p>
@@ -2609,7 +2635,7 @@
               <a:pPr>
                 <a:defRPr/>
               </a:pPr>
-              <a:t>18</a:t>
+              <a:t>19</a:t>
             </a:fld>
             <a:endParaRPr lang="cs-CZ" altLang="cs-CZ" dirty="0"/>
           </a:p>
@@ -8210,6 +8236,371 @@
       </p:sp>
       <p:pic>
         <p:nvPicPr>
+          <p:cNvPr id="4" name="Picture 3">
+            <a:extLst>
+              <a:ext uri="{FF2B5EF4-FFF2-40B4-BE49-F238E27FC236}">
+                <a16:creationId xmlns:a16="http://schemas.microsoft.com/office/drawing/2014/main" id="{36627FA0-BE3F-8CF3-20E2-175DCAF65FDD}"/>
+              </a:ext>
+            </a:extLst>
+          </p:cNvPr>
+          <p:cNvPicPr>
+            <a:picLocks noChangeAspect="1"/>
+          </p:cNvPicPr>
+          <p:nvPr/>
+        </p:nvPicPr>
+        <p:blipFill>
+          <a:blip r:embed="rId2"/>
+          <a:stretch>
+            <a:fillRect/>
+          </a:stretch>
+        </p:blipFill>
+        <p:spPr>
+          <a:xfrm>
+            <a:off x="1943968" y="1161310"/>
+            <a:ext cx="5648233" cy="5669101"/>
+          </a:xfrm>
+          <a:prstGeom prst="rect">
+            <a:avLst/>
+          </a:prstGeom>
+        </p:spPr>
+      </p:pic>
+      <p:cxnSp>
+        <p:nvCxnSpPr>
+          <p:cNvPr id="27" name="Straight Arrow Connector 26">
+            <a:extLst>
+              <a:ext uri="{FF2B5EF4-FFF2-40B4-BE49-F238E27FC236}">
+                <a16:creationId xmlns:a16="http://schemas.microsoft.com/office/drawing/2014/main" id="{4E1B3C39-0E7E-9916-DECC-E509B8FEE053}"/>
+              </a:ext>
+            </a:extLst>
+          </p:cNvPr>
+          <p:cNvCxnSpPr/>
+          <p:nvPr/>
+        </p:nvCxnSpPr>
+        <p:spPr bwMode="auto">
+          <a:xfrm>
+            <a:off x="863848" y="5292005"/>
+            <a:ext cx="2222976" cy="1218331"/>
+          </a:xfrm>
+          <a:prstGeom prst="straightConnector1">
+            <a:avLst/>
+          </a:prstGeom>
+          <a:solidFill>
+            <a:srgbClr val="00B8FF"/>
+          </a:solidFill>
+          <a:ln w="76200" cap="flat" cmpd="sng" algn="ctr">
+            <a:solidFill>
+              <a:srgbClr val="C60C30"/>
+            </a:solidFill>
+            <a:prstDash val="solid"/>
+            <a:round/>
+            <a:headEnd type="none" w="med" len="med"/>
+            <a:tailEnd type="triangle"/>
+          </a:ln>
+          <a:effectLst/>
+          <a:extLst>
+            <a:ext uri="{AF507438-7753-43E0-B8FC-AC1667EBCBE1}">
+              <a14:hiddenEffects xmlns:a14="http://schemas.microsoft.com/office/drawing/2010/main">
+                <a:effectLst>
+                  <a:outerShdw dist="35921" dir="2700000" algn="ctr" rotWithShape="0">
+                    <a:schemeClr val="bg2"/>
+                  </a:outerShdw>
+                </a:effectLst>
+              </a14:hiddenEffects>
+            </a:ext>
+          </a:extLst>
+        </p:spPr>
+      </p:cxnSp>
+      <p:sp>
+        <p:nvSpPr>
+          <p:cNvPr id="31" name="TextBox 30">
+            <a:extLst>
+              <a:ext uri="{FF2B5EF4-FFF2-40B4-BE49-F238E27FC236}">
+                <a16:creationId xmlns:a16="http://schemas.microsoft.com/office/drawing/2014/main" id="{C9B4F550-C0E7-BB80-7597-8300640B2BC1}"/>
+              </a:ext>
+            </a:extLst>
+          </p:cNvPr>
+          <p:cNvSpPr txBox="1"/>
+          <p:nvPr/>
+        </p:nvSpPr>
+        <p:spPr>
+          <a:xfrm>
+            <a:off x="51561" y="6808716"/>
+            <a:ext cx="9433045" cy="461665"/>
+          </a:xfrm>
+          <a:prstGeom prst="rect">
+            <a:avLst/>
+          </a:prstGeom>
+          <a:noFill/>
+        </p:spPr>
+        <p:txBody>
+          <a:bodyPr wrap="square" rtlCol="0">
+            <a:spAutoFit/>
+          </a:bodyPr>
+          <a:lstStyle/>
+          <a:p>
+            <a:r>
+              <a:rPr lang="en-GB" sz="1200" dirty="0">
+                <a:solidFill>
+                  <a:schemeClr val="bg2"/>
+                </a:solidFill>
+                <a:effectLst/>
+                <a:latin typeface="TimesNewRomanPSMT"/>
+              </a:rPr>
+              <a:t>XILINX, Inc. </a:t>
+            </a:r>
+            <a:r>
+              <a:rPr lang="en-GB" sz="1200" dirty="0" err="1">
+                <a:solidFill>
+                  <a:schemeClr val="bg2"/>
+                </a:solidFill>
+                <a:effectLst/>
+                <a:latin typeface="TimesNewRomanPSMT"/>
+              </a:rPr>
+              <a:t>Kria</a:t>
+            </a:r>
+            <a:r>
+              <a:rPr lang="en-GB" sz="1200" dirty="0">
+                <a:solidFill>
+                  <a:schemeClr val="bg2"/>
+                </a:solidFill>
+                <a:effectLst/>
+                <a:latin typeface="TimesNewRomanPSMT"/>
+              </a:rPr>
+              <a:t> K26 SOM Data Sheet (DS987). In: </a:t>
+            </a:r>
+            <a:r>
+              <a:rPr lang="en-GB" sz="1200" dirty="0">
+                <a:solidFill>
+                  <a:schemeClr val="bg2"/>
+                </a:solidFill>
+                <a:effectLst/>
+                <a:latin typeface="TimesNewRomanPS"/>
+              </a:rPr>
+              <a:t>AMD Xilinx Documentation Portal </a:t>
+            </a:r>
+            <a:r>
+              <a:rPr lang="en-GB" sz="1200" dirty="0">
+                <a:solidFill>
+                  <a:schemeClr val="bg2"/>
+                </a:solidFill>
+                <a:effectLst/>
+                <a:latin typeface="TimesNewRomanPSMT"/>
+              </a:rPr>
+              <a:t>[online]. 26. 07. 2022 [cit. 2023-03-18]. </a:t>
+            </a:r>
+            <a:r>
+              <a:rPr lang="en-GB" sz="1200" dirty="0" err="1">
+                <a:solidFill>
+                  <a:schemeClr val="bg2"/>
+                </a:solidFill>
+                <a:effectLst/>
+                <a:latin typeface="TimesNewRomanPSMT"/>
+              </a:rPr>
+              <a:t>Dostupn</a:t>
+            </a:r>
+            <a:r>
+              <a:rPr lang="en-GB" sz="1200" dirty="0" err="1">
+                <a:solidFill>
+                  <a:schemeClr val="bg2"/>
+                </a:solidFill>
+                <a:latin typeface="TimesNewRomanPSMT"/>
+              </a:rPr>
+              <a:t>é</a:t>
+            </a:r>
+            <a:r>
+              <a:rPr lang="en-GB" sz="1200" dirty="0">
+                <a:solidFill>
+                  <a:schemeClr val="bg2"/>
+                </a:solidFill>
+                <a:effectLst/>
+                <a:latin typeface="TimesNewRomanPSMT"/>
+              </a:rPr>
+              <a:t> z: https://</a:t>
+            </a:r>
+            <a:r>
+              <a:rPr lang="en-GB" sz="1200" dirty="0" err="1">
+                <a:solidFill>
+                  <a:schemeClr val="bg2"/>
+                </a:solidFill>
+                <a:effectLst/>
+                <a:latin typeface="TimesNewRomanPSMT"/>
+              </a:rPr>
+              <a:t>docs.xilinx.com</a:t>
+            </a:r>
+            <a:r>
+              <a:rPr lang="en-GB" sz="1200" dirty="0">
+                <a:solidFill>
+                  <a:schemeClr val="bg2"/>
+                </a:solidFill>
+                <a:effectLst/>
+                <a:latin typeface="TimesNewRomanPSMT"/>
+              </a:rPr>
+              <a:t>/r/</a:t>
+            </a:r>
+            <a:r>
+              <a:rPr lang="en-GB" sz="1200" dirty="0" err="1">
+                <a:solidFill>
+                  <a:schemeClr val="bg2"/>
+                </a:solidFill>
+                <a:effectLst/>
+                <a:latin typeface="TimesNewRomanPSMT"/>
+              </a:rPr>
+              <a:t>en</a:t>
+            </a:r>
+            <a:r>
+              <a:rPr lang="en-GB" sz="1200" dirty="0">
+                <a:solidFill>
+                  <a:schemeClr val="bg2"/>
+                </a:solidFill>
+                <a:effectLst/>
+                <a:latin typeface="TimesNewRomanPSMT"/>
+              </a:rPr>
+              <a:t>-US/ds987-k26-som. </a:t>
+            </a:r>
+            <a:endParaRPr lang="en-GB" sz="1200" dirty="0">
+              <a:solidFill>
+                <a:schemeClr val="bg2"/>
+              </a:solidFill>
+              <a:effectLst/>
+            </a:endParaRPr>
+          </a:p>
+        </p:txBody>
+      </p:sp>
+      <p:sp>
+        <p:nvSpPr>
+          <p:cNvPr id="5" name="Frame 4">
+            <a:extLst>
+              <a:ext uri="{FF2B5EF4-FFF2-40B4-BE49-F238E27FC236}">
+                <a16:creationId xmlns:a16="http://schemas.microsoft.com/office/drawing/2014/main" id="{C5A5A199-7CE3-F1B4-9903-46D1D87B358A}"/>
+              </a:ext>
+            </a:extLst>
+          </p:cNvPr>
+          <p:cNvSpPr/>
+          <p:nvPr/>
+        </p:nvSpPr>
+        <p:spPr bwMode="auto">
+          <a:xfrm>
+            <a:off x="3086824" y="6444133"/>
+            <a:ext cx="585336" cy="288032"/>
+          </a:xfrm>
+          <a:prstGeom prst="frame">
+            <a:avLst/>
+          </a:prstGeom>
+          <a:solidFill>
+            <a:srgbClr val="C60C30"/>
+          </a:solidFill>
+          <a:ln w="9525" cap="flat" cmpd="sng" algn="ctr">
+            <a:solidFill>
+              <a:srgbClr val="C60C30"/>
+            </a:solidFill>
+            <a:prstDash val="solid"/>
+            <a:round/>
+            <a:headEnd type="none" w="med" len="med"/>
+            <a:tailEnd type="none" w="med" len="med"/>
+          </a:ln>
+          <a:effectLst/>
+        </p:spPr>
+        <p:txBody>
+          <a:bodyPr vert="horz" wrap="square" lIns="91440" tIns="45720" rIns="91440" bIns="45720" numCol="1" rtlCol="0" anchor="t" anchorCtr="0" compatLnSpc="1">
+            <a:prstTxWarp prst="textNoShape">
+              <a:avLst/>
+            </a:prstTxWarp>
+          </a:bodyPr>
+          <a:lstStyle/>
+          <a:p>
+            <a:pPr marL="0" marR="0" indent="0" algn="l" defTabSz="449263" rtl="0" eaLnBrk="1" fontAlgn="base" latinLnBrk="0" hangingPunct="0">
+              <a:lnSpc>
+                <a:spcPct val="93000"/>
+              </a:lnSpc>
+              <a:spcBef>
+                <a:spcPct val="0"/>
+              </a:spcBef>
+              <a:spcAft>
+                <a:spcPct val="0"/>
+              </a:spcAft>
+              <a:buClr>
+                <a:srgbClr val="000000"/>
+              </a:buClr>
+              <a:buSzPct val="100000"/>
+              <a:buFont typeface="Times New Roman" panose="02020603050405020304" pitchFamily="18" charset="0"/>
+              <a:buNone/>
+              <a:tabLst/>
+            </a:pPr>
+            <a:endParaRPr kumimoji="0" lang="en-CZ" sz="1800" b="0" i="0" u="none" strike="noStrike" cap="none" normalizeH="0" baseline="0">
+              <a:ln>
+                <a:noFill/>
+              </a:ln>
+              <a:solidFill>
+                <a:schemeClr val="bg1"/>
+              </a:solidFill>
+              <a:effectLst/>
+              <a:latin typeface="Arial" panose="020B0604020202020204" pitchFamily="34" charset="0"/>
+              <a:cs typeface="WenQuanYi Zen Hei" charset="0"/>
+            </a:endParaRPr>
+          </a:p>
+        </p:txBody>
+      </p:sp>
+    </p:spTree>
+    <p:extLst>
+      <p:ext uri="{BB962C8B-B14F-4D97-AF65-F5344CB8AC3E}">
+        <p14:creationId xmlns:p14="http://schemas.microsoft.com/office/powerpoint/2010/main" val="205679023"/>
+      </p:ext>
+    </p:extLst>
+  </p:cSld>
+  <p:clrMapOvr>
+    <a:masterClrMapping/>
+  </p:clrMapOvr>
+</p:sld>
+</file>
+
+<file path=ppt/slides/slide14.xml><?xml version="1.0" encoding="utf-8"?>
+<p:sld xmlns:a="http://schemas.openxmlformats.org/drawingml/2006/main" xmlns:r="http://schemas.openxmlformats.org/officeDocument/2006/relationships" xmlns:p="http://schemas.openxmlformats.org/presentationml/2006/main">
+  <p:cSld>
+    <p:spTree>
+      <p:nvGrpSpPr>
+        <p:cNvPr id="1" name=""/>
+        <p:cNvGrpSpPr/>
+        <p:nvPr/>
+      </p:nvGrpSpPr>
+      <p:grpSpPr>
+        <a:xfrm>
+          <a:off x="0" y="0"/>
+          <a:ext cx="0" cy="0"/>
+          <a:chOff x="0" y="0"/>
+          <a:chExt cx="0" cy="0"/>
+        </a:xfrm>
+      </p:grpSpPr>
+      <p:sp>
+        <p:nvSpPr>
+          <p:cNvPr id="2" name="Nadpis 1">
+            <a:extLst>
+              <a:ext uri="{FF2B5EF4-FFF2-40B4-BE49-F238E27FC236}">
+                <a16:creationId xmlns:a16="http://schemas.microsoft.com/office/drawing/2014/main" id="{50B1320F-8B04-28D1-3DC3-1D0E0863C753}"/>
+              </a:ext>
+            </a:extLst>
+          </p:cNvPr>
+          <p:cNvSpPr>
+            <a:spLocks noGrp="1"/>
+          </p:cNvSpPr>
+          <p:nvPr>
+            <p:ph type="title"/>
+          </p:nvPr>
+        </p:nvSpPr>
+        <p:spPr/>
+        <p:txBody>
+          <a:bodyPr/>
+          <a:lstStyle/>
+          <a:p>
+            <a:r>
+              <a:rPr lang="cs-CZ" dirty="0"/>
+              <a:t>Otázka č. 2</a:t>
+            </a:r>
+            <a:endParaRPr lang="en-US" dirty="0"/>
+          </a:p>
+        </p:txBody>
+      </p:sp>
+      <p:pic>
+        <p:nvPicPr>
           <p:cNvPr id="6" name="Picture 5" descr="A picture containing text, diagram, plan, parallel&#10;&#10;Description automatically generated">
             <a:extLst>
               <a:ext uri="{FF2B5EF4-FFF2-40B4-BE49-F238E27FC236}">
@@ -8487,7 +8878,7 @@
 </p:sld>
 </file>
 
-<file path=ppt/slides/slide14.xml><?xml version="1.0" encoding="utf-8"?>
+<file path=ppt/slides/slide15.xml><?xml version="1.0" encoding="utf-8"?>
 <p:sld xmlns:a="http://schemas.openxmlformats.org/drawingml/2006/main" xmlns:r="http://schemas.openxmlformats.org/officeDocument/2006/relationships" xmlns:p="http://schemas.openxmlformats.org/presentationml/2006/main">
   <p:cSld>
     <p:spTree>
@@ -8593,7 +8984,7 @@
 </p:sld>
 </file>
 
-<file path=ppt/slides/slide15.xml><?xml version="1.0" encoding="utf-8"?>
+<file path=ppt/slides/slide16.xml><?xml version="1.0" encoding="utf-8"?>
 <p:sld xmlns:a="http://schemas.openxmlformats.org/drawingml/2006/main" xmlns:r="http://schemas.openxmlformats.org/officeDocument/2006/relationships" xmlns:p="http://schemas.openxmlformats.org/presentationml/2006/main">
   <p:cSld>
     <p:spTree>
@@ -8697,7 +9088,7 @@
 </p:sld>
 </file>
 
-<file path=ppt/slides/slide16.xml><?xml version="1.0" encoding="utf-8"?>
+<file path=ppt/slides/slide17.xml><?xml version="1.0" encoding="utf-8"?>
 <p:sld xmlns:a="http://schemas.openxmlformats.org/drawingml/2006/main" xmlns:r="http://schemas.openxmlformats.org/officeDocument/2006/relationships" xmlns:p="http://schemas.openxmlformats.org/presentationml/2006/main">
   <p:cSld>
     <p:spTree>
@@ -8796,7 +9187,7 @@
 </p:sld>
 </file>
 
-<file path=ppt/slides/slide17.xml><?xml version="1.0" encoding="utf-8"?>
+<file path=ppt/slides/slide18.xml><?xml version="1.0" encoding="utf-8"?>
 <p:sld xmlns:a="http://schemas.openxmlformats.org/drawingml/2006/main" xmlns:r="http://schemas.openxmlformats.org/officeDocument/2006/relationships" xmlns:p="http://schemas.openxmlformats.org/presentationml/2006/main">
   <p:cSld>
     <p:spTree>
@@ -8895,7 +9286,7 @@
 </p:sld>
 </file>
 
-<file path=ppt/slides/slide18.xml><?xml version="1.0" encoding="utf-8"?>
+<file path=ppt/slides/slide19.xml><?xml version="1.0" encoding="utf-8"?>
 <p:sld xmlns:a="http://schemas.openxmlformats.org/drawingml/2006/main" xmlns:r="http://schemas.openxmlformats.org/officeDocument/2006/relationships" xmlns:p="http://schemas.openxmlformats.org/presentationml/2006/main">
   <p:cSld>
     <p:spTree>

</xml_diff>

<commit_message>
snad připraveno na odevzdání prezentace
</commit_message>
<xml_diff>
--- a/presentation/Zakopal-prezentace.pptx
+++ b/presentation/Zakopal-prezentace.pptx
@@ -1173,113 +1173,14 @@
           <a:p>
             <a:r>
               <a:rPr lang="en-CZ" dirty="0"/>
-              <a:t>Xilinx Inc. is now AMDembedded </a:t>
-            </a:r>
-            <a:r>
-              <a:rPr lang="en-GB" dirty="0"/>
-              <a:t>https://</a:t>
-            </a:r>
-            <a:r>
-              <a:rPr lang="en-GB" dirty="0" err="1"/>
-              <a:t>twitter.com</a:t>
-            </a:r>
-            <a:r>
-              <a:rPr lang="en-GB" dirty="0"/>
-              <a:t>/</a:t>
-            </a:r>
-            <a:r>
-              <a:rPr lang="en-GB" dirty="0" err="1"/>
-              <a:t>AMDembedded</a:t>
-            </a:r>
-            <a:endParaRPr lang="en-CZ" dirty="0"/>
-          </a:p>
-          <a:p>
-            <a:endParaRPr lang="en-CZ" dirty="0"/>
+              <a:t>Synthesis – Transfer HDL to RTL (and and nand etc)</a:t>
+            </a:r>
           </a:p>
           <a:p>
             <a:r>
               <a:rPr lang="en-CZ" dirty="0"/>
-              <a:t>Cost optimized product announcement</a:t>
-            </a:r>
-          </a:p>
-          <a:p>
-            <a:r>
-              <a:rPr lang="en-GB" dirty="0"/>
-              <a:t>https://</a:t>
-            </a:r>
-            <a:r>
-              <a:rPr lang="en-GB" dirty="0" err="1"/>
-              <a:t>www.xilinx.com</a:t>
-            </a:r>
-            <a:r>
-              <a:rPr lang="en-GB" dirty="0"/>
-              <a:t>/publications/presentations/</a:t>
-            </a:r>
-            <a:r>
-              <a:rPr lang="en-GB" dirty="0" err="1"/>
-              <a:t>xilinx</a:t>
-            </a:r>
-            <a:r>
-              <a:rPr lang="en-GB" dirty="0"/>
-              <a:t>-</a:t>
-            </a:r>
-            <a:r>
-              <a:rPr lang="en-GB" dirty="0" err="1"/>
-              <a:t>kria</a:t>
-            </a:r>
-            <a:r>
-              <a:rPr lang="en-GB" dirty="0"/>
-              <a:t>-</a:t>
-            </a:r>
-            <a:r>
-              <a:rPr lang="en-GB" dirty="0" err="1"/>
-              <a:t>som</a:t>
-            </a:r>
-            <a:r>
-              <a:rPr lang="en-GB" dirty="0"/>
-              <a:t>-product-</a:t>
-            </a:r>
-            <a:r>
-              <a:rPr lang="en-GB" dirty="0" err="1"/>
-              <a:t>presentation.pdf</a:t>
-            </a:r>
-            <a:endParaRPr lang="en-CZ" dirty="0"/>
-          </a:p>
-          <a:p>
-            <a:endParaRPr lang="en-CZ" dirty="0"/>
-          </a:p>
-          <a:p>
-            <a:r>
-              <a:rPr lang="en-CZ" dirty="0"/>
-              <a:t>Info about roadmap answered by AMD Xilinx Employee</a:t>
-            </a:r>
-          </a:p>
-          <a:p>
-            <a:r>
-              <a:rPr lang="en-GB" dirty="0"/>
-              <a:t>https://</a:t>
-            </a:r>
-            <a:r>
-              <a:rPr lang="en-GB" dirty="0" err="1"/>
-              <a:t>support.xilinx.com</a:t>
-            </a:r>
-            <a:r>
-              <a:rPr lang="en-GB" dirty="0"/>
-              <a:t>/s/question/0D54U000061e1nASAQ/</a:t>
-            </a:r>
-            <a:r>
-              <a:rPr lang="en-GB" dirty="0" err="1"/>
-              <a:t>kria-soms-roadmap?language</a:t>
-            </a:r>
-            <a:r>
-              <a:rPr lang="en-GB" dirty="0"/>
-              <a:t>=</a:t>
-            </a:r>
-            <a:r>
-              <a:rPr lang="en-GB" dirty="0" err="1"/>
-              <a:t>en_US</a:t>
-            </a:r>
-            <a:endParaRPr lang="en-CZ" dirty="0"/>
+              <a:t>Place and Route – mapping netlist to FPGA resources</a:t>
+            </a:r>
           </a:p>
         </p:txBody>
       </p:sp>
@@ -1306,7 +1207,7 @@
               <a:pPr>
                 <a:defRPr/>
               </a:pPr>
-              <a:t>3</a:t>
+              <a:t>2</a:t>
             </a:fld>
             <a:endParaRPr lang="cs-CZ" altLang="cs-CZ" dirty="0"/>
           </a:p>
@@ -1315,7 +1216,7 @@
     </p:spTree>
     <p:extLst>
       <p:ext uri="{BB962C8B-B14F-4D97-AF65-F5344CB8AC3E}">
-        <p14:creationId xmlns:p14="http://schemas.microsoft.com/office/powerpoint/2010/main" val="2561843784"/>
+        <p14:creationId xmlns:p14="http://schemas.microsoft.com/office/powerpoint/2010/main" val="325808495"/>
       </p:ext>
     </p:extLst>
   </p:cSld>
@@ -1396,6 +1297,96 @@
               <a:pPr>
                 <a:defRPr/>
               </a:pPr>
+              <a:t>16</a:t>
+            </a:fld>
+            <a:endParaRPr lang="cs-CZ" altLang="cs-CZ" dirty="0"/>
+          </a:p>
+        </p:txBody>
+      </p:sp>
+    </p:spTree>
+    <p:extLst>
+      <p:ext uri="{BB962C8B-B14F-4D97-AF65-F5344CB8AC3E}">
+        <p14:creationId xmlns:p14="http://schemas.microsoft.com/office/powerpoint/2010/main" val="3470336303"/>
+      </p:ext>
+    </p:extLst>
+  </p:cSld>
+  <p:clrMapOvr>
+    <a:masterClrMapping/>
+  </p:clrMapOvr>
+</p:notes>
+</file>
+
+<file path=ppt/notesSlides/notesSlide11.xml><?xml version="1.0" encoding="utf-8"?>
+<p:notes xmlns:a="http://schemas.openxmlformats.org/drawingml/2006/main" xmlns:r="http://schemas.openxmlformats.org/officeDocument/2006/relationships" xmlns:p="http://schemas.openxmlformats.org/presentationml/2006/main">
+  <p:cSld>
+    <p:spTree>
+      <p:nvGrpSpPr>
+        <p:cNvPr id="1" name=""/>
+        <p:cNvGrpSpPr/>
+        <p:nvPr/>
+      </p:nvGrpSpPr>
+      <p:grpSpPr>
+        <a:xfrm>
+          <a:off x="0" y="0"/>
+          <a:ext cx="0" cy="0"/>
+          <a:chOff x="0" y="0"/>
+          <a:chExt cx="0" cy="0"/>
+        </a:xfrm>
+      </p:grpSpPr>
+      <p:sp>
+        <p:nvSpPr>
+          <p:cNvPr id="2" name="Slide Image Placeholder 1"/>
+          <p:cNvSpPr>
+            <a:spLocks noGrp="1" noRot="1" noChangeAspect="1"/>
+          </p:cNvSpPr>
+          <p:nvPr>
+            <p:ph type="sldImg"/>
+          </p:nvPr>
+        </p:nvSpPr>
+        <p:spPr/>
+      </p:sp>
+      <p:sp>
+        <p:nvSpPr>
+          <p:cNvPr id="3" name="Notes Placeholder 2"/>
+          <p:cNvSpPr>
+            <a:spLocks noGrp="1"/>
+          </p:cNvSpPr>
+          <p:nvPr>
+            <p:ph type="body" idx="1"/>
+          </p:nvPr>
+        </p:nvSpPr>
+        <p:spPr/>
+        <p:txBody>
+          <a:bodyPr/>
+          <a:lstStyle/>
+          <a:p>
+            <a:endParaRPr lang="en-CZ" dirty="0"/>
+          </a:p>
+        </p:txBody>
+      </p:sp>
+      <p:sp>
+        <p:nvSpPr>
+          <p:cNvPr id="4" name="Slide Number Placeholder 3"/>
+          <p:cNvSpPr>
+            <a:spLocks noGrp="1"/>
+          </p:cNvSpPr>
+          <p:nvPr>
+            <p:ph type="sldNum"/>
+          </p:nvPr>
+        </p:nvSpPr>
+        <p:spPr/>
+        <p:txBody>
+          <a:bodyPr/>
+          <a:lstStyle/>
+          <a:p>
+            <a:pPr>
+              <a:defRPr/>
+            </a:pPr>
+            <a:fld id="{8598801B-DE11-45C9-A143-93468F8D5D2F}" type="slidenum">
+              <a:rPr lang="cs-CZ" altLang="cs-CZ" smtClean="0"/>
+              <a:pPr>
+                <a:defRPr/>
+              </a:pPr>
               <a:t>17</a:t>
             </a:fld>
             <a:endParaRPr lang="cs-CZ" altLang="cs-CZ" dirty="0"/>
@@ -1415,7 +1406,7 @@
 </p:notes>
 </file>
 
-<file path=ppt/notesSlides/notesSlide11.xml><?xml version="1.0" encoding="utf-8"?>
+<file path=ppt/notesSlides/notesSlide12.xml><?xml version="1.0" encoding="utf-8"?>
 <p:notes xmlns:a="http://schemas.openxmlformats.org/drawingml/2006/main" xmlns:r="http://schemas.openxmlformats.org/officeDocument/2006/relationships" xmlns:p="http://schemas.openxmlformats.org/presentationml/2006/main">
   <p:cSld>
     <p:spTree>
@@ -1549,6 +1540,114 @@
           <a:bodyPr/>
           <a:lstStyle/>
           <a:p>
+            <a:r>
+              <a:rPr lang="en-CZ" dirty="0"/>
+              <a:t>Xilinx Inc. is now AMDembedded </a:t>
+            </a:r>
+            <a:r>
+              <a:rPr lang="en-GB" dirty="0"/>
+              <a:t>https://</a:t>
+            </a:r>
+            <a:r>
+              <a:rPr lang="en-GB" dirty="0" err="1"/>
+              <a:t>twitter.com</a:t>
+            </a:r>
+            <a:r>
+              <a:rPr lang="en-GB" dirty="0"/>
+              <a:t>/</a:t>
+            </a:r>
+            <a:r>
+              <a:rPr lang="en-GB" dirty="0" err="1"/>
+              <a:t>AMDembedded</a:t>
+            </a:r>
+            <a:endParaRPr lang="en-CZ" dirty="0"/>
+          </a:p>
+          <a:p>
+            <a:endParaRPr lang="en-CZ" dirty="0"/>
+          </a:p>
+          <a:p>
+            <a:r>
+              <a:rPr lang="en-CZ" dirty="0"/>
+              <a:t>Cost optimized product announcement</a:t>
+            </a:r>
+          </a:p>
+          <a:p>
+            <a:r>
+              <a:rPr lang="en-GB" dirty="0"/>
+              <a:t>https://</a:t>
+            </a:r>
+            <a:r>
+              <a:rPr lang="en-GB" dirty="0" err="1"/>
+              <a:t>www.xilinx.com</a:t>
+            </a:r>
+            <a:r>
+              <a:rPr lang="en-GB" dirty="0"/>
+              <a:t>/publications/presentations/</a:t>
+            </a:r>
+            <a:r>
+              <a:rPr lang="en-GB" dirty="0" err="1"/>
+              <a:t>xilinx</a:t>
+            </a:r>
+            <a:r>
+              <a:rPr lang="en-GB" dirty="0"/>
+              <a:t>-</a:t>
+            </a:r>
+            <a:r>
+              <a:rPr lang="en-GB" dirty="0" err="1"/>
+              <a:t>kria</a:t>
+            </a:r>
+            <a:r>
+              <a:rPr lang="en-GB" dirty="0"/>
+              <a:t>-</a:t>
+            </a:r>
+            <a:r>
+              <a:rPr lang="en-GB" dirty="0" err="1"/>
+              <a:t>som</a:t>
+            </a:r>
+            <a:r>
+              <a:rPr lang="en-GB" dirty="0"/>
+              <a:t>-product-</a:t>
+            </a:r>
+            <a:r>
+              <a:rPr lang="en-GB" dirty="0" err="1"/>
+              <a:t>presentation.pdf</a:t>
+            </a:r>
+            <a:endParaRPr lang="en-CZ" dirty="0"/>
+          </a:p>
+          <a:p>
+            <a:endParaRPr lang="en-CZ" dirty="0"/>
+          </a:p>
+          <a:p>
+            <a:r>
+              <a:rPr lang="en-CZ" dirty="0"/>
+              <a:t>Info about roadmap answered by AMD Xilinx Employee</a:t>
+            </a:r>
+          </a:p>
+          <a:p>
+            <a:r>
+              <a:rPr lang="en-GB" dirty="0"/>
+              <a:t>https://</a:t>
+            </a:r>
+            <a:r>
+              <a:rPr lang="en-GB" dirty="0" err="1"/>
+              <a:t>support.xilinx.com</a:t>
+            </a:r>
+            <a:r>
+              <a:rPr lang="en-GB" dirty="0"/>
+              <a:t>/s/question/0D54U000061e1nASAQ/</a:t>
+            </a:r>
+            <a:r>
+              <a:rPr lang="en-GB" dirty="0" err="1"/>
+              <a:t>kria-soms-roadmap?language</a:t>
+            </a:r>
+            <a:r>
+              <a:rPr lang="en-GB" dirty="0"/>
+              <a:t>=</a:t>
+            </a:r>
+            <a:r>
+              <a:rPr lang="en-GB" dirty="0" err="1"/>
+              <a:t>en_US</a:t>
+            </a:r>
             <a:endParaRPr lang="en-CZ" dirty="0"/>
           </a:p>
         </p:txBody>
@@ -1576,7 +1675,7 @@
               <a:pPr>
                 <a:defRPr/>
               </a:pPr>
-              <a:t>5</a:t>
+              <a:t>3</a:t>
             </a:fld>
             <a:endParaRPr lang="cs-CZ" altLang="cs-CZ" dirty="0"/>
           </a:p>
@@ -1585,7 +1684,7 @@
     </p:spTree>
     <p:extLst>
       <p:ext uri="{BB962C8B-B14F-4D97-AF65-F5344CB8AC3E}">
-        <p14:creationId xmlns:p14="http://schemas.microsoft.com/office/powerpoint/2010/main" val="975230295"/>
+        <p14:creationId xmlns:p14="http://schemas.microsoft.com/office/powerpoint/2010/main" val="2561843784"/>
       </p:ext>
     </p:extLst>
   </p:cSld>
@@ -1666,7 +1765,7 @@
               <a:pPr>
                 <a:defRPr/>
               </a:pPr>
-              <a:t>6</a:t>
+              <a:t>5</a:t>
             </a:fld>
             <a:endParaRPr lang="cs-CZ" altLang="cs-CZ" dirty="0"/>
           </a:p>
@@ -1675,7 +1774,7 @@
     </p:spTree>
     <p:extLst>
       <p:ext uri="{BB962C8B-B14F-4D97-AF65-F5344CB8AC3E}">
-        <p14:creationId xmlns:p14="http://schemas.microsoft.com/office/powerpoint/2010/main" val="154021963"/>
+        <p14:creationId xmlns:p14="http://schemas.microsoft.com/office/powerpoint/2010/main" val="975230295"/>
       </p:ext>
     </p:extLst>
   </p:cSld>
@@ -1756,7 +1855,7 @@
               <a:pPr>
                 <a:defRPr/>
               </a:pPr>
-              <a:t>9</a:t>
+              <a:t>6</a:t>
             </a:fld>
             <a:endParaRPr lang="cs-CZ" altLang="cs-CZ" dirty="0"/>
           </a:p>
@@ -1765,7 +1864,7 @@
     </p:spTree>
     <p:extLst>
       <p:ext uri="{BB962C8B-B14F-4D97-AF65-F5344CB8AC3E}">
-        <p14:creationId xmlns:p14="http://schemas.microsoft.com/office/powerpoint/2010/main" val="1586144398"/>
+        <p14:creationId xmlns:p14="http://schemas.microsoft.com/office/powerpoint/2010/main" val="154021963"/>
       </p:ext>
     </p:extLst>
   </p:cSld>
@@ -1819,344 +1918,6 @@
           <a:bodyPr/>
           <a:lstStyle/>
           <a:p>
-            <a:r>
-              <a:rPr lang="en-GB" dirty="0" err="1"/>
-              <a:t>Myslel</a:t>
-            </a:r>
-            <a:r>
-              <a:rPr lang="en-GB" dirty="0"/>
-              <a:t> </a:t>
-            </a:r>
-            <a:r>
-              <a:rPr lang="en-GB" dirty="0" err="1"/>
-              <a:t>jsem</a:t>
-            </a:r>
-            <a:r>
-              <a:rPr lang="en-GB" dirty="0"/>
-              <a:t>, </a:t>
-            </a:r>
-            <a:r>
-              <a:rPr lang="en-GB" dirty="0" err="1"/>
-              <a:t>že</a:t>
-            </a:r>
-            <a:r>
-              <a:rPr lang="en-GB" dirty="0"/>
-              <a:t> pro </a:t>
-            </a:r>
-            <a:r>
-              <a:rPr lang="en-GB" dirty="0" err="1"/>
-              <a:t>přenos</a:t>
-            </a:r>
-            <a:r>
-              <a:rPr lang="en-GB" dirty="0"/>
-              <a:t> </a:t>
-            </a:r>
-            <a:r>
-              <a:rPr lang="en-GB" dirty="0" err="1"/>
-              <a:t>dat</a:t>
-            </a:r>
-            <a:r>
-              <a:rPr lang="en-GB" dirty="0"/>
-              <a:t> je </a:t>
-            </a:r>
-            <a:r>
-              <a:rPr lang="en-GB" dirty="0" err="1"/>
-              <a:t>používána</a:t>
-            </a:r>
-            <a:r>
-              <a:rPr lang="en-GB" dirty="0"/>
-              <a:t> cesta z PL do FPD Main Switch a do </a:t>
-            </a:r>
-            <a:r>
-              <a:rPr lang="en-GB" dirty="0" err="1"/>
-              <a:t>bloku</a:t>
-            </a:r>
-            <a:r>
-              <a:rPr lang="en-GB" dirty="0"/>
-              <a:t> PCIe a </a:t>
-            </a:r>
-            <a:r>
-              <a:rPr lang="en-GB" dirty="0" err="1"/>
-              <a:t>díky</a:t>
-            </a:r>
-            <a:r>
-              <a:rPr lang="en-GB" dirty="0"/>
-              <a:t> </a:t>
-            </a:r>
-            <a:r>
-              <a:rPr lang="en-GB" dirty="0" err="1"/>
-              <a:t>němu</a:t>
-            </a:r>
-            <a:r>
-              <a:rPr lang="en-GB" dirty="0"/>
-              <a:t> </a:t>
-            </a:r>
-            <a:r>
-              <a:rPr lang="en-GB" dirty="0" err="1"/>
-              <a:t>bude</a:t>
-            </a:r>
-            <a:r>
-              <a:rPr lang="en-GB" dirty="0"/>
-              <a:t> </a:t>
-            </a:r>
-            <a:r>
-              <a:rPr lang="en-GB" dirty="0" err="1"/>
-              <a:t>probíhat</a:t>
-            </a:r>
-            <a:r>
-              <a:rPr lang="en-GB" dirty="0"/>
-              <a:t> </a:t>
-            </a:r>
-            <a:r>
-              <a:rPr lang="en-GB" dirty="0" err="1"/>
-              <a:t>komunikace</a:t>
-            </a:r>
-            <a:r>
-              <a:rPr lang="en-GB" dirty="0"/>
-              <a:t> </a:t>
-            </a:r>
-            <a:r>
-              <a:rPr lang="en-GB" dirty="0" err="1"/>
-              <a:t>přes</a:t>
-            </a:r>
-            <a:r>
-              <a:rPr lang="en-GB" dirty="0"/>
-              <a:t> PCIe do CCI (</a:t>
-            </a:r>
-            <a:r>
-              <a:rPr lang="en-GB" dirty="0" err="1"/>
-              <a:t>koherentnost</a:t>
-            </a:r>
-            <a:r>
-              <a:rPr lang="en-GB" dirty="0"/>
-              <a:t> </a:t>
-            </a:r>
-            <a:r>
-              <a:rPr lang="en-GB" dirty="0" err="1"/>
-              <a:t>jednotlivých</a:t>
-            </a:r>
-            <a:r>
-              <a:rPr lang="en-GB" dirty="0"/>
-              <a:t> CPU a PL) a </a:t>
-            </a:r>
-            <a:r>
-              <a:rPr lang="en-GB" dirty="0" err="1"/>
-              <a:t>pak</a:t>
-            </a:r>
-            <a:r>
-              <a:rPr lang="en-GB" dirty="0"/>
-              <a:t> do </a:t>
-            </a:r>
-            <a:r>
-              <a:rPr lang="en-GB" dirty="0" err="1"/>
-              <a:t>paměti</a:t>
-            </a:r>
-            <a:r>
-              <a:rPr lang="en-GB" dirty="0"/>
-              <a:t> DDR. </a:t>
-            </a:r>
-            <a:r>
-              <a:rPr lang="en-GB" dirty="0" err="1"/>
-              <a:t>Skutečná</a:t>
-            </a:r>
-            <a:r>
-              <a:rPr lang="en-GB" dirty="0"/>
-              <a:t> cesta </a:t>
-            </a:r>
-            <a:r>
-              <a:rPr lang="en-GB" dirty="0" err="1"/>
-              <a:t>však</a:t>
-            </a:r>
-            <a:r>
-              <a:rPr lang="en-GB" dirty="0"/>
-              <a:t> </a:t>
-            </a:r>
-            <a:r>
-              <a:rPr lang="en-GB" dirty="0" err="1"/>
-              <a:t>nevyužívá</a:t>
-            </a:r>
-            <a:r>
-              <a:rPr lang="en-GB" dirty="0"/>
-              <a:t> CCI ale </a:t>
-            </a:r>
-            <a:r>
-              <a:rPr lang="en-GB" dirty="0" err="1"/>
-              <a:t>přímo</a:t>
-            </a:r>
-            <a:r>
-              <a:rPr lang="en-GB" dirty="0"/>
-              <a:t> AXI FPD do DDR Controller. </a:t>
-            </a:r>
-            <a:r>
-              <a:rPr lang="en-GB" dirty="0" err="1"/>
-              <a:t>Moc</a:t>
-            </a:r>
-            <a:r>
-              <a:rPr lang="en-GB" dirty="0"/>
-              <a:t> </a:t>
-            </a:r>
-            <a:r>
-              <a:rPr lang="en-GB" dirty="0" err="1"/>
-              <a:t>jsem</a:t>
-            </a:r>
-            <a:r>
-              <a:rPr lang="en-GB" dirty="0"/>
-              <a:t> </a:t>
-            </a:r>
-            <a:r>
-              <a:rPr lang="en-GB" dirty="0" err="1"/>
-              <a:t>přenos</a:t>
-            </a:r>
-            <a:r>
-              <a:rPr lang="en-GB" dirty="0"/>
-              <a:t> </a:t>
-            </a:r>
-            <a:r>
-              <a:rPr lang="en-GB" dirty="0" err="1"/>
-              <a:t>dat</a:t>
-            </a:r>
-            <a:r>
-              <a:rPr lang="en-GB" dirty="0"/>
-              <a:t> </a:t>
-            </a:r>
-            <a:r>
-              <a:rPr lang="en-GB" dirty="0" err="1"/>
-              <a:t>zkomplikoval</a:t>
-            </a:r>
-            <a:r>
-              <a:rPr lang="en-GB" dirty="0"/>
-              <a:t>.</a:t>
-            </a:r>
-          </a:p>
-          <a:p>
-            <a:endParaRPr lang="en-GB" dirty="0"/>
-          </a:p>
-          <a:p>
-            <a:r>
-              <a:rPr lang="en-GB" dirty="0"/>
-              <a:t>https://</a:t>
-            </a:r>
-            <a:r>
-              <a:rPr lang="en-GB" dirty="0" err="1"/>
-              <a:t>www.xilinx.com</a:t>
-            </a:r>
-            <a:r>
-              <a:rPr lang="en-GB" dirty="0"/>
-              <a:t>/</a:t>
-            </a:r>
-            <a:r>
-              <a:rPr lang="en-GB" dirty="0" err="1"/>
-              <a:t>htmldocs</a:t>
-            </a:r>
-            <a:r>
-              <a:rPr lang="en-GB" dirty="0"/>
-              <a:t>/xilinx2017_4/</a:t>
-            </a:r>
-            <a:r>
-              <a:rPr lang="en-GB" dirty="0" err="1"/>
-              <a:t>sdaccel_doc</a:t>
-            </a:r>
-            <a:r>
-              <a:rPr lang="en-GB" dirty="0"/>
-              <a:t>/elq1504034325058.html</a:t>
-            </a:r>
-          </a:p>
-          <a:p>
-            <a:endParaRPr lang="en-GB" dirty="0"/>
-          </a:p>
-          <a:p>
-            <a:r>
-              <a:rPr lang="en-GB" dirty="0"/>
-              <a:t>Global Memory</a:t>
-            </a:r>
-          </a:p>
-          <a:p>
-            <a:r>
-              <a:rPr lang="en-GB" dirty="0"/>
-              <a:t>https://</a:t>
-            </a:r>
-            <a:r>
-              <a:rPr lang="en-GB" dirty="0" err="1"/>
-              <a:t>www.xilinx.com</a:t>
-            </a:r>
-            <a:r>
-              <a:rPr lang="en-GB" dirty="0"/>
-              <a:t>/</a:t>
-            </a:r>
-            <a:r>
-              <a:rPr lang="en-GB" dirty="0" err="1"/>
-              <a:t>htmldocs</a:t>
-            </a:r>
-            <a:r>
-              <a:rPr lang="en-GB" dirty="0"/>
-              <a:t>/xilinx2017_4/</a:t>
-            </a:r>
-            <a:r>
-              <a:rPr lang="en-GB" dirty="0" err="1"/>
-              <a:t>sdaccel_doc</a:t>
-            </a:r>
-            <a:r>
-              <a:rPr lang="en-GB" dirty="0"/>
-              <a:t>/vwr1504034321825.html</a:t>
-            </a:r>
-          </a:p>
-          <a:p>
-            <a:endParaRPr lang="en-GB" dirty="0"/>
-          </a:p>
-          <a:p>
-            <a:r>
-              <a:rPr lang="en-GB" dirty="0" err="1"/>
-              <a:t>Ohledně</a:t>
-            </a:r>
-            <a:r>
-              <a:rPr lang="en-GB" dirty="0"/>
-              <a:t> Vitis a DDR</a:t>
-            </a:r>
-          </a:p>
-          <a:p>
-            <a:r>
-              <a:rPr lang="en-GB" dirty="0"/>
-              <a:t>https://</a:t>
-            </a:r>
-            <a:r>
-              <a:rPr lang="en-GB" dirty="0" err="1"/>
-              <a:t>docs.xilinx.com</a:t>
-            </a:r>
-            <a:r>
-              <a:rPr lang="en-GB" dirty="0"/>
-              <a:t>/r/</a:t>
-            </a:r>
-            <a:r>
-              <a:rPr lang="en-GB" dirty="0" err="1"/>
-              <a:t>en</a:t>
-            </a:r>
-            <a:r>
-              <a:rPr lang="en-GB" dirty="0"/>
-              <a:t>-US/ug1393-vitis-application-acceleration/Global-Memory</a:t>
-            </a:r>
-          </a:p>
-          <a:p>
-            <a:endParaRPr lang="en-GB" dirty="0"/>
-          </a:p>
-          <a:p>
-            <a:r>
-              <a:rPr lang="en-GB" dirty="0"/>
-              <a:t>„</a:t>
-            </a:r>
-            <a:r>
-              <a:rPr lang="en-GB" b="0" i="0" dirty="0">
-                <a:solidFill>
-                  <a:srgbClr val="444444"/>
-                </a:solidFill>
-                <a:effectLst/>
-                <a:latin typeface="Roboto" panose="02000000000000000000" pitchFamily="2" charset="0"/>
-              </a:rPr>
-              <a:t>Global memory is accessed by the kernel through AXI4 master interfaces. Each AXI4 interface operates independently of each other, and each AXI4 interface can be connected to one or more memory controllers to off-chip memory such as DDR4. Global memory is primarily used to pass large data sets to and from the kernel from the host. </a:t>
-            </a:r>
-            <a:r>
-              <a:rPr lang="en-GB" dirty="0"/>
-              <a:t>“</a:t>
-            </a:r>
             <a:endParaRPr lang="en-CZ" dirty="0"/>
           </a:p>
         </p:txBody>
@@ -2184,7 +1945,7 @@
               <a:pPr>
                 <a:defRPr/>
               </a:pPr>
-              <a:t>10</a:t>
+              <a:t>9</a:t>
             </a:fld>
             <a:endParaRPr lang="cs-CZ" altLang="cs-CZ" dirty="0"/>
           </a:p>
@@ -2193,7 +1954,7 @@
     </p:spTree>
     <p:extLst>
       <p:ext uri="{BB962C8B-B14F-4D97-AF65-F5344CB8AC3E}">
-        <p14:creationId xmlns:p14="http://schemas.microsoft.com/office/powerpoint/2010/main" val="3825140030"/>
+        <p14:creationId xmlns:p14="http://schemas.microsoft.com/office/powerpoint/2010/main" val="1586144398"/>
       </p:ext>
     </p:extLst>
   </p:cSld>
@@ -2249,23 +2010,31 @@
           <a:p>
             <a:r>
               <a:rPr lang="en-GB" dirty="0" err="1"/>
-              <a:t>Informace</a:t>
-            </a:r>
-            <a:r>
-              <a:rPr lang="en-GB" dirty="0"/>
-              <a:t> o </a:t>
+              <a:t>Myslel</a:t>
+            </a:r>
+            <a:r>
+              <a:rPr lang="en-GB" dirty="0"/>
+              <a:t> </a:t>
             </a:r>
             <a:r>
               <a:rPr lang="en-GB" dirty="0" err="1"/>
-              <a:t>přenosu</a:t>
-            </a:r>
-            <a:r>
-              <a:rPr lang="en-GB" dirty="0"/>
-              <a:t> do „</a:t>
+              <a:t>jsem</a:t>
+            </a:r>
+            <a:r>
+              <a:rPr lang="en-GB" dirty="0"/>
+              <a:t>, </a:t>
             </a:r>
             <a:r>
               <a:rPr lang="en-GB" dirty="0" err="1"/>
-              <a:t>globální</a:t>
+              <a:t>že</a:t>
+            </a:r>
+            <a:r>
+              <a:rPr lang="en-GB" dirty="0"/>
+              <a:t> pro </a:t>
+            </a:r>
+            <a:r>
+              <a:rPr lang="en-GB" dirty="0" err="1"/>
+              <a:t>přenos</a:t>
             </a:r>
             <a:r>
               <a:rPr lang="en-GB" dirty="0"/>
@@ -2273,11 +2042,188 @@
             </a:r>
             <a:r>
               <a:rPr lang="en-GB" dirty="0" err="1"/>
-              <a:t>pamětí</a:t>
-            </a:r>
-            <a:r>
-              <a:rPr lang="en-GB" dirty="0"/>
-              <a:t>“ https://</a:t>
+              <a:t>dat</a:t>
+            </a:r>
+            <a:r>
+              <a:rPr lang="en-GB" dirty="0"/>
+              <a:t> je </a:t>
+            </a:r>
+            <a:r>
+              <a:rPr lang="en-GB" dirty="0" err="1"/>
+              <a:t>používána</a:t>
+            </a:r>
+            <a:r>
+              <a:rPr lang="en-GB" dirty="0"/>
+              <a:t> cesta z PL do FPD Main Switch a do </a:t>
+            </a:r>
+            <a:r>
+              <a:rPr lang="en-GB" dirty="0" err="1"/>
+              <a:t>bloku</a:t>
+            </a:r>
+            <a:r>
+              <a:rPr lang="en-GB" dirty="0"/>
+              <a:t> PCIe a </a:t>
+            </a:r>
+            <a:r>
+              <a:rPr lang="en-GB" dirty="0" err="1"/>
+              <a:t>díky</a:t>
+            </a:r>
+            <a:r>
+              <a:rPr lang="en-GB" dirty="0"/>
+              <a:t> </a:t>
+            </a:r>
+            <a:r>
+              <a:rPr lang="en-GB" dirty="0" err="1"/>
+              <a:t>němu</a:t>
+            </a:r>
+            <a:r>
+              <a:rPr lang="en-GB" dirty="0"/>
+              <a:t> </a:t>
+            </a:r>
+            <a:r>
+              <a:rPr lang="en-GB" dirty="0" err="1"/>
+              <a:t>bude</a:t>
+            </a:r>
+            <a:r>
+              <a:rPr lang="en-GB" dirty="0"/>
+              <a:t> </a:t>
+            </a:r>
+            <a:r>
+              <a:rPr lang="en-GB" dirty="0" err="1"/>
+              <a:t>probíhat</a:t>
+            </a:r>
+            <a:r>
+              <a:rPr lang="en-GB" dirty="0"/>
+              <a:t> </a:t>
+            </a:r>
+            <a:r>
+              <a:rPr lang="en-GB" dirty="0" err="1"/>
+              <a:t>komunikace</a:t>
+            </a:r>
+            <a:r>
+              <a:rPr lang="en-GB" dirty="0"/>
+              <a:t> </a:t>
+            </a:r>
+            <a:r>
+              <a:rPr lang="en-GB" dirty="0" err="1"/>
+              <a:t>přes</a:t>
+            </a:r>
+            <a:r>
+              <a:rPr lang="en-GB" dirty="0"/>
+              <a:t> PCIe do CCI (</a:t>
+            </a:r>
+            <a:r>
+              <a:rPr lang="en-GB" dirty="0" err="1"/>
+              <a:t>koherentnost</a:t>
+            </a:r>
+            <a:r>
+              <a:rPr lang="en-GB" dirty="0"/>
+              <a:t> </a:t>
+            </a:r>
+            <a:r>
+              <a:rPr lang="en-GB" dirty="0" err="1"/>
+              <a:t>jednotlivých</a:t>
+            </a:r>
+            <a:r>
+              <a:rPr lang="en-GB" dirty="0"/>
+              <a:t> CPU a PL) a </a:t>
+            </a:r>
+            <a:r>
+              <a:rPr lang="en-GB" dirty="0" err="1"/>
+              <a:t>pak</a:t>
+            </a:r>
+            <a:r>
+              <a:rPr lang="en-GB" dirty="0"/>
+              <a:t> do </a:t>
+            </a:r>
+            <a:r>
+              <a:rPr lang="en-GB" dirty="0" err="1"/>
+              <a:t>paměti</a:t>
+            </a:r>
+            <a:r>
+              <a:rPr lang="en-GB" dirty="0"/>
+              <a:t> DDR. </a:t>
+            </a:r>
+            <a:r>
+              <a:rPr lang="en-GB" dirty="0" err="1"/>
+              <a:t>Skutečná</a:t>
+            </a:r>
+            <a:r>
+              <a:rPr lang="en-GB" dirty="0"/>
+              <a:t> cesta </a:t>
+            </a:r>
+            <a:r>
+              <a:rPr lang="en-GB" dirty="0" err="1"/>
+              <a:t>však</a:t>
+            </a:r>
+            <a:r>
+              <a:rPr lang="en-GB" dirty="0"/>
+              <a:t> </a:t>
+            </a:r>
+            <a:r>
+              <a:rPr lang="en-GB" dirty="0" err="1"/>
+              <a:t>nevyužívá</a:t>
+            </a:r>
+            <a:r>
+              <a:rPr lang="en-GB" dirty="0"/>
+              <a:t> CCI ale </a:t>
+            </a:r>
+            <a:r>
+              <a:rPr lang="en-GB" dirty="0" err="1"/>
+              <a:t>přímo</a:t>
+            </a:r>
+            <a:r>
+              <a:rPr lang="en-GB" dirty="0"/>
+              <a:t> AXI FPD do DDR Controller. </a:t>
+            </a:r>
+            <a:r>
+              <a:rPr lang="en-GB" dirty="0" err="1"/>
+              <a:t>Moc</a:t>
+            </a:r>
+            <a:r>
+              <a:rPr lang="en-GB" dirty="0"/>
+              <a:t> </a:t>
+            </a:r>
+            <a:r>
+              <a:rPr lang="en-GB" dirty="0" err="1"/>
+              <a:t>jsem</a:t>
+            </a:r>
+            <a:r>
+              <a:rPr lang="en-GB" dirty="0"/>
+              <a:t> </a:t>
+            </a:r>
+            <a:r>
+              <a:rPr lang="en-GB" dirty="0" err="1"/>
+              <a:t>přenos</a:t>
+            </a:r>
+            <a:r>
+              <a:rPr lang="en-GB" dirty="0"/>
+              <a:t> </a:t>
+            </a:r>
+            <a:r>
+              <a:rPr lang="en-GB" dirty="0" err="1"/>
+              <a:t>dat</a:t>
+            </a:r>
+            <a:r>
+              <a:rPr lang="en-GB" dirty="0"/>
+              <a:t> </a:t>
+            </a:r>
+            <a:r>
+              <a:rPr lang="en-GB" dirty="0" err="1"/>
+              <a:t>zkomplikoval</a:t>
+            </a:r>
+            <a:r>
+              <a:rPr lang="en-GB" dirty="0"/>
+              <a:t>.</a:t>
+            </a:r>
+          </a:p>
+          <a:p>
+            <a:endParaRPr lang="en-GB" dirty="0"/>
+          </a:p>
+          <a:p>
+            <a:r>
+              <a:rPr lang="en-GB" dirty="0"/>
+              <a:t>https://</a:t>
             </a:r>
             <a:r>
               <a:rPr lang="en-GB" dirty="0" err="1"/>
@@ -2309,82 +2255,9 @@
           </a:p>
           <a:p>
             <a:r>
-              <a:rPr lang="en-GB" dirty="0" err="1"/>
-              <a:t>Některé</a:t>
-            </a:r>
-            <a:r>
-              <a:rPr lang="en-GB" dirty="0"/>
-              <a:t> </a:t>
-            </a:r>
-            <a:r>
-              <a:rPr lang="en-GB" dirty="0" err="1"/>
-              <a:t>zdroje</a:t>
-            </a:r>
-            <a:r>
-              <a:rPr lang="en-GB" dirty="0"/>
-              <a:t> </a:t>
-            </a:r>
-            <a:r>
-              <a:rPr lang="en-GB" dirty="0" err="1"/>
-              <a:t>udávají</a:t>
-            </a:r>
-            <a:r>
-              <a:rPr lang="en-GB" dirty="0"/>
-              <a:t> </a:t>
-            </a:r>
-            <a:r>
-              <a:rPr lang="en-GB" dirty="0" err="1"/>
-              <a:t>i</a:t>
-            </a:r>
-            <a:r>
-              <a:rPr lang="en-GB" dirty="0"/>
-              <a:t> </a:t>
-            </a:r>
-            <a:r>
-              <a:rPr lang="en-GB" dirty="0" err="1"/>
-              <a:t>možnost</a:t>
-            </a:r>
-            <a:r>
-              <a:rPr lang="en-GB" dirty="0"/>
-              <a:t> </a:t>
-            </a:r>
-            <a:r>
-              <a:rPr lang="en-GB" dirty="0" err="1"/>
-              <a:t>propojení</a:t>
-            </a:r>
-            <a:r>
-              <a:rPr lang="en-GB" dirty="0"/>
-              <a:t> </a:t>
-            </a:r>
-            <a:r>
-              <a:rPr lang="en-GB" dirty="0" err="1"/>
-              <a:t>právě</a:t>
-            </a:r>
-            <a:r>
-              <a:rPr lang="en-GB" dirty="0"/>
-              <a:t> PCIe DDR </a:t>
-            </a:r>
-            <a:r>
-              <a:rPr lang="en-GB" dirty="0" err="1"/>
-              <a:t>externí</a:t>
-            </a:r>
-            <a:r>
-              <a:rPr lang="en-GB" dirty="0"/>
-              <a:t> </a:t>
-            </a:r>
-            <a:r>
-              <a:rPr lang="en-GB" dirty="0" err="1"/>
-              <a:t>paměti</a:t>
-            </a:r>
-            <a:r>
-              <a:rPr lang="en-GB" dirty="0"/>
-              <a:t> pro </a:t>
-            </a:r>
-            <a:r>
-              <a:rPr lang="en-GB" dirty="0" err="1"/>
-              <a:t>SoC.</a:t>
-            </a:r>
-            <a:endParaRPr lang="en-GB" dirty="0"/>
+              <a:rPr lang="en-GB" dirty="0"/>
+              <a:t>Global Memory</a:t>
+            </a:r>
           </a:p>
           <a:p>
             <a:r>
@@ -2397,47 +2270,82 @@
             </a:r>
             <a:r>
               <a:rPr lang="en-GB" dirty="0"/>
-              <a:t>/video/</a:t>
+              <a:t>/</a:t>
             </a:r>
             <a:r>
               <a:rPr lang="en-GB" dirty="0" err="1"/>
-              <a:t>fpga</a:t>
-            </a:r>
-            <a:r>
-              <a:rPr lang="en-GB" dirty="0"/>
-              <a:t>/</a:t>
+              <a:t>htmldocs</a:t>
+            </a:r>
+            <a:r>
+              <a:rPr lang="en-GB" dirty="0"/>
+              <a:t>/xilinx2017_4/</a:t>
             </a:r>
             <a:r>
               <a:rPr lang="en-GB" dirty="0" err="1"/>
-              <a:t>axi</a:t>
-            </a:r>
-            <a:r>
-              <a:rPr lang="en-GB" dirty="0"/>
-              <a:t>-</a:t>
-            </a:r>
+              <a:t>sdaccel_doc</a:t>
+            </a:r>
+            <a:r>
+              <a:rPr lang="en-GB" dirty="0"/>
+              <a:t>/vwr1504034321825.html</a:t>
+            </a:r>
+          </a:p>
+          <a:p>
+            <a:endParaRPr lang="en-GB" dirty="0"/>
+          </a:p>
+          <a:p>
             <a:r>
               <a:rPr lang="en-GB" dirty="0" err="1"/>
-              <a:t>pci</a:t>
-            </a:r>
-            <a:r>
-              <a:rPr lang="en-GB" dirty="0"/>
-              <a:t>-express-</a:t>
+              <a:t>Ohledně</a:t>
+            </a:r>
+            <a:r>
+              <a:rPr lang="en-GB" dirty="0"/>
+              <a:t> Vitis a DDR</a:t>
+            </a:r>
+          </a:p>
+          <a:p>
+            <a:r>
+              <a:rPr lang="en-GB" dirty="0"/>
+              <a:t>https://</a:t>
             </a:r>
             <a:r>
               <a:rPr lang="en-GB" dirty="0" err="1"/>
-              <a:t>mig</a:t>
-            </a:r>
-            <a:r>
-              <a:rPr lang="en-GB" dirty="0"/>
-              <a:t>-subsystem-built-in-</a:t>
+              <a:t>docs.xilinx.com</a:t>
+            </a:r>
+            <a:r>
+              <a:rPr lang="en-GB" dirty="0"/>
+              <a:t>/r/</a:t>
             </a:r>
             <a:r>
               <a:rPr lang="en-GB" dirty="0" err="1"/>
-              <a:t>ipi.html</a:t>
-            </a:r>
+              <a:t>en</a:t>
+            </a:r>
+            <a:r>
+              <a:rPr lang="en-GB" dirty="0"/>
+              <a:t>-US/ug1393-vitis-application-acceleration/Global-Memory</a:t>
+            </a:r>
+          </a:p>
+          <a:p>
             <a:endParaRPr lang="en-GB" dirty="0"/>
           </a:p>
           <a:p>
+            <a:r>
+              <a:rPr lang="en-GB" dirty="0"/>
+              <a:t>„</a:t>
+            </a:r>
+            <a:r>
+              <a:rPr lang="en-GB" b="0" i="0" dirty="0">
+                <a:solidFill>
+                  <a:srgbClr val="444444"/>
+                </a:solidFill>
+                <a:effectLst/>
+                <a:latin typeface="Roboto" panose="02000000000000000000" pitchFamily="2" charset="0"/>
+              </a:rPr>
+              <a:t>Global memory is accessed by the kernel through AXI4 master interfaces. Each AXI4 interface operates independently of each other, and each AXI4 interface can be connected to one or more memory controllers to off-chip memory such as DDR4. Global memory is primarily used to pass large data sets to and from the kernel from the host. </a:t>
+            </a:r>
+            <a:r>
+              <a:rPr lang="en-GB" dirty="0"/>
+              <a:t>“</a:t>
+            </a:r>
             <a:endParaRPr lang="en-CZ" dirty="0"/>
           </a:p>
         </p:txBody>
@@ -2465,7 +2373,7 @@
               <a:pPr>
                 <a:defRPr/>
               </a:pPr>
-              <a:t>12</a:t>
+              <a:t>10</a:t>
             </a:fld>
             <a:endParaRPr lang="cs-CZ" altLang="cs-CZ" dirty="0"/>
           </a:p>
@@ -2474,7 +2382,7 @@
     </p:spTree>
     <p:extLst>
       <p:ext uri="{BB962C8B-B14F-4D97-AF65-F5344CB8AC3E}">
-        <p14:creationId xmlns:p14="http://schemas.microsoft.com/office/powerpoint/2010/main" val="780846173"/>
+        <p14:creationId xmlns:p14="http://schemas.microsoft.com/office/powerpoint/2010/main" val="3825140030"/>
       </p:ext>
     </p:extLst>
   </p:cSld>
@@ -2530,390 +2438,195 @@
           <a:p>
             <a:r>
               <a:rPr lang="en-GB" dirty="0" err="1"/>
-              <a:t>Zde</a:t>
-            </a:r>
-            <a:r>
-              <a:rPr lang="en-GB" dirty="0"/>
-              <a:t> je </a:t>
+              <a:t>Informace</a:t>
+            </a:r>
+            <a:r>
+              <a:rPr lang="en-GB" dirty="0"/>
+              <a:t> o </a:t>
             </a:r>
             <a:r>
               <a:rPr lang="en-GB" dirty="0" err="1"/>
-              <a:t>napsáno</a:t>
-            </a:r>
-            <a:r>
-              <a:rPr lang="en-GB" dirty="0"/>
-              <a:t> v </a:t>
+              <a:t>přenosu</a:t>
+            </a:r>
+            <a:r>
+              <a:rPr lang="en-GB" dirty="0"/>
+              <a:t> do „</a:t>
             </a:r>
             <a:r>
               <a:rPr lang="en-GB" dirty="0" err="1"/>
-              <a:t>dokumentaci</a:t>
-            </a:r>
-            <a:r>
-              <a:rPr lang="en-GB" dirty="0"/>
-              <a:t> - </a:t>
-            </a:r>
-            <a:r>
-              <a:rPr lang="en-GB" b="1" i="0" dirty="0">
-                <a:solidFill>
-                  <a:srgbClr val="444444"/>
-                </a:solidFill>
-                <a:effectLst/>
-                <a:latin typeface="Roboto" panose="02000000000000000000" pitchFamily="2" charset="0"/>
-              </a:rPr>
-              <a:t>PL Clocks </a:t>
-            </a:r>
-            <a:r>
-              <a:rPr lang="en-GB" b="0" i="0" dirty="0">
-                <a:solidFill>
-                  <a:srgbClr val="444444"/>
-                </a:solidFill>
-                <a:effectLst/>
-                <a:latin typeface="Roboto" panose="02000000000000000000" pitchFamily="2" charset="0"/>
-              </a:rPr>
-              <a:t>– PS generated clock to PL: PL0, PL1, PL2, and PL3</a:t>
-            </a:r>
+              <a:t>globální</a:t>
+            </a:r>
+            <a:r>
+              <a:rPr lang="en-GB" dirty="0"/>
+              <a:t> </a:t>
+            </a:r>
+            <a:r>
+              <a:rPr lang="en-GB" dirty="0" err="1"/>
+              <a:t>pamětí</a:t>
+            </a:r>
+            <a:r>
+              <a:rPr lang="en-GB" dirty="0"/>
+              <a:t>“ https://</a:t>
+            </a:r>
+            <a:r>
+              <a:rPr lang="en-GB" dirty="0" err="1"/>
+              <a:t>www.xilinx.com</a:t>
+            </a:r>
+            <a:r>
+              <a:rPr lang="en-GB" dirty="0"/>
+              <a:t>/</a:t>
+            </a:r>
+            <a:r>
+              <a:rPr lang="en-GB" dirty="0" err="1"/>
+              <a:t>htmldocs</a:t>
+            </a:r>
+            <a:r>
+              <a:rPr lang="en-GB" dirty="0"/>
+              <a:t>/xilinx2017_4/</a:t>
+            </a:r>
+            <a:r>
+              <a:rPr lang="en-GB" dirty="0" err="1"/>
+              <a:t>sdaccel_doc</a:t>
+            </a:r>
+            <a:r>
+              <a:rPr lang="en-GB" dirty="0"/>
+              <a:t>/elq1504034325058.html</a:t>
+            </a:r>
+          </a:p>
+          <a:p>
             <a:endParaRPr lang="en-GB" dirty="0"/>
           </a:p>
           <a:p>
             <a:r>
+              <a:rPr lang="en-GB" dirty="0" err="1"/>
+              <a:t>Některé</a:t>
+            </a:r>
+            <a:r>
+              <a:rPr lang="en-GB" dirty="0"/>
+              <a:t> </a:t>
+            </a:r>
+            <a:r>
+              <a:rPr lang="en-GB" dirty="0" err="1"/>
+              <a:t>zdroje</a:t>
+            </a:r>
+            <a:r>
+              <a:rPr lang="en-GB" dirty="0"/>
+              <a:t> </a:t>
+            </a:r>
+            <a:r>
+              <a:rPr lang="en-GB" dirty="0" err="1"/>
+              <a:t>udávají</a:t>
+            </a:r>
+            <a:r>
+              <a:rPr lang="en-GB" dirty="0"/>
+              <a:t> </a:t>
+            </a:r>
+            <a:r>
+              <a:rPr lang="en-GB" dirty="0" err="1"/>
+              <a:t>i</a:t>
+            </a:r>
+            <a:r>
+              <a:rPr lang="en-GB" dirty="0"/>
+              <a:t> </a:t>
+            </a:r>
+            <a:r>
+              <a:rPr lang="en-GB" dirty="0" err="1"/>
+              <a:t>možnost</a:t>
+            </a:r>
+            <a:r>
+              <a:rPr lang="en-GB" dirty="0"/>
+              <a:t> </a:t>
+            </a:r>
+            <a:r>
+              <a:rPr lang="en-GB" dirty="0" err="1"/>
+              <a:t>propojení</a:t>
+            </a:r>
+            <a:r>
+              <a:rPr lang="en-GB" dirty="0"/>
+              <a:t> </a:t>
+            </a:r>
+            <a:r>
+              <a:rPr lang="en-GB" dirty="0" err="1"/>
+              <a:t>právě</a:t>
+            </a:r>
+            <a:r>
+              <a:rPr lang="en-GB" dirty="0"/>
+              <a:t> PCIe DDR </a:t>
+            </a:r>
+            <a:r>
+              <a:rPr lang="en-GB" dirty="0" err="1"/>
+              <a:t>externí</a:t>
+            </a:r>
+            <a:r>
+              <a:rPr lang="en-GB" dirty="0"/>
+              <a:t> </a:t>
+            </a:r>
+            <a:r>
+              <a:rPr lang="en-GB" dirty="0" err="1"/>
+              <a:t>paměti</a:t>
+            </a:r>
+            <a:r>
+              <a:rPr lang="en-GB" dirty="0"/>
+              <a:t> pro </a:t>
+            </a:r>
+            <a:r>
+              <a:rPr lang="en-GB" dirty="0" err="1"/>
+              <a:t>SoC.</a:t>
+            </a:r>
+            <a:endParaRPr lang="en-GB" dirty="0"/>
+          </a:p>
+          <a:p>
+            <a:r>
               <a:rPr lang="en-GB" dirty="0"/>
               <a:t>https://</a:t>
             </a:r>
             <a:r>
               <a:rPr lang="en-GB" dirty="0" err="1"/>
-              <a:t>docs.xilinx.com</a:t>
-            </a:r>
-            <a:r>
-              <a:rPr lang="en-GB" dirty="0"/>
-              <a:t>/r/</a:t>
+              <a:t>www.xilinx.com</a:t>
+            </a:r>
+            <a:r>
+              <a:rPr lang="en-GB" dirty="0"/>
+              <a:t>/video/</a:t>
             </a:r>
             <a:r>
               <a:rPr lang="en-GB" dirty="0" err="1"/>
-              <a:t>en</a:t>
-            </a:r>
-            <a:r>
-              <a:rPr lang="en-GB" dirty="0"/>
-              <a:t>-US/pg201-zynq-ultrascale-plus-processing-system/Output-Clocks-Enable-Manual-Mode</a:t>
-            </a:r>
-          </a:p>
-          <a:p>
+              <a:t>fpga</a:t>
+            </a:r>
+            <a:r>
+              <a:rPr lang="en-GB" dirty="0"/>
+              <a:t>/</a:t>
+            </a:r>
+            <a:r>
+              <a:rPr lang="en-GB" dirty="0" err="1"/>
+              <a:t>axi</a:t>
+            </a:r>
+            <a:r>
+              <a:rPr lang="en-GB" dirty="0"/>
+              <a:t>-</a:t>
+            </a:r>
+            <a:r>
+              <a:rPr lang="en-GB" dirty="0" err="1"/>
+              <a:t>pci</a:t>
+            </a:r>
+            <a:r>
+              <a:rPr lang="en-GB" dirty="0"/>
+              <a:t>-express-</a:t>
+            </a:r>
+            <a:r>
+              <a:rPr lang="en-GB" dirty="0" err="1"/>
+              <a:t>mig</a:t>
+            </a:r>
+            <a:r>
+              <a:rPr lang="en-GB" dirty="0"/>
+              <a:t>-subsystem-built-in-</a:t>
+            </a:r>
+            <a:r>
+              <a:rPr lang="en-GB" dirty="0" err="1"/>
+              <a:t>ipi.html</a:t>
+            </a:r>
             <a:endParaRPr lang="en-GB" dirty="0"/>
           </a:p>
           <a:p>
-            <a:r>
-              <a:rPr lang="en-GB" dirty="0"/>
-              <a:t>Pinout </a:t>
-            </a:r>
-            <a:r>
-              <a:rPr lang="en-GB" dirty="0" err="1"/>
-              <a:t>na</a:t>
-            </a:r>
-            <a:r>
-              <a:rPr lang="en-GB" dirty="0"/>
-              <a:t> Raspberry Pi s GPIO5, </a:t>
-            </a:r>
-            <a:r>
-              <a:rPr lang="en-GB" dirty="0" err="1"/>
-              <a:t>kde</a:t>
-            </a:r>
-            <a:r>
-              <a:rPr lang="en-GB" dirty="0"/>
-              <a:t> je </a:t>
-            </a:r>
-            <a:r>
-              <a:rPr lang="en-GB" dirty="0" err="1"/>
-              <a:t>možný</a:t>
-            </a:r>
-            <a:r>
-              <a:rPr lang="en-GB" dirty="0"/>
-              <a:t> </a:t>
-            </a:r>
-            <a:r>
-              <a:rPr lang="en-GB" dirty="0" err="1"/>
-              <a:t>výstup</a:t>
-            </a:r>
-            <a:r>
-              <a:rPr lang="en-GB" dirty="0"/>
-              <a:t> PLL pro </a:t>
-            </a:r>
-            <a:r>
-              <a:rPr lang="en-GB" dirty="0" err="1"/>
-              <a:t>taktování</a:t>
-            </a:r>
-            <a:r>
-              <a:rPr lang="en-GB" dirty="0"/>
-              <a:t> FPGA bez </a:t>
-            </a:r>
-            <a:r>
-              <a:rPr lang="en-GB" dirty="0" err="1"/>
-              <a:t>dalšího</a:t>
-            </a:r>
-            <a:r>
-              <a:rPr lang="en-GB" dirty="0"/>
-              <a:t> </a:t>
-            </a:r>
-            <a:r>
-              <a:rPr lang="en-GB" dirty="0" err="1"/>
-              <a:t>oscilátoru</a:t>
-            </a:r>
-            <a:endParaRPr lang="en-GB" dirty="0"/>
-          </a:p>
-          <a:p>
-            <a:r>
-              <a:rPr lang="en-GB" dirty="0"/>
-              <a:t>https://</a:t>
-            </a:r>
-            <a:r>
-              <a:rPr lang="en-GB" dirty="0" err="1"/>
-              <a:t>pinout.xyz</a:t>
-            </a:r>
-            <a:r>
-              <a:rPr lang="en-GB" dirty="0"/>
-              <a:t>/pinout/</a:t>
-            </a:r>
-            <a:r>
-              <a:rPr lang="en-GB" dirty="0" err="1"/>
-              <a:t>gpclk</a:t>
-            </a:r>
-            <a:endParaRPr lang="en-GB" dirty="0"/>
-          </a:p>
-          <a:p>
-            <a:endParaRPr lang="en-GB" dirty="0"/>
-          </a:p>
-          <a:p>
-            <a:r>
-              <a:rPr lang="en-GB" dirty="0" err="1"/>
-              <a:t>Nejspíše</a:t>
-            </a:r>
-            <a:r>
-              <a:rPr lang="en-GB" dirty="0"/>
-              <a:t> to </a:t>
-            </a:r>
-            <a:r>
-              <a:rPr lang="en-GB" dirty="0" err="1"/>
-              <a:t>funguje</a:t>
-            </a:r>
-            <a:r>
-              <a:rPr lang="en-GB" dirty="0"/>
-              <a:t> </a:t>
-            </a:r>
-            <a:r>
-              <a:rPr lang="en-GB" dirty="0" err="1"/>
-              <a:t>tak</a:t>
-            </a:r>
-            <a:r>
-              <a:rPr lang="en-GB" dirty="0"/>
-              <a:t>, </a:t>
-            </a:r>
-            <a:r>
-              <a:rPr lang="en-GB" dirty="0" err="1"/>
-              <a:t>že</a:t>
-            </a:r>
-            <a:r>
-              <a:rPr lang="en-GB" dirty="0"/>
-              <a:t> </a:t>
-            </a:r>
-            <a:r>
-              <a:rPr lang="en-GB" dirty="0" err="1"/>
-              <a:t>pomocí</a:t>
-            </a:r>
-            <a:r>
-              <a:rPr lang="en-GB" dirty="0"/>
-              <a:t> </a:t>
-            </a:r>
-            <a:r>
-              <a:rPr lang="en-GB" dirty="0" err="1"/>
-              <a:t>oscilátoru</a:t>
-            </a:r>
-            <a:r>
-              <a:rPr lang="en-GB" dirty="0"/>
-              <a:t> je </a:t>
-            </a:r>
-            <a:r>
-              <a:rPr lang="en-GB" dirty="0" err="1"/>
-              <a:t>taktován</a:t>
-            </a:r>
-            <a:r>
-              <a:rPr lang="en-GB" dirty="0"/>
-              <a:t> PS a </a:t>
-            </a:r>
-            <a:r>
-              <a:rPr lang="en-GB" dirty="0" err="1"/>
-              <a:t>pak</a:t>
-            </a:r>
-            <a:r>
-              <a:rPr lang="en-GB" dirty="0"/>
-              <a:t> je v PS PLL (</a:t>
-            </a:r>
-            <a:r>
-              <a:rPr lang="en-GB" dirty="0" err="1"/>
-              <a:t>fázový</a:t>
-            </a:r>
-            <a:r>
-              <a:rPr lang="en-GB" dirty="0"/>
-              <a:t> </a:t>
-            </a:r>
-            <a:r>
-              <a:rPr lang="en-GB" dirty="0" err="1"/>
-              <a:t>závěs</a:t>
-            </a:r>
-            <a:r>
-              <a:rPr lang="en-GB" dirty="0"/>
-              <a:t>), </a:t>
-            </a:r>
-            <a:r>
-              <a:rPr lang="en-GB" dirty="0" err="1"/>
-              <a:t>který</a:t>
-            </a:r>
-            <a:r>
-              <a:rPr lang="en-GB" dirty="0"/>
-              <a:t> </a:t>
-            </a:r>
-            <a:r>
-              <a:rPr lang="en-GB" dirty="0" err="1"/>
-              <a:t>generuje</a:t>
-            </a:r>
-            <a:r>
-              <a:rPr lang="en-GB" dirty="0"/>
-              <a:t> </a:t>
-            </a:r>
-            <a:r>
-              <a:rPr lang="en-GB" dirty="0" err="1"/>
-              <a:t>na</a:t>
-            </a:r>
-            <a:r>
-              <a:rPr lang="en-GB" dirty="0"/>
-              <a:t> </a:t>
-            </a:r>
-            <a:r>
-              <a:rPr lang="en-GB" dirty="0" err="1"/>
-              <a:t>různé</a:t>
-            </a:r>
-            <a:r>
-              <a:rPr lang="en-GB" dirty="0"/>
-              <a:t> </a:t>
-            </a:r>
-            <a:r>
-              <a:rPr lang="en-GB" dirty="0" err="1"/>
-              <a:t>výstupy</a:t>
-            </a:r>
-            <a:r>
-              <a:rPr lang="en-GB" dirty="0"/>
-              <a:t> </a:t>
-            </a:r>
-            <a:r>
-              <a:rPr lang="en-GB" dirty="0" err="1"/>
-              <a:t>různé</a:t>
-            </a:r>
-            <a:r>
-              <a:rPr lang="en-GB" dirty="0"/>
-              <a:t> CLK </a:t>
-            </a:r>
-            <a:r>
-              <a:rPr lang="en-GB" dirty="0" err="1"/>
-              <a:t>signály</a:t>
-            </a:r>
-            <a:r>
-              <a:rPr lang="en-GB" dirty="0"/>
-              <a:t>, </a:t>
-            </a:r>
-            <a:r>
-              <a:rPr lang="en-GB" dirty="0" err="1"/>
-              <a:t>které</a:t>
-            </a:r>
-            <a:r>
-              <a:rPr lang="en-GB" dirty="0"/>
-              <a:t> </a:t>
-            </a:r>
-            <a:r>
-              <a:rPr lang="en-GB" dirty="0" err="1"/>
-              <a:t>poté</a:t>
-            </a:r>
-            <a:r>
-              <a:rPr lang="en-GB" dirty="0"/>
-              <a:t> </a:t>
-            </a:r>
-            <a:r>
-              <a:rPr lang="en-GB" dirty="0" err="1"/>
-              <a:t>jsou</a:t>
-            </a:r>
-            <a:r>
-              <a:rPr lang="en-GB" dirty="0"/>
-              <a:t> v </a:t>
-            </a:r>
-            <a:r>
-              <a:rPr lang="en-GB" dirty="0" err="1"/>
-              <a:t>ZynQ</a:t>
-            </a:r>
-            <a:r>
-              <a:rPr lang="en-GB" dirty="0"/>
-              <a:t> </a:t>
-            </a:r>
-            <a:r>
-              <a:rPr lang="en-GB" dirty="0" err="1"/>
-              <a:t>MPSoC</a:t>
-            </a:r>
-            <a:r>
-              <a:rPr lang="en-GB" dirty="0"/>
-              <a:t> </a:t>
-            </a:r>
-            <a:r>
-              <a:rPr lang="en-GB" dirty="0" err="1"/>
-              <a:t>bloku</a:t>
-            </a:r>
-            <a:r>
-              <a:rPr lang="en-GB" dirty="0"/>
-              <a:t> </a:t>
-            </a:r>
-            <a:r>
-              <a:rPr lang="en-GB" dirty="0" err="1"/>
-              <a:t>nastaveny</a:t>
-            </a:r>
-            <a:r>
-              <a:rPr lang="en-GB" dirty="0"/>
-              <a:t> </a:t>
-            </a:r>
-            <a:r>
-              <a:rPr lang="en-GB" dirty="0" err="1"/>
-              <a:t>jako</a:t>
-            </a:r>
-            <a:r>
-              <a:rPr lang="en-GB" dirty="0"/>
-              <a:t> </a:t>
-            </a:r>
-            <a:r>
-              <a:rPr lang="en-GB" dirty="0" err="1"/>
-              <a:t>vstupy</a:t>
-            </a:r>
-            <a:r>
-              <a:rPr lang="en-GB" dirty="0"/>
-              <a:t> pro PL clock.</a:t>
-            </a:r>
-          </a:p>
-          <a:p>
-            <a:endParaRPr lang="en-GB" dirty="0"/>
-          </a:p>
-          <a:p>
-            <a:r>
-              <a:rPr lang="en-GB" dirty="0"/>
-              <a:t>https://</a:t>
-            </a:r>
-            <a:r>
-              <a:rPr lang="en-GB" dirty="0" err="1"/>
-              <a:t>docs.xilinx.com</a:t>
-            </a:r>
-            <a:r>
-              <a:rPr lang="en-GB" dirty="0"/>
-              <a:t>/r/</a:t>
-            </a:r>
-            <a:r>
-              <a:rPr lang="en-GB" dirty="0" err="1"/>
-              <a:t>en</a:t>
-            </a:r>
-            <a:r>
-              <a:rPr lang="en-GB" dirty="0"/>
-              <a:t>-US/ug1085-zynq-ultrascale-trm</a:t>
-            </a:r>
             <a:endParaRPr lang="en-CZ" dirty="0"/>
           </a:p>
         </p:txBody>
@@ -2941,7 +2654,7 @@
               <a:pPr>
                 <a:defRPr/>
               </a:pPr>
-              <a:t>13</a:t>
+              <a:t>12</a:t>
             </a:fld>
             <a:endParaRPr lang="cs-CZ" altLang="cs-CZ" dirty="0"/>
           </a:p>
@@ -2950,7 +2663,7 @@
     </p:spTree>
     <p:extLst>
       <p:ext uri="{BB962C8B-B14F-4D97-AF65-F5344CB8AC3E}">
-        <p14:creationId xmlns:p14="http://schemas.microsoft.com/office/powerpoint/2010/main" val="2063119388"/>
+        <p14:creationId xmlns:p14="http://schemas.microsoft.com/office/powerpoint/2010/main" val="780846173"/>
       </p:ext>
     </p:extLst>
   </p:cSld>
@@ -3417,7 +3130,7 @@
               <a:pPr>
                 <a:defRPr/>
               </a:pPr>
-              <a:t>15</a:t>
+              <a:t>13</a:t>
             </a:fld>
             <a:endParaRPr lang="cs-CZ" altLang="cs-CZ" dirty="0"/>
           </a:p>
@@ -3426,7 +3139,7 @@
     </p:spTree>
     <p:extLst>
       <p:ext uri="{BB962C8B-B14F-4D97-AF65-F5344CB8AC3E}">
-        <p14:creationId xmlns:p14="http://schemas.microsoft.com/office/powerpoint/2010/main" val="237795619"/>
+        <p14:creationId xmlns:p14="http://schemas.microsoft.com/office/powerpoint/2010/main" val="2063119388"/>
       </p:ext>
     </p:extLst>
   </p:cSld>
@@ -3480,6 +3193,392 @@
           <a:bodyPr/>
           <a:lstStyle/>
           <a:p>
+            <a:r>
+              <a:rPr lang="en-GB" dirty="0" err="1"/>
+              <a:t>Zde</a:t>
+            </a:r>
+            <a:r>
+              <a:rPr lang="en-GB" dirty="0"/>
+              <a:t> je </a:t>
+            </a:r>
+            <a:r>
+              <a:rPr lang="en-GB" dirty="0" err="1"/>
+              <a:t>napsáno</a:t>
+            </a:r>
+            <a:r>
+              <a:rPr lang="en-GB" dirty="0"/>
+              <a:t> v </a:t>
+            </a:r>
+            <a:r>
+              <a:rPr lang="en-GB" dirty="0" err="1"/>
+              <a:t>dokumentaci</a:t>
+            </a:r>
+            <a:r>
+              <a:rPr lang="en-GB" dirty="0"/>
+              <a:t> - </a:t>
+            </a:r>
+            <a:r>
+              <a:rPr lang="en-GB" b="1" i="0" dirty="0">
+                <a:solidFill>
+                  <a:srgbClr val="444444"/>
+                </a:solidFill>
+                <a:effectLst/>
+                <a:latin typeface="Roboto" panose="02000000000000000000" pitchFamily="2" charset="0"/>
+              </a:rPr>
+              <a:t>PL Clocks </a:t>
+            </a:r>
+            <a:r>
+              <a:rPr lang="en-GB" b="0" i="0" dirty="0">
+                <a:solidFill>
+                  <a:srgbClr val="444444"/>
+                </a:solidFill>
+                <a:effectLst/>
+                <a:latin typeface="Roboto" panose="02000000000000000000" pitchFamily="2" charset="0"/>
+              </a:rPr>
+              <a:t>– PS generated clock to PL: PL0, PL1, PL2, and PL3</a:t>
+            </a:r>
+            <a:endParaRPr lang="en-GB" dirty="0"/>
+          </a:p>
+          <a:p>
+            <a:r>
+              <a:rPr lang="en-GB" dirty="0"/>
+              <a:t>https://</a:t>
+            </a:r>
+            <a:r>
+              <a:rPr lang="en-GB" dirty="0" err="1"/>
+              <a:t>docs.xilinx.com</a:t>
+            </a:r>
+            <a:r>
+              <a:rPr lang="en-GB" dirty="0"/>
+              <a:t>/r/</a:t>
+            </a:r>
+            <a:r>
+              <a:rPr lang="en-GB" dirty="0" err="1"/>
+              <a:t>en</a:t>
+            </a:r>
+            <a:r>
+              <a:rPr lang="en-GB" dirty="0"/>
+              <a:t>-US/pg201-zynq-ultrascale-plus-processing-system/Output-Clocks-Enable-Manual-Mode</a:t>
+            </a:r>
+          </a:p>
+          <a:p>
+            <a:endParaRPr lang="en-GB" dirty="0"/>
+          </a:p>
+          <a:p>
+            <a:r>
+              <a:rPr lang="en-GB" dirty="0"/>
+              <a:t>Pinout </a:t>
+            </a:r>
+            <a:r>
+              <a:rPr lang="en-GB" dirty="0" err="1"/>
+              <a:t>na</a:t>
+            </a:r>
+            <a:r>
+              <a:rPr lang="en-GB" dirty="0"/>
+              <a:t> Raspberry Pi s GPIO5, </a:t>
+            </a:r>
+            <a:r>
+              <a:rPr lang="en-GB" dirty="0" err="1"/>
+              <a:t>kde</a:t>
+            </a:r>
+            <a:r>
+              <a:rPr lang="en-GB" dirty="0"/>
+              <a:t> je </a:t>
+            </a:r>
+            <a:r>
+              <a:rPr lang="en-GB" dirty="0" err="1"/>
+              <a:t>možný</a:t>
+            </a:r>
+            <a:r>
+              <a:rPr lang="en-GB" dirty="0"/>
+              <a:t> </a:t>
+            </a:r>
+            <a:r>
+              <a:rPr lang="en-GB" dirty="0" err="1"/>
+              <a:t>výstup</a:t>
+            </a:r>
+            <a:r>
+              <a:rPr lang="en-GB" dirty="0"/>
+              <a:t> PLL pro </a:t>
+            </a:r>
+            <a:r>
+              <a:rPr lang="en-GB" dirty="0" err="1"/>
+              <a:t>taktování</a:t>
+            </a:r>
+            <a:r>
+              <a:rPr lang="en-GB" dirty="0"/>
+              <a:t> FPGA bez </a:t>
+            </a:r>
+            <a:r>
+              <a:rPr lang="en-GB" dirty="0" err="1"/>
+              <a:t>dalšího</a:t>
+            </a:r>
+            <a:r>
+              <a:rPr lang="en-GB" dirty="0"/>
+              <a:t> </a:t>
+            </a:r>
+            <a:r>
+              <a:rPr lang="en-GB" dirty="0" err="1"/>
+              <a:t>oscilátoru</a:t>
+            </a:r>
+            <a:endParaRPr lang="en-GB" dirty="0"/>
+          </a:p>
+          <a:p>
+            <a:r>
+              <a:rPr lang="en-GB" dirty="0"/>
+              <a:t>https://</a:t>
+            </a:r>
+            <a:r>
+              <a:rPr lang="en-GB" dirty="0" err="1"/>
+              <a:t>pinout.xyz</a:t>
+            </a:r>
+            <a:r>
+              <a:rPr lang="en-GB" dirty="0"/>
+              <a:t>/pinout/</a:t>
+            </a:r>
+            <a:r>
+              <a:rPr lang="en-GB" dirty="0" err="1"/>
+              <a:t>gpclk</a:t>
+            </a:r>
+            <a:endParaRPr lang="en-GB" dirty="0"/>
+          </a:p>
+          <a:p>
+            <a:endParaRPr lang="en-GB" dirty="0"/>
+          </a:p>
+          <a:p>
+            <a:r>
+              <a:rPr lang="en-GB" dirty="0" err="1"/>
+              <a:t>Nejspíše</a:t>
+            </a:r>
+            <a:r>
+              <a:rPr lang="en-GB" dirty="0"/>
+              <a:t> to </a:t>
+            </a:r>
+            <a:r>
+              <a:rPr lang="en-GB" dirty="0" err="1"/>
+              <a:t>funguje</a:t>
+            </a:r>
+            <a:r>
+              <a:rPr lang="en-GB" dirty="0"/>
+              <a:t> </a:t>
+            </a:r>
+            <a:r>
+              <a:rPr lang="en-GB" dirty="0" err="1"/>
+              <a:t>tak</a:t>
+            </a:r>
+            <a:r>
+              <a:rPr lang="en-GB" dirty="0"/>
+              <a:t>, </a:t>
+            </a:r>
+            <a:r>
+              <a:rPr lang="en-GB" dirty="0" err="1"/>
+              <a:t>že</a:t>
+            </a:r>
+            <a:r>
+              <a:rPr lang="en-GB" dirty="0"/>
+              <a:t> </a:t>
+            </a:r>
+            <a:r>
+              <a:rPr lang="en-GB" dirty="0" err="1"/>
+              <a:t>pomocí</a:t>
+            </a:r>
+            <a:r>
+              <a:rPr lang="en-GB" dirty="0"/>
+              <a:t> </a:t>
+            </a:r>
+            <a:r>
+              <a:rPr lang="en-GB" dirty="0" err="1"/>
+              <a:t>oscilátoru</a:t>
+            </a:r>
+            <a:r>
+              <a:rPr lang="en-GB" dirty="0"/>
+              <a:t> je </a:t>
+            </a:r>
+            <a:r>
+              <a:rPr lang="en-GB" dirty="0" err="1"/>
+              <a:t>taktován</a:t>
+            </a:r>
+            <a:r>
+              <a:rPr lang="en-GB" dirty="0"/>
+              <a:t> PS a </a:t>
+            </a:r>
+            <a:r>
+              <a:rPr lang="en-GB" dirty="0" err="1"/>
+              <a:t>pak</a:t>
+            </a:r>
+            <a:r>
+              <a:rPr lang="en-GB" dirty="0"/>
+              <a:t> je v PS PLL (</a:t>
+            </a:r>
+            <a:r>
+              <a:rPr lang="en-GB" dirty="0" err="1"/>
+              <a:t>fázový</a:t>
+            </a:r>
+            <a:r>
+              <a:rPr lang="en-GB" dirty="0"/>
+              <a:t> </a:t>
+            </a:r>
+            <a:r>
+              <a:rPr lang="en-GB" dirty="0" err="1"/>
+              <a:t>závěs</a:t>
+            </a:r>
+            <a:r>
+              <a:rPr lang="en-GB" dirty="0"/>
+              <a:t>), </a:t>
+            </a:r>
+            <a:r>
+              <a:rPr lang="en-GB" dirty="0" err="1"/>
+              <a:t>který</a:t>
+            </a:r>
+            <a:r>
+              <a:rPr lang="en-GB" dirty="0"/>
+              <a:t> </a:t>
+            </a:r>
+            <a:r>
+              <a:rPr lang="en-GB" dirty="0" err="1"/>
+              <a:t>generuje</a:t>
+            </a:r>
+            <a:r>
+              <a:rPr lang="en-GB" dirty="0"/>
+              <a:t> </a:t>
+            </a:r>
+            <a:r>
+              <a:rPr lang="en-GB" dirty="0" err="1"/>
+              <a:t>na</a:t>
+            </a:r>
+            <a:r>
+              <a:rPr lang="en-GB" dirty="0"/>
+              <a:t> </a:t>
+            </a:r>
+            <a:r>
+              <a:rPr lang="en-GB" dirty="0" err="1"/>
+              <a:t>různé</a:t>
+            </a:r>
+            <a:r>
+              <a:rPr lang="en-GB" dirty="0"/>
+              <a:t> </a:t>
+            </a:r>
+            <a:r>
+              <a:rPr lang="en-GB" dirty="0" err="1"/>
+              <a:t>výstupy</a:t>
+            </a:r>
+            <a:r>
+              <a:rPr lang="en-GB" dirty="0"/>
+              <a:t> </a:t>
+            </a:r>
+            <a:r>
+              <a:rPr lang="en-GB" dirty="0" err="1"/>
+              <a:t>různé</a:t>
+            </a:r>
+            <a:r>
+              <a:rPr lang="en-GB" dirty="0"/>
+              <a:t> CLK </a:t>
+            </a:r>
+            <a:r>
+              <a:rPr lang="en-GB" dirty="0" err="1"/>
+              <a:t>signály</a:t>
+            </a:r>
+            <a:r>
+              <a:rPr lang="en-GB" dirty="0"/>
+              <a:t>, </a:t>
+            </a:r>
+            <a:r>
+              <a:rPr lang="en-GB" dirty="0" err="1"/>
+              <a:t>které</a:t>
+            </a:r>
+            <a:r>
+              <a:rPr lang="en-GB" dirty="0"/>
+              <a:t> </a:t>
+            </a:r>
+            <a:r>
+              <a:rPr lang="en-GB" dirty="0" err="1"/>
+              <a:t>poté</a:t>
+            </a:r>
+            <a:r>
+              <a:rPr lang="en-GB" dirty="0"/>
+              <a:t> </a:t>
+            </a:r>
+            <a:r>
+              <a:rPr lang="en-GB" dirty="0" err="1"/>
+              <a:t>jsou</a:t>
+            </a:r>
+            <a:r>
+              <a:rPr lang="en-GB" dirty="0"/>
+              <a:t> v </a:t>
+            </a:r>
+            <a:r>
+              <a:rPr lang="en-GB" dirty="0" err="1"/>
+              <a:t>ZynQ</a:t>
+            </a:r>
+            <a:r>
+              <a:rPr lang="en-GB" dirty="0"/>
+              <a:t> </a:t>
+            </a:r>
+            <a:r>
+              <a:rPr lang="en-GB" dirty="0" err="1"/>
+              <a:t>MPSoC</a:t>
+            </a:r>
+            <a:r>
+              <a:rPr lang="en-GB" dirty="0"/>
+              <a:t> </a:t>
+            </a:r>
+            <a:r>
+              <a:rPr lang="en-GB" dirty="0" err="1"/>
+              <a:t>bloku</a:t>
+            </a:r>
+            <a:r>
+              <a:rPr lang="en-GB" dirty="0"/>
+              <a:t> </a:t>
+            </a:r>
+            <a:r>
+              <a:rPr lang="en-GB" dirty="0" err="1"/>
+              <a:t>nastaveny</a:t>
+            </a:r>
+            <a:r>
+              <a:rPr lang="en-GB" dirty="0"/>
+              <a:t> </a:t>
+            </a:r>
+            <a:r>
+              <a:rPr lang="en-GB" dirty="0" err="1"/>
+              <a:t>jako</a:t>
+            </a:r>
+            <a:r>
+              <a:rPr lang="en-GB" dirty="0"/>
+              <a:t> </a:t>
+            </a:r>
+            <a:r>
+              <a:rPr lang="en-GB" dirty="0" err="1"/>
+              <a:t>vstupy</a:t>
+            </a:r>
+            <a:r>
+              <a:rPr lang="en-GB" dirty="0"/>
+              <a:t> pro PL clock.</a:t>
+            </a:r>
+          </a:p>
+          <a:p>
+            <a:endParaRPr lang="en-GB" dirty="0"/>
+          </a:p>
+          <a:p>
+            <a:r>
+              <a:rPr lang="en-GB" dirty="0"/>
+              <a:t>https://</a:t>
+            </a:r>
+            <a:r>
+              <a:rPr lang="en-GB" dirty="0" err="1"/>
+              <a:t>docs.xilinx.com</a:t>
+            </a:r>
+            <a:r>
+              <a:rPr lang="en-GB" dirty="0"/>
+              <a:t>/r/</a:t>
+            </a:r>
+            <a:r>
+              <a:rPr lang="en-GB" dirty="0" err="1"/>
+              <a:t>en</a:t>
+            </a:r>
+            <a:r>
+              <a:rPr lang="en-GB" dirty="0"/>
+              <a:t>-US/ug1085-zynq-ultrascale-trm</a:t>
+            </a:r>
             <a:endParaRPr lang="en-CZ" dirty="0"/>
           </a:p>
         </p:txBody>
@@ -3507,7 +3606,7 @@
               <a:pPr>
                 <a:defRPr/>
               </a:pPr>
-              <a:t>16</a:t>
+              <a:t>15</a:t>
             </a:fld>
             <a:endParaRPr lang="cs-CZ" altLang="cs-CZ" dirty="0"/>
           </a:p>
@@ -3516,7 +3615,7 @@
     </p:spTree>
     <p:extLst>
       <p:ext uri="{BB962C8B-B14F-4D97-AF65-F5344CB8AC3E}">
-        <p14:creationId xmlns:p14="http://schemas.microsoft.com/office/powerpoint/2010/main" val="3470336303"/>
+        <p14:creationId xmlns:p14="http://schemas.microsoft.com/office/powerpoint/2010/main" val="237795619"/>
       </p:ext>
     </p:extLst>
   </p:cSld>
@@ -11300,7 +11399,7 @@
           <p:nvPr/>
         </p:nvPicPr>
         <p:blipFill>
-          <a:blip r:embed="rId2">
+          <a:blip r:embed="rId3">
             <a:extLst>
               <a:ext uri="{28A0092B-C50C-407E-A947-70E740481C1C}">
                 <a14:useLocalDpi xmlns:a14="http://schemas.microsoft.com/office/drawing/2010/main" val="0"/>
@@ -11336,7 +11435,7 @@
           <p:nvPr/>
         </p:nvPicPr>
         <p:blipFill>
-          <a:blip r:embed="rId3">
+          <a:blip r:embed="rId4">
             <a:extLst>
               <a:ext uri="{28A0092B-C50C-407E-A947-70E740481C1C}">
                 <a14:useLocalDpi xmlns:a14="http://schemas.microsoft.com/office/drawing/2010/main" val="0"/>

</xml_diff>